<commit_message>
* added new histogram matching * added comparison screenshots from all segmentations * added some stuff to the presentation
</commit_message>
<xml_diff>
--- a/Presentation/Final/FinalPresentation_Group3_BucheggerDuranWeber.pptx
+++ b/Presentation/Final/FinalPresentation_Group3_BucheggerDuranWeber.pptx
@@ -10,10 +10,10 @@
     <p:sldMasterId id="2147483692" r:id="rId6"/>
   </p:sldMasterIdLst>
   <p:notesMasterIdLst>
-    <p:notesMasterId r:id="rId19"/>
+    <p:notesMasterId r:id="rId26"/>
   </p:notesMasterIdLst>
   <p:handoutMasterIdLst>
-    <p:handoutMasterId r:id="rId20"/>
+    <p:handoutMasterId r:id="rId27"/>
   </p:handoutMasterIdLst>
   <p:sldIdLst>
     <p:sldId id="306" r:id="rId7"/>
@@ -26,8 +26,15 @@
     <p:sldId id="313" r:id="rId14"/>
     <p:sldId id="314" r:id="rId15"/>
     <p:sldId id="315" r:id="rId16"/>
-    <p:sldId id="307" r:id="rId17"/>
-    <p:sldId id="300" r:id="rId18"/>
+    <p:sldId id="320" r:id="rId17"/>
+    <p:sldId id="321" r:id="rId18"/>
+    <p:sldId id="322" r:id="rId19"/>
+    <p:sldId id="323" r:id="rId20"/>
+    <p:sldId id="324" r:id="rId21"/>
+    <p:sldId id="325" r:id="rId22"/>
+    <p:sldId id="326" r:id="rId23"/>
+    <p:sldId id="307" r:id="rId24"/>
+    <p:sldId id="300" r:id="rId25"/>
   </p:sldIdLst>
   <p:sldSz cx="9144000" cy="5143500" type="screen16x9"/>
   <p:notesSz cx="6858000" cy="9144000"/>
@@ -134,29 +141,332 @@
 </p:presentation>
 </file>
 
+<file path=ppt/revisionInfo.xml><?xml version="1.0" encoding="utf-8"?>
+<p1510:revInfo xmlns:a="http://schemas.openxmlformats.org/drawingml/2006/main" xmlns:r="http://schemas.openxmlformats.org/officeDocument/2006/relationships" xmlns:p1510="http://schemas.microsoft.com/office/powerpoint/2015/10/main">
+  <p1510:revLst>
+    <p1510:client id="{3120C776-606B-4AD1-8FEF-BC15473D7B81}" v="18" dt="2020-12-12T14:28:57.580"/>
+  </p1510:revLst>
+</p1510:revInfo>
+</file>
+
 <file path=ppt/changesInfos/changesInfo1.xml><?xml version="1.0" encoding="utf-8"?>
 <pc:chgInfo xmlns:a="http://schemas.openxmlformats.org/drawingml/2006/main" xmlns:r="http://schemas.openxmlformats.org/officeDocument/2006/relationships" xmlns:ac="http://schemas.microsoft.com/office/drawing/2013/main/command" xmlns:pc="http://schemas.microsoft.com/office/powerpoint/2013/main/command">
   <pc:docChgLst>
-    <pc:chgData name="Thomas Buchegger" userId="e9d10f62-fa07-4fc1-9248-edcb138c70e1" providerId="ADAL" clId="{E9D31AD9-BAB2-4385-AC4A-B20BBC9B1C1E}"/>
-    <pc:docChg chg="undo modSld">
-      <pc:chgData name="Thomas Buchegger" userId="e9d10f62-fa07-4fc1-9248-edcb138c70e1" providerId="ADAL" clId="{E9D31AD9-BAB2-4385-AC4A-B20BBC9B1C1E}" dt="2020-11-22T15:53:33.455" v="1" actId="732"/>
+    <pc:chgData name="Thomas Buchegger" userId="e9d10f62-fa07-4fc1-9248-edcb138c70e1" providerId="ADAL" clId="{3120C776-606B-4AD1-8FEF-BC15473D7B81}"/>
+    <pc:docChg chg="custSel addSld delSld modSld">
+      <pc:chgData name="Thomas Buchegger" userId="e9d10f62-fa07-4fc1-9248-edcb138c70e1" providerId="ADAL" clId="{3120C776-606B-4AD1-8FEF-BC15473D7B81}" dt="2020-12-12T14:29:20.611" v="339" actId="1076"/>
       <pc:docMkLst>
         <pc:docMk/>
       </pc:docMkLst>
       <pc:sldChg chg="modSp">
-        <pc:chgData name="Thomas Buchegger" userId="e9d10f62-fa07-4fc1-9248-edcb138c70e1" providerId="ADAL" clId="{E9D31AD9-BAB2-4385-AC4A-B20BBC9B1C1E}" dt="2020-11-22T15:53:33.455" v="1" actId="732"/>
+        <pc:chgData name="Thomas Buchegger" userId="e9d10f62-fa07-4fc1-9248-edcb138c70e1" providerId="ADAL" clId="{3120C776-606B-4AD1-8FEF-BC15473D7B81}" dt="2020-12-12T14:25:46.253" v="263" actId="20577"/>
         <pc:sldMkLst>
           <pc:docMk/>
-          <pc:sldMk cId="3711386085" sldId="317"/>
+          <pc:sldMk cId="69429724" sldId="307"/>
         </pc:sldMkLst>
-        <pc:picChg chg="mod modCrop">
-          <ac:chgData name="Thomas Buchegger" userId="e9d10f62-fa07-4fc1-9248-edcb138c70e1" providerId="ADAL" clId="{E9D31AD9-BAB2-4385-AC4A-B20BBC9B1C1E}" dt="2020-11-22T15:53:33.455" v="1" actId="732"/>
+        <pc:spChg chg="mod">
+          <ac:chgData name="Thomas Buchegger" userId="e9d10f62-fa07-4fc1-9248-edcb138c70e1" providerId="ADAL" clId="{3120C776-606B-4AD1-8FEF-BC15473D7B81}" dt="2020-12-12T14:25:46.253" v="263" actId="20577"/>
+          <ac:spMkLst>
+            <pc:docMk/>
+            <pc:sldMk cId="69429724" sldId="307"/>
+            <ac:spMk id="23" creationId="{22E2B98F-DA7C-448F-ACBF-3E4BCA2FF259}"/>
+          </ac:spMkLst>
+        </pc:spChg>
+        <pc:spChg chg="mod">
+          <ac:chgData name="Thomas Buchegger" userId="e9d10f62-fa07-4fc1-9248-edcb138c70e1" providerId="ADAL" clId="{3120C776-606B-4AD1-8FEF-BC15473D7B81}" dt="2020-12-12T11:10:06.887" v="18" actId="20577"/>
+          <ac:spMkLst>
+            <pc:docMk/>
+            <pc:sldMk cId="69429724" sldId="307"/>
+            <ac:spMk id="25" creationId="{1D96C830-14AA-41C9-95A1-E2DE662385B5}"/>
+          </ac:spMkLst>
+        </pc:spChg>
+      </pc:sldChg>
+      <pc:sldChg chg="addSp delSp modSp add">
+        <pc:chgData name="Thomas Buchegger" userId="e9d10f62-fa07-4fc1-9248-edcb138c70e1" providerId="ADAL" clId="{3120C776-606B-4AD1-8FEF-BC15473D7B81}" dt="2020-12-12T14:21:00.840" v="105" actId="1076"/>
+        <pc:sldMkLst>
+          <pc:docMk/>
+          <pc:sldMk cId="1690283129" sldId="320"/>
+        </pc:sldMkLst>
+        <pc:spChg chg="mod">
+          <ac:chgData name="Thomas Buchegger" userId="e9d10f62-fa07-4fc1-9248-edcb138c70e1" providerId="ADAL" clId="{3120C776-606B-4AD1-8FEF-BC15473D7B81}" dt="2020-12-12T14:20:24.088" v="95" actId="20577"/>
+          <ac:spMkLst>
+            <pc:docMk/>
+            <pc:sldMk cId="1690283129" sldId="320"/>
+            <ac:spMk id="2" creationId="{A197240E-0A12-4915-BFBD-9C4B18DA53B4}"/>
+          </ac:spMkLst>
+        </pc:spChg>
+        <pc:spChg chg="mod">
+          <ac:chgData name="Thomas Buchegger" userId="e9d10f62-fa07-4fc1-9248-edcb138c70e1" providerId="ADAL" clId="{3120C776-606B-4AD1-8FEF-BC15473D7B81}" dt="2020-12-12T14:20:07.036" v="71" actId="20577"/>
+          <ac:spMkLst>
+            <pc:docMk/>
+            <pc:sldMk cId="1690283129" sldId="320"/>
+            <ac:spMk id="3" creationId="{F8642BC2-16F8-4EB2-B0A4-04F8FFA9913F}"/>
+          </ac:spMkLst>
+        </pc:spChg>
+        <pc:spChg chg="del">
+          <ac:chgData name="Thomas Buchegger" userId="e9d10f62-fa07-4fc1-9248-edcb138c70e1" providerId="ADAL" clId="{3120C776-606B-4AD1-8FEF-BC15473D7B81}" dt="2020-12-12T14:20:31.040" v="96"/>
+          <ac:spMkLst>
+            <pc:docMk/>
+            <pc:sldMk cId="1690283129" sldId="320"/>
+            <ac:spMk id="4" creationId="{6FE86AC5-1D02-4640-82C8-5799DA9319B8}"/>
+          </ac:spMkLst>
+        </pc:spChg>
+        <pc:picChg chg="add mod">
+          <ac:chgData name="Thomas Buchegger" userId="e9d10f62-fa07-4fc1-9248-edcb138c70e1" providerId="ADAL" clId="{3120C776-606B-4AD1-8FEF-BC15473D7B81}" dt="2020-12-12T14:20:34.235" v="99" actId="962"/>
           <ac:picMkLst>
             <pc:docMk/>
-            <pc:sldMk cId="3711386085" sldId="317"/>
-            <ac:picMk id="5" creationId="{D3AF0D81-999E-4DAC-9965-522243208EFD}"/>
+            <pc:sldMk cId="1690283129" sldId="320"/>
+            <ac:picMk id="6" creationId="{67F5AF55-498C-4D1E-9007-54D85CF02C3E}"/>
           </ac:picMkLst>
         </pc:picChg>
+        <pc:picChg chg="add mod">
+          <ac:chgData name="Thomas Buchegger" userId="e9d10f62-fa07-4fc1-9248-edcb138c70e1" providerId="ADAL" clId="{3120C776-606B-4AD1-8FEF-BC15473D7B81}" dt="2020-12-12T14:21:00.840" v="105" actId="1076"/>
+          <ac:picMkLst>
+            <pc:docMk/>
+            <pc:sldMk cId="1690283129" sldId="320"/>
+            <ac:picMk id="8" creationId="{C43DB024-B304-4223-9193-5DEF2EE59902}"/>
+          </ac:picMkLst>
+        </pc:picChg>
+      </pc:sldChg>
+      <pc:sldChg chg="addSp delSp modSp add del">
+        <pc:chgData name="Thomas Buchegger" userId="e9d10f62-fa07-4fc1-9248-edcb138c70e1" providerId="ADAL" clId="{3120C776-606B-4AD1-8FEF-BC15473D7B81}" dt="2020-12-12T11:12:10.717" v="49" actId="2696"/>
+        <pc:sldMkLst>
+          <pc:docMk/>
+          <pc:sldMk cId="3166883915" sldId="320"/>
+        </pc:sldMkLst>
+        <pc:spChg chg="del">
+          <ac:chgData name="Thomas Buchegger" userId="e9d10f62-fa07-4fc1-9248-edcb138c70e1" providerId="ADAL" clId="{3120C776-606B-4AD1-8FEF-BC15473D7B81}" dt="2020-12-12T11:10:37.614" v="36" actId="478"/>
+          <ac:spMkLst>
+            <pc:docMk/>
+            <pc:sldMk cId="3166883915" sldId="320"/>
+            <ac:spMk id="2" creationId="{CC98D3FB-14FC-496D-83EC-E08E626FC744}"/>
+          </ac:spMkLst>
+        </pc:spChg>
+        <pc:spChg chg="del">
+          <ac:chgData name="Thomas Buchegger" userId="e9d10f62-fa07-4fc1-9248-edcb138c70e1" providerId="ADAL" clId="{3120C776-606B-4AD1-8FEF-BC15473D7B81}" dt="2020-12-12T11:10:36.809" v="35" actId="478"/>
+          <ac:spMkLst>
+            <pc:docMk/>
+            <pc:sldMk cId="3166883915" sldId="320"/>
+            <ac:spMk id="3" creationId="{757ADAED-314F-4A4D-9DAB-616E7975CBBC}"/>
+          </ac:spMkLst>
+        </pc:spChg>
+        <pc:spChg chg="del">
+          <ac:chgData name="Thomas Buchegger" userId="e9d10f62-fa07-4fc1-9248-edcb138c70e1" providerId="ADAL" clId="{3120C776-606B-4AD1-8FEF-BC15473D7B81}" dt="2020-12-12T11:10:38.518" v="37" actId="478"/>
+          <ac:spMkLst>
+            <pc:docMk/>
+            <pc:sldMk cId="3166883915" sldId="320"/>
+            <ac:spMk id="4" creationId="{6CD4FE2C-7BB1-4039-8D14-FC47C9AC5829}"/>
+          </ac:spMkLst>
+        </pc:spChg>
+        <pc:picChg chg="add del mod modCrop">
+          <ac:chgData name="Thomas Buchegger" userId="e9d10f62-fa07-4fc1-9248-edcb138c70e1" providerId="ADAL" clId="{3120C776-606B-4AD1-8FEF-BC15473D7B81}" dt="2020-12-12T11:12:07.025" v="48" actId="478"/>
+          <ac:picMkLst>
+            <pc:docMk/>
+            <pc:sldMk cId="3166883915" sldId="320"/>
+            <ac:picMk id="6" creationId="{F6CFD4EC-4352-4CA0-9F7A-2CE9EF9A26DA}"/>
+          </ac:picMkLst>
+        </pc:picChg>
+      </pc:sldChg>
+      <pc:sldChg chg="addSp delSp modSp add">
+        <pc:chgData name="Thomas Buchegger" userId="e9d10f62-fa07-4fc1-9248-edcb138c70e1" providerId="ADAL" clId="{3120C776-606B-4AD1-8FEF-BC15473D7B81}" dt="2020-12-12T14:22:07.018" v="122" actId="1076"/>
+        <pc:sldMkLst>
+          <pc:docMk/>
+          <pc:sldMk cId="982483946" sldId="321"/>
+        </pc:sldMkLst>
+        <pc:spChg chg="mod">
+          <ac:chgData name="Thomas Buchegger" userId="e9d10f62-fa07-4fc1-9248-edcb138c70e1" providerId="ADAL" clId="{3120C776-606B-4AD1-8FEF-BC15473D7B81}" dt="2020-12-12T14:21:28.407" v="115" actId="20577"/>
+          <ac:spMkLst>
+            <pc:docMk/>
+            <pc:sldMk cId="982483946" sldId="321"/>
+            <ac:spMk id="2" creationId="{A197240E-0A12-4915-BFBD-9C4B18DA53B4}"/>
+          </ac:spMkLst>
+        </pc:spChg>
+        <pc:picChg chg="add mod">
+          <ac:chgData name="Thomas Buchegger" userId="e9d10f62-fa07-4fc1-9248-edcb138c70e1" providerId="ADAL" clId="{3120C776-606B-4AD1-8FEF-BC15473D7B81}" dt="2020-12-12T14:22:07.018" v="122" actId="1076"/>
+          <ac:picMkLst>
+            <pc:docMk/>
+            <pc:sldMk cId="982483946" sldId="321"/>
+            <ac:picMk id="5" creationId="{29D561D7-1944-42FF-8C4E-2EA5111E8FE5}"/>
+          </ac:picMkLst>
+        </pc:picChg>
+        <pc:picChg chg="del">
+          <ac:chgData name="Thomas Buchegger" userId="e9d10f62-fa07-4fc1-9248-edcb138c70e1" providerId="ADAL" clId="{3120C776-606B-4AD1-8FEF-BC15473D7B81}" dt="2020-12-12T14:21:31.720" v="116" actId="478"/>
+          <ac:picMkLst>
+            <pc:docMk/>
+            <pc:sldMk cId="982483946" sldId="321"/>
+            <ac:picMk id="8" creationId="{C43DB024-B304-4223-9193-5DEF2EE59902}"/>
+          </ac:picMkLst>
+        </pc:picChg>
+      </pc:sldChg>
+      <pc:sldChg chg="add del">
+        <pc:chgData name="Thomas Buchegger" userId="e9d10f62-fa07-4fc1-9248-edcb138c70e1" providerId="ADAL" clId="{3120C776-606B-4AD1-8FEF-BC15473D7B81}" dt="2020-12-12T14:21:11.416" v="107" actId="2696"/>
+        <pc:sldMkLst>
+          <pc:docMk/>
+          <pc:sldMk cId="3296292100" sldId="321"/>
+        </pc:sldMkLst>
+      </pc:sldChg>
+      <pc:sldChg chg="addSp delSp modSp add">
+        <pc:chgData name="Thomas Buchegger" userId="e9d10f62-fa07-4fc1-9248-edcb138c70e1" providerId="ADAL" clId="{3120C776-606B-4AD1-8FEF-BC15473D7B81}" dt="2020-12-12T14:22:53.330" v="136" actId="1076"/>
+        <pc:sldMkLst>
+          <pc:docMk/>
+          <pc:sldMk cId="173124273" sldId="322"/>
+        </pc:sldMkLst>
+        <pc:spChg chg="mod">
+          <ac:chgData name="Thomas Buchegger" userId="e9d10f62-fa07-4fc1-9248-edcb138c70e1" providerId="ADAL" clId="{3120C776-606B-4AD1-8FEF-BC15473D7B81}" dt="2020-12-12T14:22:24.046" v="128" actId="20577"/>
+          <ac:spMkLst>
+            <pc:docMk/>
+            <pc:sldMk cId="173124273" sldId="322"/>
+            <ac:spMk id="2" creationId="{A197240E-0A12-4915-BFBD-9C4B18DA53B4}"/>
+          </ac:spMkLst>
+        </pc:spChg>
+        <pc:picChg chg="add mod">
+          <ac:chgData name="Thomas Buchegger" userId="e9d10f62-fa07-4fc1-9248-edcb138c70e1" providerId="ADAL" clId="{3120C776-606B-4AD1-8FEF-BC15473D7B81}" dt="2020-12-12T14:22:53.330" v="136" actId="1076"/>
+          <ac:picMkLst>
+            <pc:docMk/>
+            <pc:sldMk cId="173124273" sldId="322"/>
+            <ac:picMk id="5" creationId="{8D251A62-8BD1-4863-9249-5712608D8D8C}"/>
+          </ac:picMkLst>
+        </pc:picChg>
+        <pc:picChg chg="del">
+          <ac:chgData name="Thomas Buchegger" userId="e9d10f62-fa07-4fc1-9248-edcb138c70e1" providerId="ADAL" clId="{3120C776-606B-4AD1-8FEF-BC15473D7B81}" dt="2020-12-12T14:22:27.070" v="129" actId="478"/>
+          <ac:picMkLst>
+            <pc:docMk/>
+            <pc:sldMk cId="173124273" sldId="322"/>
+            <ac:picMk id="8" creationId="{C43DB024-B304-4223-9193-5DEF2EE59902}"/>
+          </ac:picMkLst>
+        </pc:picChg>
+      </pc:sldChg>
+      <pc:sldChg chg="addSp delSp modSp add">
+        <pc:chgData name="Thomas Buchegger" userId="e9d10f62-fa07-4fc1-9248-edcb138c70e1" providerId="ADAL" clId="{3120C776-606B-4AD1-8FEF-BC15473D7B81}" dt="2020-12-12T14:29:20.611" v="339" actId="1076"/>
+        <pc:sldMkLst>
+          <pc:docMk/>
+          <pc:sldMk cId="4002181805" sldId="323"/>
+        </pc:sldMkLst>
+        <pc:spChg chg="mod">
+          <ac:chgData name="Thomas Buchegger" userId="e9d10f62-fa07-4fc1-9248-edcb138c70e1" providerId="ADAL" clId="{3120C776-606B-4AD1-8FEF-BC15473D7B81}" dt="2020-12-12T14:25:26.464" v="195" actId="20577"/>
+          <ac:spMkLst>
+            <pc:docMk/>
+            <pc:sldMk cId="4002181805" sldId="323"/>
+            <ac:spMk id="2" creationId="{A197240E-0A12-4915-BFBD-9C4B18DA53B4}"/>
+          </ac:spMkLst>
+        </pc:spChg>
+        <pc:picChg chg="add del mod">
+          <ac:chgData name="Thomas Buchegger" userId="e9d10f62-fa07-4fc1-9248-edcb138c70e1" providerId="ADAL" clId="{3120C776-606B-4AD1-8FEF-BC15473D7B81}" dt="2020-12-12T14:28:54.533" v="333" actId="478"/>
+          <ac:picMkLst>
+            <pc:docMk/>
+            <pc:sldMk cId="4002181805" sldId="323"/>
+            <ac:picMk id="5" creationId="{64F495D5-7F24-4A48-961E-A1AC53ACB3D2}"/>
+          </ac:picMkLst>
+        </pc:picChg>
+        <pc:picChg chg="add mod">
+          <ac:chgData name="Thomas Buchegger" userId="e9d10f62-fa07-4fc1-9248-edcb138c70e1" providerId="ADAL" clId="{3120C776-606B-4AD1-8FEF-BC15473D7B81}" dt="2020-12-12T14:29:20.611" v="339" actId="1076"/>
+          <ac:picMkLst>
+            <pc:docMk/>
+            <pc:sldMk cId="4002181805" sldId="323"/>
+            <ac:picMk id="7" creationId="{B35DA1B4-148A-4604-BEF3-0BA84C3D78FE}"/>
+          </ac:picMkLst>
+        </pc:picChg>
+        <pc:picChg chg="del">
+          <ac:chgData name="Thomas Buchegger" userId="e9d10f62-fa07-4fc1-9248-edcb138c70e1" providerId="ADAL" clId="{3120C776-606B-4AD1-8FEF-BC15473D7B81}" dt="2020-12-12T14:23:17.789" v="155" actId="478"/>
+          <ac:picMkLst>
+            <pc:docMk/>
+            <pc:sldMk cId="4002181805" sldId="323"/>
+            <ac:picMk id="8" creationId="{C43DB024-B304-4223-9193-5DEF2EE59902}"/>
+          </ac:picMkLst>
+        </pc:picChg>
+      </pc:sldChg>
+      <pc:sldChg chg="addSp delSp modSp add">
+        <pc:chgData name="Thomas Buchegger" userId="e9d10f62-fa07-4fc1-9248-edcb138c70e1" providerId="ADAL" clId="{3120C776-606B-4AD1-8FEF-BC15473D7B81}" dt="2020-12-12T14:24:16.194" v="179" actId="1076"/>
+        <pc:sldMkLst>
+          <pc:docMk/>
+          <pc:sldMk cId="3740360723" sldId="324"/>
+        </pc:sldMkLst>
+        <pc:spChg chg="mod">
+          <ac:chgData name="Thomas Buchegger" userId="e9d10f62-fa07-4fc1-9248-edcb138c70e1" providerId="ADAL" clId="{3120C776-606B-4AD1-8FEF-BC15473D7B81}" dt="2020-12-12T14:23:50.134" v="172" actId="20577"/>
+          <ac:spMkLst>
+            <pc:docMk/>
+            <pc:sldMk cId="3740360723" sldId="324"/>
+            <ac:spMk id="2" creationId="{A197240E-0A12-4915-BFBD-9C4B18DA53B4}"/>
+          </ac:spMkLst>
+        </pc:spChg>
+        <pc:picChg chg="add mod">
+          <ac:chgData name="Thomas Buchegger" userId="e9d10f62-fa07-4fc1-9248-edcb138c70e1" providerId="ADAL" clId="{3120C776-606B-4AD1-8FEF-BC15473D7B81}" dt="2020-12-12T14:24:16.194" v="179" actId="1076"/>
+          <ac:picMkLst>
+            <pc:docMk/>
+            <pc:sldMk cId="3740360723" sldId="324"/>
+            <ac:picMk id="5" creationId="{D0E8F932-E933-4E92-B5C0-26A6AC333A95}"/>
+          </ac:picMkLst>
+        </pc:picChg>
+        <pc:picChg chg="del">
+          <ac:chgData name="Thomas Buchegger" userId="e9d10f62-fa07-4fc1-9248-edcb138c70e1" providerId="ADAL" clId="{3120C776-606B-4AD1-8FEF-BC15473D7B81}" dt="2020-12-12T14:23:53.101" v="173" actId="478"/>
+          <ac:picMkLst>
+            <pc:docMk/>
+            <pc:sldMk cId="3740360723" sldId="324"/>
+            <ac:picMk id="8" creationId="{C43DB024-B304-4223-9193-5DEF2EE59902}"/>
+          </ac:picMkLst>
+        </pc:picChg>
+      </pc:sldChg>
+      <pc:sldChg chg="addSp delSp modSp add">
+        <pc:chgData name="Thomas Buchegger" userId="e9d10f62-fa07-4fc1-9248-edcb138c70e1" providerId="ADAL" clId="{3120C776-606B-4AD1-8FEF-BC15473D7B81}" dt="2020-12-12T14:24:47.127" v="193" actId="1076"/>
+        <pc:sldMkLst>
+          <pc:docMk/>
+          <pc:sldMk cId="1269174725" sldId="325"/>
+        </pc:sldMkLst>
+        <pc:spChg chg="mod">
+          <ac:chgData name="Thomas Buchegger" userId="e9d10f62-fa07-4fc1-9248-edcb138c70e1" providerId="ADAL" clId="{3120C776-606B-4AD1-8FEF-BC15473D7B81}" dt="2020-12-12T14:24:24.950" v="186" actId="20577"/>
+          <ac:spMkLst>
+            <pc:docMk/>
+            <pc:sldMk cId="1269174725" sldId="325"/>
+            <ac:spMk id="2" creationId="{A197240E-0A12-4915-BFBD-9C4B18DA53B4}"/>
+          </ac:spMkLst>
+        </pc:spChg>
+        <pc:picChg chg="del">
+          <ac:chgData name="Thomas Buchegger" userId="e9d10f62-fa07-4fc1-9248-edcb138c70e1" providerId="ADAL" clId="{3120C776-606B-4AD1-8FEF-BC15473D7B81}" dt="2020-12-12T14:24:27.637" v="187" actId="478"/>
+          <ac:picMkLst>
+            <pc:docMk/>
+            <pc:sldMk cId="1269174725" sldId="325"/>
+            <ac:picMk id="5" creationId="{D0E8F932-E933-4E92-B5C0-26A6AC333A95}"/>
+          </ac:picMkLst>
+        </pc:picChg>
+        <pc:picChg chg="add mod">
+          <ac:chgData name="Thomas Buchegger" userId="e9d10f62-fa07-4fc1-9248-edcb138c70e1" providerId="ADAL" clId="{3120C776-606B-4AD1-8FEF-BC15473D7B81}" dt="2020-12-12T14:24:47.127" v="193" actId="1076"/>
+          <ac:picMkLst>
+            <pc:docMk/>
+            <pc:sldMk cId="1269174725" sldId="325"/>
+            <ac:picMk id="7" creationId="{5E2341CA-4E6A-4180-98D5-EE47B818C72E}"/>
+          </ac:picMkLst>
+        </pc:picChg>
+      </pc:sldChg>
+      <pc:sldChg chg="modSp add">
+        <pc:chgData name="Thomas Buchegger" userId="e9d10f62-fa07-4fc1-9248-edcb138c70e1" providerId="ADAL" clId="{3120C776-606B-4AD1-8FEF-BC15473D7B81}" dt="2020-12-12T14:26:34.287" v="332" actId="5793"/>
+        <pc:sldMkLst>
+          <pc:docMk/>
+          <pc:sldMk cId="1499650226" sldId="326"/>
+        </pc:sldMkLst>
+        <pc:spChg chg="mod">
+          <ac:chgData name="Thomas Buchegger" userId="e9d10f62-fa07-4fc1-9248-edcb138c70e1" providerId="ADAL" clId="{3120C776-606B-4AD1-8FEF-BC15473D7B81}" dt="2020-12-12T14:26:08.312" v="292" actId="20577"/>
+          <ac:spMkLst>
+            <pc:docMk/>
+            <pc:sldMk cId="1499650226" sldId="326"/>
+            <ac:spMk id="2" creationId="{96D1BFF3-C1F6-4B38-8809-F23DDD618586}"/>
+          </ac:spMkLst>
+        </pc:spChg>
+        <pc:spChg chg="mod">
+          <ac:chgData name="Thomas Buchegger" userId="e9d10f62-fa07-4fc1-9248-edcb138c70e1" providerId="ADAL" clId="{3120C776-606B-4AD1-8FEF-BC15473D7B81}" dt="2020-12-12T14:26:00.188" v="271" actId="20577"/>
+          <ac:spMkLst>
+            <pc:docMk/>
+            <pc:sldMk cId="1499650226" sldId="326"/>
+            <ac:spMk id="3" creationId="{A6A37433-1981-4B43-A78D-DA6596F582E2}"/>
+          </ac:spMkLst>
+        </pc:spChg>
+        <pc:spChg chg="mod">
+          <ac:chgData name="Thomas Buchegger" userId="e9d10f62-fa07-4fc1-9248-edcb138c70e1" providerId="ADAL" clId="{3120C776-606B-4AD1-8FEF-BC15473D7B81}" dt="2020-12-12T14:26:34.287" v="332" actId="5793"/>
+          <ac:spMkLst>
+            <pc:docMk/>
+            <pc:sldMk cId="1499650226" sldId="326"/>
+            <ac:spMk id="4" creationId="{5CD2D246-75A5-49B1-933A-34A6CBB3717A}"/>
+          </ac:spMkLst>
+        </pc:spChg>
       </pc:sldChg>
     </pc:docChg>
   </pc:docChgLst>
@@ -181,6 +491,30 @@
             <ac:graphicFrameMk id="7" creationId="{66214EDC-0B40-4313-9D72-1122ED4D7264}"/>
           </ac:graphicFrameMkLst>
         </pc:graphicFrameChg>
+      </pc:sldChg>
+    </pc:docChg>
+  </pc:docChgLst>
+  <pc:docChgLst>
+    <pc:chgData name="Thomas Buchegger" userId="e9d10f62-fa07-4fc1-9248-edcb138c70e1" providerId="ADAL" clId="{E9D31AD9-BAB2-4385-AC4A-B20BBC9B1C1E}"/>
+    <pc:docChg chg="undo modSld">
+      <pc:chgData name="Thomas Buchegger" userId="e9d10f62-fa07-4fc1-9248-edcb138c70e1" providerId="ADAL" clId="{E9D31AD9-BAB2-4385-AC4A-B20BBC9B1C1E}" dt="2020-11-22T15:53:33.455" v="1" actId="732"/>
+      <pc:docMkLst>
+        <pc:docMk/>
+      </pc:docMkLst>
+      <pc:sldChg chg="modSp">
+        <pc:chgData name="Thomas Buchegger" userId="e9d10f62-fa07-4fc1-9248-edcb138c70e1" providerId="ADAL" clId="{E9D31AD9-BAB2-4385-AC4A-B20BBC9B1C1E}" dt="2020-11-22T15:53:33.455" v="1" actId="732"/>
+        <pc:sldMkLst>
+          <pc:docMk/>
+          <pc:sldMk cId="3711386085" sldId="317"/>
+        </pc:sldMkLst>
+        <pc:picChg chg="mod modCrop">
+          <ac:chgData name="Thomas Buchegger" userId="e9d10f62-fa07-4fc1-9248-edcb138c70e1" providerId="ADAL" clId="{E9D31AD9-BAB2-4385-AC4A-B20BBC9B1C1E}" dt="2020-11-22T15:53:33.455" v="1" actId="732"/>
+          <ac:picMkLst>
+            <pc:docMk/>
+            <pc:sldMk cId="3711386085" sldId="317"/>
+            <ac:picMk id="5" creationId="{D3AF0D81-999E-4DAC-9965-522243208EFD}"/>
+          </ac:picMkLst>
+        </pc:picChg>
       </pc:sldChg>
     </pc:docChg>
   </pc:docChgLst>
@@ -710,7 +1044,7 @@
                 <a:cs typeface="+mn-cs"/>
               </a:defRPr>
             </a:pPr>
-            <a:endParaRPr lang="de-DE"/>
+            <a:endParaRPr lang="en-US"/>
           </a:p>
         </c:txPr>
         <c:crossAx val="454307336"/>
@@ -792,7 +1126,7 @@
                   <a:cs typeface="+mn-cs"/>
                 </a:defRPr>
               </a:pPr>
-              <a:endParaRPr lang="de-DE"/>
+              <a:endParaRPr lang="en-US"/>
             </a:p>
           </c:txPr>
         </c:title>
@@ -824,7 +1158,7 @@
                 <a:cs typeface="+mn-cs"/>
               </a:defRPr>
             </a:pPr>
-            <a:endParaRPr lang="de-DE"/>
+            <a:endParaRPr lang="en-US"/>
           </a:p>
         </c:txPr>
         <c:crossAx val="454309632"/>
@@ -866,7 +1200,7 @@
               <a:cs typeface="+mn-cs"/>
             </a:defRPr>
           </a:pPr>
-          <a:endParaRPr lang="de-DE"/>
+          <a:endParaRPr lang="en-US"/>
         </a:p>
       </c:txPr>
     </c:legend>
@@ -895,7 +1229,7 @@
       <a:pPr>
         <a:defRPr/>
       </a:pPr>
-      <a:endParaRPr lang="de-DE"/>
+      <a:endParaRPr lang="en-US"/>
     </a:p>
   </c:txPr>
   <c:externalData r:id="rId3">
@@ -1575,7 +1909,7 @@
                 <a:cs typeface="+mn-cs"/>
               </a:defRPr>
             </a:pPr>
-            <a:endParaRPr lang="de-DE"/>
+            <a:endParaRPr lang="en-US"/>
           </a:p>
         </c:txPr>
         <c:crossAx val="454307336"/>
@@ -1667,7 +2001,7 @@
                   <a:cs typeface="+mn-cs"/>
                 </a:defRPr>
               </a:pPr>
-              <a:endParaRPr lang="de-DE"/>
+              <a:endParaRPr lang="en-US"/>
             </a:p>
           </c:txPr>
         </c:title>
@@ -1696,7 +2030,7 @@
                 <a:cs typeface="+mn-cs"/>
               </a:defRPr>
             </a:pPr>
-            <a:endParaRPr lang="de-DE"/>
+            <a:endParaRPr lang="en-US"/>
           </a:p>
         </c:txPr>
         <c:crossAx val="454309632"/>
@@ -1738,7 +2072,7 @@
               <a:cs typeface="+mn-cs"/>
             </a:defRPr>
           </a:pPr>
-          <a:endParaRPr lang="de-DE"/>
+          <a:endParaRPr lang="en-US"/>
         </a:p>
       </c:txPr>
     </c:legend>
@@ -1774,7 +2108,7 @@
           <a:cs typeface="+mn-cs"/>
         </a:defRPr>
       </a:pPr>
-      <a:endParaRPr lang="de-DE"/>
+      <a:endParaRPr lang="en-US"/>
     </a:p>
   </c:txPr>
   <c:externalData r:id="rId3">
@@ -2282,7 +2616,7 @@
                 <a:cs typeface="+mn-cs"/>
               </a:defRPr>
             </a:pPr>
-            <a:endParaRPr lang="de-DE"/>
+            <a:endParaRPr lang="en-US"/>
           </a:p>
         </c:txPr>
         <c:crossAx val="454307336"/>
@@ -2374,7 +2708,7 @@
                   <a:cs typeface="+mn-cs"/>
                 </a:defRPr>
               </a:pPr>
-              <a:endParaRPr lang="de-DE"/>
+              <a:endParaRPr lang="en-US"/>
             </a:p>
           </c:txPr>
         </c:title>
@@ -2406,7 +2740,7 @@
                 <a:cs typeface="+mn-cs"/>
               </a:defRPr>
             </a:pPr>
-            <a:endParaRPr lang="de-DE"/>
+            <a:endParaRPr lang="en-US"/>
           </a:p>
         </c:txPr>
         <c:crossAx val="454309632"/>
@@ -2448,7 +2782,7 @@
               <a:cs typeface="+mn-cs"/>
             </a:defRPr>
           </a:pPr>
-          <a:endParaRPr lang="de-DE"/>
+          <a:endParaRPr lang="en-US"/>
         </a:p>
       </c:txPr>
     </c:legend>
@@ -2477,7 +2811,7 @@
       <a:pPr>
         <a:defRPr/>
       </a:pPr>
-      <a:endParaRPr lang="de-DE"/>
+      <a:endParaRPr lang="en-US"/>
     </a:p>
   </c:txPr>
   <c:externalData r:id="rId3">
@@ -3157,7 +3491,7 @@
                 <a:cs typeface="+mn-cs"/>
               </a:defRPr>
             </a:pPr>
-            <a:endParaRPr lang="de-DE"/>
+            <a:endParaRPr lang="en-US"/>
           </a:p>
         </c:txPr>
         <c:crossAx val="454307336"/>
@@ -3249,7 +3583,7 @@
                   <a:cs typeface="+mn-cs"/>
                 </a:defRPr>
               </a:pPr>
-              <a:endParaRPr lang="de-DE"/>
+              <a:endParaRPr lang="en-US"/>
             </a:p>
           </c:txPr>
         </c:title>
@@ -3278,7 +3612,7 @@
                 <a:cs typeface="+mn-cs"/>
               </a:defRPr>
             </a:pPr>
-            <a:endParaRPr lang="de-DE"/>
+            <a:endParaRPr lang="en-US"/>
           </a:p>
         </c:txPr>
         <c:crossAx val="454309632"/>
@@ -3320,7 +3654,7 @@
               <a:cs typeface="+mn-cs"/>
             </a:defRPr>
           </a:pPr>
-          <a:endParaRPr lang="de-DE"/>
+          <a:endParaRPr lang="en-US"/>
         </a:p>
       </c:txPr>
     </c:legend>
@@ -3356,7 +3690,7 @@
           <a:cs typeface="+mn-cs"/>
         </a:defRPr>
       </a:pPr>
-      <a:endParaRPr lang="de-DE"/>
+      <a:endParaRPr lang="en-US"/>
     </a:p>
   </c:txPr>
   <c:externalData r:id="rId3">
@@ -5631,7 +5965,7 @@
           <a:p>
             <a:fld id="{A70AE70C-D509-4E4B-9352-79C3D11520D1}" type="datetimeFigureOut">
               <a:rPr lang="de-DE" smtClean="0"/>
-              <a:t>07.12.2020</a:t>
+              <a:t>12.12.2020</a:t>
             </a:fld>
             <a:endParaRPr lang="de-DE"/>
           </a:p>
@@ -5809,7 +6143,7 @@
           <a:p>
             <a:fld id="{B77602DA-7CEE-4298-AF4B-1C87D65BAB06}" type="datetimeFigureOut">
               <a:rPr lang="de-CH" smtClean="0"/>
-              <a:t>07.12.2020</a:t>
+              <a:t>12.12.2020</a:t>
             </a:fld>
             <a:endParaRPr lang="de-CH" dirty="0"/>
           </a:p>
@@ -17570,6 +17904,1232 @@
       </p:grpSpPr>
       <p:sp>
         <p:nvSpPr>
+          <p:cNvPr id="2" name="Textplatzhalter 1">
+            <a:extLst>
+              <a:ext uri="{FF2B5EF4-FFF2-40B4-BE49-F238E27FC236}">
+                <a16:creationId xmlns:a16="http://schemas.microsoft.com/office/drawing/2014/main" id="{A197240E-0A12-4915-BFBD-9C4B18DA53B4}"/>
+              </a:ext>
+            </a:extLst>
+          </p:cNvPr>
+          <p:cNvSpPr>
+            <a:spLocks noGrp="1"/>
+          </p:cNvSpPr>
+          <p:nvPr>
+            <p:ph type="body" idx="11"/>
+          </p:nvPr>
+        </p:nvSpPr>
+        <p:spPr/>
+        <p:txBody>
+          <a:bodyPr/>
+          <a:lstStyle/>
+          <a:p>
+            <a:r>
+              <a:rPr lang="de-CH" dirty="0" err="1"/>
+              <a:t>No</a:t>
+            </a:r>
+            <a:r>
+              <a:rPr lang="de-CH" dirty="0"/>
+              <a:t> </a:t>
+            </a:r>
+            <a:r>
+              <a:rPr lang="de-CH" dirty="0" err="1"/>
+              <a:t>Normalization</a:t>
+            </a:r>
+            <a:r>
+              <a:rPr lang="de-CH" dirty="0"/>
+              <a:t> vs. FCM</a:t>
+            </a:r>
+            <a:endParaRPr lang="en-GB" dirty="0"/>
+          </a:p>
+        </p:txBody>
+      </p:sp>
+      <p:sp>
+        <p:nvSpPr>
+          <p:cNvPr id="3" name="Titel 2">
+            <a:extLst>
+              <a:ext uri="{FF2B5EF4-FFF2-40B4-BE49-F238E27FC236}">
+                <a16:creationId xmlns:a16="http://schemas.microsoft.com/office/drawing/2014/main" id="{F8642BC2-16F8-4EB2-B0A4-04F8FFA9913F}"/>
+              </a:ext>
+            </a:extLst>
+          </p:cNvPr>
+          <p:cNvSpPr>
+            <a:spLocks noGrp="1"/>
+          </p:cNvSpPr>
+          <p:nvPr>
+            <p:ph type="title"/>
+          </p:nvPr>
+        </p:nvSpPr>
+        <p:spPr/>
+        <p:txBody>
+          <a:bodyPr/>
+          <a:lstStyle/>
+          <a:p>
+            <a:r>
+              <a:rPr lang="de-CH" dirty="0" err="1"/>
+              <a:t>Results</a:t>
+            </a:r>
+            <a:endParaRPr lang="en-GB" dirty="0"/>
+          </a:p>
+        </p:txBody>
+      </p:sp>
+      <p:pic>
+        <p:nvPicPr>
+          <p:cNvPr id="6" name="Inhaltsplatzhalter 5" descr="Ein Bild, das Blume enthält.&#10;&#10;Automatisch generierte Beschreibung">
+            <a:extLst>
+              <a:ext uri="{FF2B5EF4-FFF2-40B4-BE49-F238E27FC236}">
+                <a16:creationId xmlns:a16="http://schemas.microsoft.com/office/drawing/2014/main" id="{67F5AF55-498C-4D1E-9007-54D85CF02C3E}"/>
+              </a:ext>
+            </a:extLst>
+          </p:cNvPr>
+          <p:cNvPicPr>
+            <a:picLocks noGrp="1" noChangeAspect="1"/>
+          </p:cNvPicPr>
+          <p:nvPr>
+            <p:ph idx="1"/>
+          </p:nvPr>
+        </p:nvPicPr>
+        <p:blipFill>
+          <a:blip r:embed="rId2">
+            <a:extLst>
+              <a:ext uri="{28A0092B-C50C-407E-A947-70E740481C1C}">
+                <a14:useLocalDpi xmlns:a14="http://schemas.microsoft.com/office/drawing/2010/main" val="0"/>
+              </a:ext>
+            </a:extLst>
+          </a:blip>
+          <a:stretch>
+            <a:fillRect/>
+          </a:stretch>
+        </p:blipFill>
+        <p:spPr>
+          <a:xfrm>
+            <a:off x="540000" y="1191709"/>
+            <a:ext cx="3538114" cy="3527425"/>
+          </a:xfrm>
+        </p:spPr>
+      </p:pic>
+      <p:pic>
+        <p:nvPicPr>
+          <p:cNvPr id="8" name="Grafik 7" descr="Ein Bild, das Blume enthält.&#10;&#10;Automatisch generierte Beschreibung">
+            <a:extLst>
+              <a:ext uri="{FF2B5EF4-FFF2-40B4-BE49-F238E27FC236}">
+                <a16:creationId xmlns:a16="http://schemas.microsoft.com/office/drawing/2014/main" id="{C43DB024-B304-4223-9193-5DEF2EE59902}"/>
+              </a:ext>
+            </a:extLst>
+          </p:cNvPr>
+          <p:cNvPicPr>
+            <a:picLocks noChangeAspect="1"/>
+          </p:cNvPicPr>
+          <p:nvPr/>
+        </p:nvPicPr>
+        <p:blipFill>
+          <a:blip r:embed="rId3">
+            <a:extLst>
+              <a:ext uri="{28A0092B-C50C-407E-A947-70E740481C1C}">
+                <a14:useLocalDpi xmlns:a14="http://schemas.microsoft.com/office/drawing/2010/main" val="0"/>
+              </a:ext>
+            </a:extLst>
+          </a:blip>
+          <a:stretch>
+            <a:fillRect/>
+          </a:stretch>
+        </p:blipFill>
+        <p:spPr>
+          <a:xfrm>
+            <a:off x="5065888" y="1191709"/>
+            <a:ext cx="3538114" cy="3527425"/>
+          </a:xfrm>
+          <a:prstGeom prst="rect">
+            <a:avLst/>
+          </a:prstGeom>
+        </p:spPr>
+      </p:pic>
+    </p:spTree>
+    <p:extLst>
+      <p:ext uri="{BB962C8B-B14F-4D97-AF65-F5344CB8AC3E}">
+        <p14:creationId xmlns:p14="http://schemas.microsoft.com/office/powerpoint/2010/main" val="1690283129"/>
+      </p:ext>
+    </p:extLst>
+  </p:cSld>
+  <p:clrMapOvr>
+    <a:masterClrMapping/>
+  </p:clrMapOvr>
+</p:sld>
+</file>
+
+<file path=ppt/slides/slide12.xml><?xml version="1.0" encoding="utf-8"?>
+<p:sld xmlns:a="http://schemas.openxmlformats.org/drawingml/2006/main" xmlns:r="http://schemas.openxmlformats.org/officeDocument/2006/relationships" xmlns:p="http://schemas.openxmlformats.org/presentationml/2006/main">
+  <p:cSld>
+    <p:spTree>
+      <p:nvGrpSpPr>
+        <p:cNvPr id="1" name=""/>
+        <p:cNvGrpSpPr/>
+        <p:nvPr/>
+      </p:nvGrpSpPr>
+      <p:grpSpPr>
+        <a:xfrm>
+          <a:off x="0" y="0"/>
+          <a:ext cx="0" cy="0"/>
+          <a:chOff x="0" y="0"/>
+          <a:chExt cx="0" cy="0"/>
+        </a:xfrm>
+      </p:grpSpPr>
+      <p:sp>
+        <p:nvSpPr>
+          <p:cNvPr id="2" name="Textplatzhalter 1">
+            <a:extLst>
+              <a:ext uri="{FF2B5EF4-FFF2-40B4-BE49-F238E27FC236}">
+                <a16:creationId xmlns:a16="http://schemas.microsoft.com/office/drawing/2014/main" id="{A197240E-0A12-4915-BFBD-9C4B18DA53B4}"/>
+              </a:ext>
+            </a:extLst>
+          </p:cNvPr>
+          <p:cNvSpPr>
+            <a:spLocks noGrp="1"/>
+          </p:cNvSpPr>
+          <p:nvPr>
+            <p:ph type="body" idx="11"/>
+          </p:nvPr>
+        </p:nvSpPr>
+        <p:spPr/>
+        <p:txBody>
+          <a:bodyPr/>
+          <a:lstStyle/>
+          <a:p>
+            <a:r>
+              <a:rPr lang="de-CH" dirty="0" err="1"/>
+              <a:t>No</a:t>
+            </a:r>
+            <a:r>
+              <a:rPr lang="de-CH" dirty="0"/>
+              <a:t> </a:t>
+            </a:r>
+            <a:r>
+              <a:rPr lang="de-CH" dirty="0" err="1"/>
+              <a:t>Normalization</a:t>
+            </a:r>
+            <a:r>
+              <a:rPr lang="de-CH" dirty="0"/>
+              <a:t> vs. GMM</a:t>
+            </a:r>
+            <a:endParaRPr lang="en-GB" dirty="0"/>
+          </a:p>
+        </p:txBody>
+      </p:sp>
+      <p:sp>
+        <p:nvSpPr>
+          <p:cNvPr id="3" name="Titel 2">
+            <a:extLst>
+              <a:ext uri="{FF2B5EF4-FFF2-40B4-BE49-F238E27FC236}">
+                <a16:creationId xmlns:a16="http://schemas.microsoft.com/office/drawing/2014/main" id="{F8642BC2-16F8-4EB2-B0A4-04F8FFA9913F}"/>
+              </a:ext>
+            </a:extLst>
+          </p:cNvPr>
+          <p:cNvSpPr>
+            <a:spLocks noGrp="1"/>
+          </p:cNvSpPr>
+          <p:nvPr>
+            <p:ph type="title"/>
+          </p:nvPr>
+        </p:nvSpPr>
+        <p:spPr/>
+        <p:txBody>
+          <a:bodyPr/>
+          <a:lstStyle/>
+          <a:p>
+            <a:r>
+              <a:rPr lang="de-CH" dirty="0" err="1"/>
+              <a:t>Results</a:t>
+            </a:r>
+            <a:endParaRPr lang="en-GB" dirty="0"/>
+          </a:p>
+        </p:txBody>
+      </p:sp>
+      <p:pic>
+        <p:nvPicPr>
+          <p:cNvPr id="6" name="Inhaltsplatzhalter 5" descr="Ein Bild, das Blume enthält.&#10;&#10;Automatisch generierte Beschreibung">
+            <a:extLst>
+              <a:ext uri="{FF2B5EF4-FFF2-40B4-BE49-F238E27FC236}">
+                <a16:creationId xmlns:a16="http://schemas.microsoft.com/office/drawing/2014/main" id="{67F5AF55-498C-4D1E-9007-54D85CF02C3E}"/>
+              </a:ext>
+            </a:extLst>
+          </p:cNvPr>
+          <p:cNvPicPr>
+            <a:picLocks noGrp="1" noChangeAspect="1"/>
+          </p:cNvPicPr>
+          <p:nvPr>
+            <p:ph idx="1"/>
+          </p:nvPr>
+        </p:nvPicPr>
+        <p:blipFill>
+          <a:blip r:embed="rId2">
+            <a:extLst>
+              <a:ext uri="{28A0092B-C50C-407E-A947-70E740481C1C}">
+                <a14:useLocalDpi xmlns:a14="http://schemas.microsoft.com/office/drawing/2010/main" val="0"/>
+              </a:ext>
+            </a:extLst>
+          </a:blip>
+          <a:stretch>
+            <a:fillRect/>
+          </a:stretch>
+        </p:blipFill>
+        <p:spPr>
+          <a:xfrm>
+            <a:off x="540000" y="1191709"/>
+            <a:ext cx="3538114" cy="3527425"/>
+          </a:xfrm>
+        </p:spPr>
+      </p:pic>
+      <p:pic>
+        <p:nvPicPr>
+          <p:cNvPr id="5" name="Grafik 4" descr="Ein Bild, das Blume enthält.&#10;&#10;Automatisch generierte Beschreibung">
+            <a:extLst>
+              <a:ext uri="{FF2B5EF4-FFF2-40B4-BE49-F238E27FC236}">
+                <a16:creationId xmlns:a16="http://schemas.microsoft.com/office/drawing/2014/main" id="{29D561D7-1944-42FF-8C4E-2EA5111E8FE5}"/>
+              </a:ext>
+            </a:extLst>
+          </p:cNvPr>
+          <p:cNvPicPr>
+            <a:picLocks noChangeAspect="1"/>
+          </p:cNvPicPr>
+          <p:nvPr/>
+        </p:nvPicPr>
+        <p:blipFill>
+          <a:blip r:embed="rId3">
+            <a:extLst>
+              <a:ext uri="{28A0092B-C50C-407E-A947-70E740481C1C}">
+                <a14:useLocalDpi xmlns:a14="http://schemas.microsoft.com/office/drawing/2010/main" val="0"/>
+              </a:ext>
+            </a:extLst>
+          </a:blip>
+          <a:stretch>
+            <a:fillRect/>
+          </a:stretch>
+        </p:blipFill>
+        <p:spPr>
+          <a:xfrm>
+            <a:off x="5065886" y="1191709"/>
+            <a:ext cx="3538114" cy="3527425"/>
+          </a:xfrm>
+          <a:prstGeom prst="rect">
+            <a:avLst/>
+          </a:prstGeom>
+        </p:spPr>
+      </p:pic>
+    </p:spTree>
+    <p:extLst>
+      <p:ext uri="{BB962C8B-B14F-4D97-AF65-F5344CB8AC3E}">
+        <p14:creationId xmlns:p14="http://schemas.microsoft.com/office/powerpoint/2010/main" val="982483946"/>
+      </p:ext>
+    </p:extLst>
+  </p:cSld>
+  <p:clrMapOvr>
+    <a:masterClrMapping/>
+  </p:clrMapOvr>
+</p:sld>
+</file>
+
+<file path=ppt/slides/slide13.xml><?xml version="1.0" encoding="utf-8"?>
+<p:sld xmlns:a="http://schemas.openxmlformats.org/drawingml/2006/main" xmlns:r="http://schemas.openxmlformats.org/officeDocument/2006/relationships" xmlns:p="http://schemas.openxmlformats.org/presentationml/2006/main">
+  <p:cSld>
+    <p:spTree>
+      <p:nvGrpSpPr>
+        <p:cNvPr id="1" name=""/>
+        <p:cNvGrpSpPr/>
+        <p:nvPr/>
+      </p:nvGrpSpPr>
+      <p:grpSpPr>
+        <a:xfrm>
+          <a:off x="0" y="0"/>
+          <a:ext cx="0" cy="0"/>
+          <a:chOff x="0" y="0"/>
+          <a:chExt cx="0" cy="0"/>
+        </a:xfrm>
+      </p:grpSpPr>
+      <p:sp>
+        <p:nvSpPr>
+          <p:cNvPr id="2" name="Textplatzhalter 1">
+            <a:extLst>
+              <a:ext uri="{FF2B5EF4-FFF2-40B4-BE49-F238E27FC236}">
+                <a16:creationId xmlns:a16="http://schemas.microsoft.com/office/drawing/2014/main" id="{A197240E-0A12-4915-BFBD-9C4B18DA53B4}"/>
+              </a:ext>
+            </a:extLst>
+          </p:cNvPr>
+          <p:cNvSpPr>
+            <a:spLocks noGrp="1"/>
+          </p:cNvSpPr>
+          <p:nvPr>
+            <p:ph type="body" idx="11"/>
+          </p:nvPr>
+        </p:nvSpPr>
+        <p:spPr/>
+        <p:txBody>
+          <a:bodyPr/>
+          <a:lstStyle/>
+          <a:p>
+            <a:r>
+              <a:rPr lang="de-CH" dirty="0" err="1"/>
+              <a:t>No</a:t>
+            </a:r>
+            <a:r>
+              <a:rPr lang="de-CH" dirty="0"/>
+              <a:t> </a:t>
+            </a:r>
+            <a:r>
+              <a:rPr lang="de-CH" dirty="0" err="1"/>
+              <a:t>Normalization</a:t>
+            </a:r>
+            <a:r>
+              <a:rPr lang="de-CH" dirty="0"/>
+              <a:t> vs. </a:t>
+            </a:r>
+            <a:r>
+              <a:rPr lang="de-CH" dirty="0" err="1"/>
+              <a:t>MinMax</a:t>
+            </a:r>
+            <a:endParaRPr lang="en-GB" dirty="0"/>
+          </a:p>
+        </p:txBody>
+      </p:sp>
+      <p:sp>
+        <p:nvSpPr>
+          <p:cNvPr id="3" name="Titel 2">
+            <a:extLst>
+              <a:ext uri="{FF2B5EF4-FFF2-40B4-BE49-F238E27FC236}">
+                <a16:creationId xmlns:a16="http://schemas.microsoft.com/office/drawing/2014/main" id="{F8642BC2-16F8-4EB2-B0A4-04F8FFA9913F}"/>
+              </a:ext>
+            </a:extLst>
+          </p:cNvPr>
+          <p:cNvSpPr>
+            <a:spLocks noGrp="1"/>
+          </p:cNvSpPr>
+          <p:nvPr>
+            <p:ph type="title"/>
+          </p:nvPr>
+        </p:nvSpPr>
+        <p:spPr/>
+        <p:txBody>
+          <a:bodyPr/>
+          <a:lstStyle/>
+          <a:p>
+            <a:r>
+              <a:rPr lang="de-CH" dirty="0" err="1"/>
+              <a:t>Results</a:t>
+            </a:r>
+            <a:endParaRPr lang="en-GB" dirty="0"/>
+          </a:p>
+        </p:txBody>
+      </p:sp>
+      <p:pic>
+        <p:nvPicPr>
+          <p:cNvPr id="6" name="Inhaltsplatzhalter 5" descr="Ein Bild, das Blume enthält.&#10;&#10;Automatisch generierte Beschreibung">
+            <a:extLst>
+              <a:ext uri="{FF2B5EF4-FFF2-40B4-BE49-F238E27FC236}">
+                <a16:creationId xmlns:a16="http://schemas.microsoft.com/office/drawing/2014/main" id="{67F5AF55-498C-4D1E-9007-54D85CF02C3E}"/>
+              </a:ext>
+            </a:extLst>
+          </p:cNvPr>
+          <p:cNvPicPr>
+            <a:picLocks noGrp="1" noChangeAspect="1"/>
+          </p:cNvPicPr>
+          <p:nvPr>
+            <p:ph idx="1"/>
+          </p:nvPr>
+        </p:nvPicPr>
+        <p:blipFill>
+          <a:blip r:embed="rId2">
+            <a:extLst>
+              <a:ext uri="{28A0092B-C50C-407E-A947-70E740481C1C}">
+                <a14:useLocalDpi xmlns:a14="http://schemas.microsoft.com/office/drawing/2010/main" val="0"/>
+              </a:ext>
+            </a:extLst>
+          </a:blip>
+          <a:stretch>
+            <a:fillRect/>
+          </a:stretch>
+        </p:blipFill>
+        <p:spPr>
+          <a:xfrm>
+            <a:off x="540000" y="1191709"/>
+            <a:ext cx="3538114" cy="3527425"/>
+          </a:xfrm>
+        </p:spPr>
+      </p:pic>
+      <p:pic>
+        <p:nvPicPr>
+          <p:cNvPr id="5" name="Grafik 4" descr="Ein Bild, das Blume, Essen enthält.&#10;&#10;Automatisch generierte Beschreibung">
+            <a:extLst>
+              <a:ext uri="{FF2B5EF4-FFF2-40B4-BE49-F238E27FC236}">
+                <a16:creationId xmlns:a16="http://schemas.microsoft.com/office/drawing/2014/main" id="{8D251A62-8BD1-4863-9249-5712608D8D8C}"/>
+              </a:ext>
+            </a:extLst>
+          </p:cNvPr>
+          <p:cNvPicPr>
+            <a:picLocks noChangeAspect="1"/>
+          </p:cNvPicPr>
+          <p:nvPr/>
+        </p:nvPicPr>
+        <p:blipFill>
+          <a:blip r:embed="rId3">
+            <a:extLst>
+              <a:ext uri="{28A0092B-C50C-407E-A947-70E740481C1C}">
+                <a14:useLocalDpi xmlns:a14="http://schemas.microsoft.com/office/drawing/2010/main" val="0"/>
+              </a:ext>
+            </a:extLst>
+          </a:blip>
+          <a:stretch>
+            <a:fillRect/>
+          </a:stretch>
+        </p:blipFill>
+        <p:spPr>
+          <a:xfrm>
+            <a:off x="5065888" y="1191709"/>
+            <a:ext cx="3538114" cy="3527425"/>
+          </a:xfrm>
+          <a:prstGeom prst="rect">
+            <a:avLst/>
+          </a:prstGeom>
+        </p:spPr>
+      </p:pic>
+    </p:spTree>
+    <p:extLst>
+      <p:ext uri="{BB962C8B-B14F-4D97-AF65-F5344CB8AC3E}">
+        <p14:creationId xmlns:p14="http://schemas.microsoft.com/office/powerpoint/2010/main" val="173124273"/>
+      </p:ext>
+    </p:extLst>
+  </p:cSld>
+  <p:clrMapOvr>
+    <a:masterClrMapping/>
+  </p:clrMapOvr>
+</p:sld>
+</file>
+
+<file path=ppt/slides/slide14.xml><?xml version="1.0" encoding="utf-8"?>
+<p:sld xmlns:a="http://schemas.openxmlformats.org/drawingml/2006/main" xmlns:r="http://schemas.openxmlformats.org/officeDocument/2006/relationships" xmlns:p="http://schemas.openxmlformats.org/presentationml/2006/main">
+  <p:cSld>
+    <p:spTree>
+      <p:nvGrpSpPr>
+        <p:cNvPr id="1" name=""/>
+        <p:cNvGrpSpPr/>
+        <p:nvPr/>
+      </p:nvGrpSpPr>
+      <p:grpSpPr>
+        <a:xfrm>
+          <a:off x="0" y="0"/>
+          <a:ext cx="0" cy="0"/>
+          <a:chOff x="0" y="0"/>
+          <a:chExt cx="0" cy="0"/>
+        </a:xfrm>
+      </p:grpSpPr>
+      <p:sp>
+        <p:nvSpPr>
+          <p:cNvPr id="2" name="Textplatzhalter 1">
+            <a:extLst>
+              <a:ext uri="{FF2B5EF4-FFF2-40B4-BE49-F238E27FC236}">
+                <a16:creationId xmlns:a16="http://schemas.microsoft.com/office/drawing/2014/main" id="{A197240E-0A12-4915-BFBD-9C4B18DA53B4}"/>
+              </a:ext>
+            </a:extLst>
+          </p:cNvPr>
+          <p:cNvSpPr>
+            <a:spLocks noGrp="1"/>
+          </p:cNvSpPr>
+          <p:nvPr>
+            <p:ph type="body" idx="11"/>
+          </p:nvPr>
+        </p:nvSpPr>
+        <p:spPr/>
+        <p:txBody>
+          <a:bodyPr/>
+          <a:lstStyle/>
+          <a:p>
+            <a:r>
+              <a:rPr lang="de-CH" dirty="0" err="1"/>
+              <a:t>No</a:t>
+            </a:r>
+            <a:r>
+              <a:rPr lang="de-CH" dirty="0"/>
+              <a:t> </a:t>
+            </a:r>
+            <a:r>
+              <a:rPr lang="de-CH" dirty="0" err="1"/>
+              <a:t>Normalization</a:t>
+            </a:r>
+            <a:r>
+              <a:rPr lang="de-CH" dirty="0"/>
+              <a:t> vs. </a:t>
+            </a:r>
+            <a:r>
+              <a:rPr lang="de-CH" dirty="0" err="1"/>
+              <a:t>Histogram</a:t>
+            </a:r>
+            <a:r>
+              <a:rPr lang="de-CH" dirty="0"/>
+              <a:t> </a:t>
+            </a:r>
+            <a:r>
+              <a:rPr lang="de-CH" dirty="0" err="1"/>
+              <a:t>Matching</a:t>
+            </a:r>
+            <a:endParaRPr lang="en-GB" dirty="0"/>
+          </a:p>
+        </p:txBody>
+      </p:sp>
+      <p:sp>
+        <p:nvSpPr>
+          <p:cNvPr id="3" name="Titel 2">
+            <a:extLst>
+              <a:ext uri="{FF2B5EF4-FFF2-40B4-BE49-F238E27FC236}">
+                <a16:creationId xmlns:a16="http://schemas.microsoft.com/office/drawing/2014/main" id="{F8642BC2-16F8-4EB2-B0A4-04F8FFA9913F}"/>
+              </a:ext>
+            </a:extLst>
+          </p:cNvPr>
+          <p:cNvSpPr>
+            <a:spLocks noGrp="1"/>
+          </p:cNvSpPr>
+          <p:nvPr>
+            <p:ph type="title"/>
+          </p:nvPr>
+        </p:nvSpPr>
+        <p:spPr/>
+        <p:txBody>
+          <a:bodyPr/>
+          <a:lstStyle/>
+          <a:p>
+            <a:r>
+              <a:rPr lang="de-CH" dirty="0" err="1"/>
+              <a:t>Results</a:t>
+            </a:r>
+            <a:endParaRPr lang="en-GB" dirty="0"/>
+          </a:p>
+        </p:txBody>
+      </p:sp>
+      <p:pic>
+        <p:nvPicPr>
+          <p:cNvPr id="6" name="Inhaltsplatzhalter 5" descr="Ein Bild, das Blume enthält.&#10;&#10;Automatisch generierte Beschreibung">
+            <a:extLst>
+              <a:ext uri="{FF2B5EF4-FFF2-40B4-BE49-F238E27FC236}">
+                <a16:creationId xmlns:a16="http://schemas.microsoft.com/office/drawing/2014/main" id="{67F5AF55-498C-4D1E-9007-54D85CF02C3E}"/>
+              </a:ext>
+            </a:extLst>
+          </p:cNvPr>
+          <p:cNvPicPr>
+            <a:picLocks noGrp="1" noChangeAspect="1"/>
+          </p:cNvPicPr>
+          <p:nvPr>
+            <p:ph idx="1"/>
+          </p:nvPr>
+        </p:nvPicPr>
+        <p:blipFill>
+          <a:blip r:embed="rId2">
+            <a:extLst>
+              <a:ext uri="{28A0092B-C50C-407E-A947-70E740481C1C}">
+                <a14:useLocalDpi xmlns:a14="http://schemas.microsoft.com/office/drawing/2010/main" val="0"/>
+              </a:ext>
+            </a:extLst>
+          </a:blip>
+          <a:stretch>
+            <a:fillRect/>
+          </a:stretch>
+        </p:blipFill>
+        <p:spPr>
+          <a:xfrm>
+            <a:off x="540000" y="1191709"/>
+            <a:ext cx="3538114" cy="3527425"/>
+          </a:xfrm>
+        </p:spPr>
+      </p:pic>
+      <p:pic>
+        <p:nvPicPr>
+          <p:cNvPr id="7" name="Grafik 6" descr="Ein Bild, das Blume enthält.&#10;&#10;Automatisch generierte Beschreibung">
+            <a:extLst>
+              <a:ext uri="{FF2B5EF4-FFF2-40B4-BE49-F238E27FC236}">
+                <a16:creationId xmlns:a16="http://schemas.microsoft.com/office/drawing/2014/main" id="{B35DA1B4-148A-4604-BEF3-0BA84C3D78FE}"/>
+              </a:ext>
+            </a:extLst>
+          </p:cNvPr>
+          <p:cNvPicPr>
+            <a:picLocks noChangeAspect="1"/>
+          </p:cNvPicPr>
+          <p:nvPr/>
+        </p:nvPicPr>
+        <p:blipFill>
+          <a:blip r:embed="rId3">
+            <a:extLst>
+              <a:ext uri="{28A0092B-C50C-407E-A947-70E740481C1C}">
+                <a14:useLocalDpi xmlns:a14="http://schemas.microsoft.com/office/drawing/2010/main" val="0"/>
+              </a:ext>
+            </a:extLst>
+          </a:blip>
+          <a:stretch>
+            <a:fillRect/>
+          </a:stretch>
+        </p:blipFill>
+        <p:spPr>
+          <a:xfrm>
+            <a:off x="5065888" y="1191709"/>
+            <a:ext cx="3538114" cy="3527425"/>
+          </a:xfrm>
+          <a:prstGeom prst="rect">
+            <a:avLst/>
+          </a:prstGeom>
+        </p:spPr>
+      </p:pic>
+    </p:spTree>
+    <p:extLst>
+      <p:ext uri="{BB962C8B-B14F-4D97-AF65-F5344CB8AC3E}">
+        <p14:creationId xmlns:p14="http://schemas.microsoft.com/office/powerpoint/2010/main" val="4002181805"/>
+      </p:ext>
+    </p:extLst>
+  </p:cSld>
+  <p:clrMapOvr>
+    <a:masterClrMapping/>
+  </p:clrMapOvr>
+</p:sld>
+</file>
+
+<file path=ppt/slides/slide15.xml><?xml version="1.0" encoding="utf-8"?>
+<p:sld xmlns:a="http://schemas.openxmlformats.org/drawingml/2006/main" xmlns:r="http://schemas.openxmlformats.org/officeDocument/2006/relationships" xmlns:p="http://schemas.openxmlformats.org/presentationml/2006/main">
+  <p:cSld>
+    <p:spTree>
+      <p:nvGrpSpPr>
+        <p:cNvPr id="1" name=""/>
+        <p:cNvGrpSpPr/>
+        <p:nvPr/>
+      </p:nvGrpSpPr>
+      <p:grpSpPr>
+        <a:xfrm>
+          <a:off x="0" y="0"/>
+          <a:ext cx="0" cy="0"/>
+          <a:chOff x="0" y="0"/>
+          <a:chExt cx="0" cy="0"/>
+        </a:xfrm>
+      </p:grpSpPr>
+      <p:sp>
+        <p:nvSpPr>
+          <p:cNvPr id="2" name="Textplatzhalter 1">
+            <a:extLst>
+              <a:ext uri="{FF2B5EF4-FFF2-40B4-BE49-F238E27FC236}">
+                <a16:creationId xmlns:a16="http://schemas.microsoft.com/office/drawing/2014/main" id="{A197240E-0A12-4915-BFBD-9C4B18DA53B4}"/>
+              </a:ext>
+            </a:extLst>
+          </p:cNvPr>
+          <p:cNvSpPr>
+            <a:spLocks noGrp="1"/>
+          </p:cNvSpPr>
+          <p:nvPr>
+            <p:ph type="body" idx="11"/>
+          </p:nvPr>
+        </p:nvSpPr>
+        <p:spPr/>
+        <p:txBody>
+          <a:bodyPr/>
+          <a:lstStyle/>
+          <a:p>
+            <a:r>
+              <a:rPr lang="de-CH" dirty="0" err="1"/>
+              <a:t>No</a:t>
+            </a:r>
+            <a:r>
+              <a:rPr lang="de-CH" dirty="0"/>
+              <a:t> </a:t>
+            </a:r>
+            <a:r>
+              <a:rPr lang="de-CH" dirty="0" err="1"/>
+              <a:t>Normalization</a:t>
+            </a:r>
+            <a:r>
+              <a:rPr lang="de-CH" dirty="0"/>
+              <a:t> vs. </a:t>
+            </a:r>
+            <a:r>
+              <a:rPr lang="de-CH" dirty="0" err="1"/>
+              <a:t>Whitestripe</a:t>
+            </a:r>
+            <a:endParaRPr lang="en-GB" dirty="0"/>
+          </a:p>
+        </p:txBody>
+      </p:sp>
+      <p:sp>
+        <p:nvSpPr>
+          <p:cNvPr id="3" name="Titel 2">
+            <a:extLst>
+              <a:ext uri="{FF2B5EF4-FFF2-40B4-BE49-F238E27FC236}">
+                <a16:creationId xmlns:a16="http://schemas.microsoft.com/office/drawing/2014/main" id="{F8642BC2-16F8-4EB2-B0A4-04F8FFA9913F}"/>
+              </a:ext>
+            </a:extLst>
+          </p:cNvPr>
+          <p:cNvSpPr>
+            <a:spLocks noGrp="1"/>
+          </p:cNvSpPr>
+          <p:nvPr>
+            <p:ph type="title"/>
+          </p:nvPr>
+        </p:nvSpPr>
+        <p:spPr/>
+        <p:txBody>
+          <a:bodyPr/>
+          <a:lstStyle/>
+          <a:p>
+            <a:r>
+              <a:rPr lang="de-CH" dirty="0" err="1"/>
+              <a:t>Results</a:t>
+            </a:r>
+            <a:endParaRPr lang="en-GB" dirty="0"/>
+          </a:p>
+        </p:txBody>
+      </p:sp>
+      <p:pic>
+        <p:nvPicPr>
+          <p:cNvPr id="6" name="Inhaltsplatzhalter 5" descr="Ein Bild, das Blume enthält.&#10;&#10;Automatisch generierte Beschreibung">
+            <a:extLst>
+              <a:ext uri="{FF2B5EF4-FFF2-40B4-BE49-F238E27FC236}">
+                <a16:creationId xmlns:a16="http://schemas.microsoft.com/office/drawing/2014/main" id="{67F5AF55-498C-4D1E-9007-54D85CF02C3E}"/>
+              </a:ext>
+            </a:extLst>
+          </p:cNvPr>
+          <p:cNvPicPr>
+            <a:picLocks noGrp="1" noChangeAspect="1"/>
+          </p:cNvPicPr>
+          <p:nvPr>
+            <p:ph idx="1"/>
+          </p:nvPr>
+        </p:nvPicPr>
+        <p:blipFill>
+          <a:blip r:embed="rId2">
+            <a:extLst>
+              <a:ext uri="{28A0092B-C50C-407E-A947-70E740481C1C}">
+                <a14:useLocalDpi xmlns:a14="http://schemas.microsoft.com/office/drawing/2010/main" val="0"/>
+              </a:ext>
+            </a:extLst>
+          </a:blip>
+          <a:stretch>
+            <a:fillRect/>
+          </a:stretch>
+        </p:blipFill>
+        <p:spPr>
+          <a:xfrm>
+            <a:off x="540000" y="1191709"/>
+            <a:ext cx="3538114" cy="3527425"/>
+          </a:xfrm>
+        </p:spPr>
+      </p:pic>
+      <p:pic>
+        <p:nvPicPr>
+          <p:cNvPr id="5" name="Grafik 4" descr="Ein Bild, das Blume enthält.&#10;&#10;Automatisch generierte Beschreibung">
+            <a:extLst>
+              <a:ext uri="{FF2B5EF4-FFF2-40B4-BE49-F238E27FC236}">
+                <a16:creationId xmlns:a16="http://schemas.microsoft.com/office/drawing/2014/main" id="{D0E8F932-E933-4E92-B5C0-26A6AC333A95}"/>
+              </a:ext>
+            </a:extLst>
+          </p:cNvPr>
+          <p:cNvPicPr>
+            <a:picLocks noChangeAspect="1"/>
+          </p:cNvPicPr>
+          <p:nvPr/>
+        </p:nvPicPr>
+        <p:blipFill>
+          <a:blip r:embed="rId3">
+            <a:extLst>
+              <a:ext uri="{28A0092B-C50C-407E-A947-70E740481C1C}">
+                <a14:useLocalDpi xmlns:a14="http://schemas.microsoft.com/office/drawing/2010/main" val="0"/>
+              </a:ext>
+            </a:extLst>
+          </a:blip>
+          <a:stretch>
+            <a:fillRect/>
+          </a:stretch>
+        </p:blipFill>
+        <p:spPr>
+          <a:xfrm>
+            <a:off x="5065886" y="1191709"/>
+            <a:ext cx="3538114" cy="3527425"/>
+          </a:xfrm>
+          <a:prstGeom prst="rect">
+            <a:avLst/>
+          </a:prstGeom>
+        </p:spPr>
+      </p:pic>
+    </p:spTree>
+    <p:extLst>
+      <p:ext uri="{BB962C8B-B14F-4D97-AF65-F5344CB8AC3E}">
+        <p14:creationId xmlns:p14="http://schemas.microsoft.com/office/powerpoint/2010/main" val="3740360723"/>
+      </p:ext>
+    </p:extLst>
+  </p:cSld>
+  <p:clrMapOvr>
+    <a:masterClrMapping/>
+  </p:clrMapOvr>
+</p:sld>
+</file>
+
+<file path=ppt/slides/slide16.xml><?xml version="1.0" encoding="utf-8"?>
+<p:sld xmlns:a="http://schemas.openxmlformats.org/drawingml/2006/main" xmlns:r="http://schemas.openxmlformats.org/officeDocument/2006/relationships" xmlns:p="http://schemas.openxmlformats.org/presentationml/2006/main">
+  <p:cSld>
+    <p:spTree>
+      <p:nvGrpSpPr>
+        <p:cNvPr id="1" name=""/>
+        <p:cNvGrpSpPr/>
+        <p:nvPr/>
+      </p:nvGrpSpPr>
+      <p:grpSpPr>
+        <a:xfrm>
+          <a:off x="0" y="0"/>
+          <a:ext cx="0" cy="0"/>
+          <a:chOff x="0" y="0"/>
+          <a:chExt cx="0" cy="0"/>
+        </a:xfrm>
+      </p:grpSpPr>
+      <p:sp>
+        <p:nvSpPr>
+          <p:cNvPr id="2" name="Textplatzhalter 1">
+            <a:extLst>
+              <a:ext uri="{FF2B5EF4-FFF2-40B4-BE49-F238E27FC236}">
+                <a16:creationId xmlns:a16="http://schemas.microsoft.com/office/drawing/2014/main" id="{A197240E-0A12-4915-BFBD-9C4B18DA53B4}"/>
+              </a:ext>
+            </a:extLst>
+          </p:cNvPr>
+          <p:cNvSpPr>
+            <a:spLocks noGrp="1"/>
+          </p:cNvSpPr>
+          <p:nvPr>
+            <p:ph type="body" idx="11"/>
+          </p:nvPr>
+        </p:nvSpPr>
+        <p:spPr/>
+        <p:txBody>
+          <a:bodyPr/>
+          <a:lstStyle/>
+          <a:p>
+            <a:r>
+              <a:rPr lang="de-CH" dirty="0" err="1"/>
+              <a:t>No</a:t>
+            </a:r>
+            <a:r>
+              <a:rPr lang="de-CH" dirty="0"/>
+              <a:t> </a:t>
+            </a:r>
+            <a:r>
+              <a:rPr lang="de-CH" dirty="0" err="1"/>
+              <a:t>Normalization</a:t>
+            </a:r>
+            <a:r>
+              <a:rPr lang="de-CH" dirty="0"/>
+              <a:t> vs. </a:t>
+            </a:r>
+            <a:r>
+              <a:rPr lang="de-CH" dirty="0" err="1"/>
+              <a:t>zScore</a:t>
+            </a:r>
+            <a:endParaRPr lang="en-GB" dirty="0"/>
+          </a:p>
+        </p:txBody>
+      </p:sp>
+      <p:sp>
+        <p:nvSpPr>
+          <p:cNvPr id="3" name="Titel 2">
+            <a:extLst>
+              <a:ext uri="{FF2B5EF4-FFF2-40B4-BE49-F238E27FC236}">
+                <a16:creationId xmlns:a16="http://schemas.microsoft.com/office/drawing/2014/main" id="{F8642BC2-16F8-4EB2-B0A4-04F8FFA9913F}"/>
+              </a:ext>
+            </a:extLst>
+          </p:cNvPr>
+          <p:cNvSpPr>
+            <a:spLocks noGrp="1"/>
+          </p:cNvSpPr>
+          <p:nvPr>
+            <p:ph type="title"/>
+          </p:nvPr>
+        </p:nvSpPr>
+        <p:spPr/>
+        <p:txBody>
+          <a:bodyPr/>
+          <a:lstStyle/>
+          <a:p>
+            <a:r>
+              <a:rPr lang="de-CH" dirty="0" err="1"/>
+              <a:t>Results</a:t>
+            </a:r>
+            <a:endParaRPr lang="en-GB" dirty="0"/>
+          </a:p>
+        </p:txBody>
+      </p:sp>
+      <p:pic>
+        <p:nvPicPr>
+          <p:cNvPr id="6" name="Inhaltsplatzhalter 5" descr="Ein Bild, das Blume enthält.&#10;&#10;Automatisch generierte Beschreibung">
+            <a:extLst>
+              <a:ext uri="{FF2B5EF4-FFF2-40B4-BE49-F238E27FC236}">
+                <a16:creationId xmlns:a16="http://schemas.microsoft.com/office/drawing/2014/main" id="{67F5AF55-498C-4D1E-9007-54D85CF02C3E}"/>
+              </a:ext>
+            </a:extLst>
+          </p:cNvPr>
+          <p:cNvPicPr>
+            <a:picLocks noGrp="1" noChangeAspect="1"/>
+          </p:cNvPicPr>
+          <p:nvPr>
+            <p:ph idx="1"/>
+          </p:nvPr>
+        </p:nvPicPr>
+        <p:blipFill>
+          <a:blip r:embed="rId2">
+            <a:extLst>
+              <a:ext uri="{28A0092B-C50C-407E-A947-70E740481C1C}">
+                <a14:useLocalDpi xmlns:a14="http://schemas.microsoft.com/office/drawing/2010/main" val="0"/>
+              </a:ext>
+            </a:extLst>
+          </a:blip>
+          <a:stretch>
+            <a:fillRect/>
+          </a:stretch>
+        </p:blipFill>
+        <p:spPr>
+          <a:xfrm>
+            <a:off x="540000" y="1191709"/>
+            <a:ext cx="3538114" cy="3527425"/>
+          </a:xfrm>
+        </p:spPr>
+      </p:pic>
+      <p:pic>
+        <p:nvPicPr>
+          <p:cNvPr id="7" name="Grafik 6" descr="Ein Bild, das Blume enthält.&#10;&#10;Automatisch generierte Beschreibung">
+            <a:extLst>
+              <a:ext uri="{FF2B5EF4-FFF2-40B4-BE49-F238E27FC236}">
+                <a16:creationId xmlns:a16="http://schemas.microsoft.com/office/drawing/2014/main" id="{5E2341CA-4E6A-4180-98D5-EE47B818C72E}"/>
+              </a:ext>
+            </a:extLst>
+          </p:cNvPr>
+          <p:cNvPicPr>
+            <a:picLocks noChangeAspect="1"/>
+          </p:cNvPicPr>
+          <p:nvPr/>
+        </p:nvPicPr>
+        <p:blipFill>
+          <a:blip r:embed="rId3">
+            <a:extLst>
+              <a:ext uri="{28A0092B-C50C-407E-A947-70E740481C1C}">
+                <a14:useLocalDpi xmlns:a14="http://schemas.microsoft.com/office/drawing/2010/main" val="0"/>
+              </a:ext>
+            </a:extLst>
+          </a:blip>
+          <a:stretch>
+            <a:fillRect/>
+          </a:stretch>
+        </p:blipFill>
+        <p:spPr>
+          <a:xfrm>
+            <a:off x="5065888" y="1191709"/>
+            <a:ext cx="3538114" cy="3527425"/>
+          </a:xfrm>
+          <a:prstGeom prst="rect">
+            <a:avLst/>
+          </a:prstGeom>
+        </p:spPr>
+      </p:pic>
+    </p:spTree>
+    <p:extLst>
+      <p:ext uri="{BB962C8B-B14F-4D97-AF65-F5344CB8AC3E}">
+        <p14:creationId xmlns:p14="http://schemas.microsoft.com/office/powerpoint/2010/main" val="1269174725"/>
+      </p:ext>
+    </p:extLst>
+  </p:cSld>
+  <p:clrMapOvr>
+    <a:masterClrMapping/>
+  </p:clrMapOvr>
+</p:sld>
+</file>
+
+<file path=ppt/slides/slide17.xml><?xml version="1.0" encoding="utf-8"?>
+<p:sld xmlns:a="http://schemas.openxmlformats.org/drawingml/2006/main" xmlns:r="http://schemas.openxmlformats.org/officeDocument/2006/relationships" xmlns:p="http://schemas.openxmlformats.org/presentationml/2006/main">
+  <p:cSld>
+    <p:spTree>
+      <p:nvGrpSpPr>
+        <p:cNvPr id="1" name=""/>
+        <p:cNvGrpSpPr/>
+        <p:nvPr/>
+      </p:nvGrpSpPr>
+      <p:grpSpPr>
+        <a:xfrm>
+          <a:off x="0" y="0"/>
+          <a:ext cx="0" cy="0"/>
+          <a:chOff x="0" y="0"/>
+          <a:chExt cx="0" cy="0"/>
+        </a:xfrm>
+      </p:grpSpPr>
+      <p:sp>
+        <p:nvSpPr>
+          <p:cNvPr id="2" name="Textplatzhalter 1">
+            <a:extLst>
+              <a:ext uri="{FF2B5EF4-FFF2-40B4-BE49-F238E27FC236}">
+                <a16:creationId xmlns:a16="http://schemas.microsoft.com/office/drawing/2014/main" id="{96D1BFF3-C1F6-4B38-8809-F23DDD618586}"/>
+              </a:ext>
+            </a:extLst>
+          </p:cNvPr>
+          <p:cNvSpPr>
+            <a:spLocks noGrp="1"/>
+          </p:cNvSpPr>
+          <p:nvPr>
+            <p:ph type="body" idx="11"/>
+          </p:nvPr>
+        </p:nvSpPr>
+        <p:spPr/>
+        <p:txBody>
+          <a:bodyPr/>
+          <a:lstStyle/>
+          <a:p>
+            <a:r>
+              <a:rPr lang="de-CH" dirty="0" err="1"/>
+              <a:t>What</a:t>
+            </a:r>
+            <a:r>
+              <a:rPr lang="de-CH" dirty="0"/>
+              <a:t> </a:t>
+            </a:r>
+            <a:r>
+              <a:rPr lang="de-CH" dirty="0" err="1"/>
+              <a:t>have</a:t>
+            </a:r>
+            <a:r>
+              <a:rPr lang="de-CH" dirty="0"/>
+              <a:t> </a:t>
+            </a:r>
+            <a:r>
+              <a:rPr lang="de-CH" dirty="0" err="1"/>
+              <a:t>we</a:t>
+            </a:r>
+            <a:r>
+              <a:rPr lang="de-CH" dirty="0"/>
+              <a:t> </a:t>
+            </a:r>
+            <a:r>
+              <a:rPr lang="de-CH" dirty="0" err="1"/>
+              <a:t>learned</a:t>
+            </a:r>
+            <a:r>
+              <a:rPr lang="de-CH" dirty="0"/>
+              <a:t>?</a:t>
+            </a:r>
+            <a:endParaRPr lang="en-GB" dirty="0"/>
+          </a:p>
+        </p:txBody>
+      </p:sp>
+      <p:sp>
+        <p:nvSpPr>
+          <p:cNvPr id="3" name="Titel 2">
+            <a:extLst>
+              <a:ext uri="{FF2B5EF4-FFF2-40B4-BE49-F238E27FC236}">
+                <a16:creationId xmlns:a16="http://schemas.microsoft.com/office/drawing/2014/main" id="{A6A37433-1981-4B43-A78D-DA6596F582E2}"/>
+              </a:ext>
+            </a:extLst>
+          </p:cNvPr>
+          <p:cNvSpPr>
+            <a:spLocks noGrp="1"/>
+          </p:cNvSpPr>
+          <p:nvPr>
+            <p:ph type="title"/>
+          </p:nvPr>
+        </p:nvSpPr>
+        <p:spPr/>
+        <p:txBody>
+          <a:bodyPr/>
+          <a:lstStyle/>
+          <a:p>
+            <a:r>
+              <a:rPr lang="de-CH" dirty="0" err="1"/>
+              <a:t>Recap</a:t>
+            </a:r>
+            <a:endParaRPr lang="en-GB" dirty="0"/>
+          </a:p>
+        </p:txBody>
+      </p:sp>
+      <p:sp>
+        <p:nvSpPr>
+          <p:cNvPr id="4" name="Inhaltsplatzhalter 3">
+            <a:extLst>
+              <a:ext uri="{FF2B5EF4-FFF2-40B4-BE49-F238E27FC236}">
+                <a16:creationId xmlns:a16="http://schemas.microsoft.com/office/drawing/2014/main" id="{5CD2D246-75A5-49B1-933A-34A6CBB3717A}"/>
+              </a:ext>
+            </a:extLst>
+          </p:cNvPr>
+          <p:cNvSpPr>
+            <a:spLocks noGrp="1"/>
+          </p:cNvSpPr>
+          <p:nvPr>
+            <p:ph idx="1"/>
+          </p:nvPr>
+        </p:nvSpPr>
+        <p:spPr/>
+        <p:txBody>
+          <a:bodyPr/>
+          <a:lstStyle/>
+          <a:p>
+            <a:r>
+              <a:rPr lang="de-CH" dirty="0"/>
+              <a:t>Teamwork </a:t>
+            </a:r>
+            <a:r>
+              <a:rPr lang="de-CH" dirty="0" err="1"/>
+              <a:t>with</a:t>
+            </a:r>
+            <a:r>
+              <a:rPr lang="de-CH" dirty="0"/>
+              <a:t> GitHub</a:t>
+            </a:r>
+          </a:p>
+          <a:p>
+            <a:r>
+              <a:rPr lang="de-CH" dirty="0" err="1"/>
+              <a:t>Bla</a:t>
+            </a:r>
+            <a:endParaRPr lang="de-CH" dirty="0"/>
+          </a:p>
+          <a:p>
+            <a:r>
+              <a:rPr lang="de-CH" dirty="0" err="1"/>
+              <a:t>Bla</a:t>
+            </a:r>
+            <a:endParaRPr lang="de-CH" dirty="0"/>
+          </a:p>
+          <a:p>
+            <a:r>
+              <a:rPr lang="de-CH" dirty="0" err="1"/>
+              <a:t>Bla</a:t>
+            </a:r>
+            <a:endParaRPr lang="de-CH"/>
+          </a:p>
+          <a:p>
+            <a:endParaRPr lang="en-GB"/>
+          </a:p>
+        </p:txBody>
+      </p:sp>
+    </p:spTree>
+    <p:extLst>
+      <p:ext uri="{BB962C8B-B14F-4D97-AF65-F5344CB8AC3E}">
+        <p14:creationId xmlns:p14="http://schemas.microsoft.com/office/powerpoint/2010/main" val="1499650226"/>
+      </p:ext>
+    </p:extLst>
+  </p:cSld>
+  <p:clrMapOvr>
+    <a:masterClrMapping/>
+  </p:clrMapOvr>
+</p:sld>
+</file>
+
+<file path=ppt/slides/slide18.xml><?xml version="1.0" encoding="utf-8"?>
+<p:sld xmlns:a="http://schemas.openxmlformats.org/drawingml/2006/main" xmlns:r="http://schemas.openxmlformats.org/officeDocument/2006/relationships" xmlns:p="http://schemas.openxmlformats.org/presentationml/2006/main">
+  <p:cSld>
+    <p:spTree>
+      <p:nvGrpSpPr>
+        <p:cNvPr id="1" name=""/>
+        <p:cNvGrpSpPr/>
+        <p:nvPr/>
+      </p:nvGrpSpPr>
+      <p:grpSpPr>
+        <a:xfrm>
+          <a:off x="0" y="0"/>
+          <a:ext cx="0" cy="0"/>
+          <a:chOff x="0" y="0"/>
+          <a:chExt cx="0" cy="0"/>
+        </a:xfrm>
+      </p:grpSpPr>
+      <p:sp>
+        <p:nvSpPr>
           <p:cNvPr id="25" name="Text Placeholder 24">
             <a:extLst>
               <a:ext uri="{FF2B5EF4-FFF2-40B4-BE49-F238E27FC236}">
@@ -17596,7 +19156,7 @@
           <a:p>
             <a:r>
               <a:rPr lang="en-GB" dirty="0"/>
-              <a:t>What to do until the end of semester</a:t>
+              <a:t>What else could be done?</a:t>
             </a:r>
           </a:p>
         </p:txBody>
@@ -17661,7 +19221,7 @@
             </a:pPr>
             <a:r>
               <a:rPr lang="en-US" dirty="0"/>
-              <a:t>More normalization techniques</a:t>
+              <a:t>Try other preprocessing methods</a:t>
             </a:r>
           </a:p>
           <a:p>
@@ -17671,7 +19231,7 @@
             </a:pPr>
             <a:r>
               <a:rPr lang="en-US" dirty="0"/>
-              <a:t>Combine normalizations with different Random Forest parameters</a:t>
+              <a:t>Xxx</a:t>
             </a:r>
           </a:p>
           <a:p>
@@ -17681,27 +19241,7 @@
             </a:pPr>
             <a:r>
               <a:rPr lang="en-US" dirty="0"/>
-              <a:t>Behavior of normalization techniques</a:t>
-            </a:r>
-          </a:p>
-          <a:p>
-            <a:pPr marL="342900" indent="-342900" algn="just">
-              <a:buFont typeface="+mj-lt"/>
-              <a:buAutoNum type="arabicPeriod"/>
-            </a:pPr>
-            <a:r>
-              <a:rPr lang="en-US" dirty="0"/>
-              <a:t>Analyze results</a:t>
-            </a:r>
-          </a:p>
-          <a:p>
-            <a:pPr marL="342900" indent="-342900" algn="just">
-              <a:buFont typeface="+mj-lt"/>
-              <a:buAutoNum type="arabicPeriod"/>
-            </a:pPr>
-            <a:r>
-              <a:rPr lang="en-US" dirty="0"/>
-              <a:t>Write report</a:t>
+              <a:t>xxx</a:t>
             </a:r>
           </a:p>
         </p:txBody>
@@ -17719,7 +19259,7 @@
 </p:sld>
 </file>
 
-<file path=ppt/slides/slide12.xml><?xml version="1.0" encoding="utf-8"?>
+<file path=ppt/slides/slide19.xml><?xml version="1.0" encoding="utf-8"?>
 <p:sld xmlns:a="http://schemas.openxmlformats.org/drawingml/2006/main" xmlns:r="http://schemas.openxmlformats.org/officeDocument/2006/relationships" xmlns:p="http://schemas.openxmlformats.org/presentationml/2006/main">
   <p:cSld>
     <p:spTree>
@@ -18410,7 +19950,7 @@
           <a:graphicData uri="http://schemas.openxmlformats.org/presentationml/2006/ole">
             <mc:AlternateContent xmlns:mc="http://schemas.openxmlformats.org/markup-compatibility/2006">
               <mc:Choice xmlns:v="urn:schemas-microsoft-com:vml" Requires="v">
-                <p:oleObj spid="_x0000_s1030" name="Equation" r:id="rId4" imgW="774360" imgH="393480" progId="Equation.DSMT4">
+                <p:oleObj spid="_x0000_s1026" name="Equation" r:id="rId4" imgW="774360" imgH="393480" progId="Equation.DSMT4">
                   <p:embed/>
                 </p:oleObj>
               </mc:Choice>
@@ -18479,7 +20019,7 @@
           <a:graphicData uri="http://schemas.openxmlformats.org/presentationml/2006/ole">
             <mc:AlternateContent xmlns:mc="http://schemas.openxmlformats.org/markup-compatibility/2006">
               <mc:Choice xmlns:v="urn:schemas-microsoft-com:vml" Requires="v">
-                <p:oleObj spid="_x0000_s1031" name="Equation" r:id="rId6" imgW="634680" imgH="393480" progId="Equation.DSMT4">
+                <p:oleObj spid="_x0000_s1027" name="Equation" r:id="rId6" imgW="634680" imgH="393480" progId="Equation.DSMT4">
                   <p:embed/>
                 </p:oleObj>
               </mc:Choice>

</xml_diff>

<commit_message>
screenshots and presentation updated
</commit_message>
<xml_diff>
--- a/Presentation/Final/FinalPresentation_Group3_BucheggerDuranWeber.pptx
+++ b/Presentation/Final/FinalPresentation_Group3_BucheggerDuranWeber.pptx
@@ -10,10 +10,10 @@
     <p:sldMasterId id="2147483692" r:id="rId6"/>
   </p:sldMasterIdLst>
   <p:notesMasterIdLst>
-    <p:notesMasterId r:id="rId26"/>
+    <p:notesMasterId r:id="rId25"/>
   </p:notesMasterIdLst>
   <p:handoutMasterIdLst>
-    <p:handoutMasterId r:id="rId27"/>
+    <p:handoutMasterId r:id="rId26"/>
   </p:handoutMasterIdLst>
   <p:sldIdLst>
     <p:sldId id="306" r:id="rId7"/>
@@ -27,14 +27,13 @@
     <p:sldId id="314" r:id="rId15"/>
     <p:sldId id="315" r:id="rId16"/>
     <p:sldId id="320" r:id="rId17"/>
-    <p:sldId id="321" r:id="rId18"/>
-    <p:sldId id="322" r:id="rId19"/>
-    <p:sldId id="323" r:id="rId20"/>
-    <p:sldId id="324" r:id="rId21"/>
-    <p:sldId id="325" r:id="rId22"/>
+    <p:sldId id="327" r:id="rId18"/>
+    <p:sldId id="328" r:id="rId19"/>
+    <p:sldId id="329" r:id="rId20"/>
+    <p:sldId id="330" r:id="rId21"/>
+    <p:sldId id="331" r:id="rId22"/>
     <p:sldId id="326" r:id="rId23"/>
-    <p:sldId id="307" r:id="rId24"/>
-    <p:sldId id="300" r:id="rId25"/>
+    <p:sldId id="300" r:id="rId24"/>
   </p:sldIdLst>
   <p:sldSz cx="9144000" cy="5143500" type="screen16x9"/>
   <p:notesSz cx="6858000" cy="9144000"/>
@@ -144,7 +143,7 @@
 <file path=ppt/revisionInfo.xml><?xml version="1.0" encoding="utf-8"?>
 <p1510:revInfo xmlns:a="http://schemas.openxmlformats.org/drawingml/2006/main" xmlns:r="http://schemas.openxmlformats.org/officeDocument/2006/relationships" xmlns:p1510="http://schemas.microsoft.com/office/powerpoint/2015/10/main">
   <p1510:revLst>
-    <p1510:client id="{3120C776-606B-4AD1-8FEF-BC15473D7B81}" v="18" dt="2020-12-12T14:28:57.580"/>
+    <p1510:client id="{3120C776-606B-4AD1-8FEF-BC15473D7B81}" v="33" dt="2020-12-12T17:31:50.324"/>
   </p1510:revLst>
 </p1510:revInfo>
 </file>
@@ -153,13 +152,28 @@
 <pc:chgInfo xmlns:a="http://schemas.openxmlformats.org/drawingml/2006/main" xmlns:r="http://schemas.openxmlformats.org/officeDocument/2006/relationships" xmlns:ac="http://schemas.microsoft.com/office/drawing/2013/main/command" xmlns:pc="http://schemas.microsoft.com/office/powerpoint/2013/main/command">
   <pc:docChgLst>
     <pc:chgData name="Thomas Buchegger" userId="e9d10f62-fa07-4fc1-9248-edcb138c70e1" providerId="ADAL" clId="{3120C776-606B-4AD1-8FEF-BC15473D7B81}"/>
-    <pc:docChg chg="custSel addSld delSld modSld">
-      <pc:chgData name="Thomas Buchegger" userId="e9d10f62-fa07-4fc1-9248-edcb138c70e1" providerId="ADAL" clId="{3120C776-606B-4AD1-8FEF-BC15473D7B81}" dt="2020-12-12T14:29:20.611" v="339" actId="1076"/>
+    <pc:docChg chg="undo custSel addSld delSld modSld">
+      <pc:chgData name="Thomas Buchegger" userId="e9d10f62-fa07-4fc1-9248-edcb138c70e1" providerId="ADAL" clId="{3120C776-606B-4AD1-8FEF-BC15473D7B81}" dt="2020-12-12T17:33:14.574" v="487" actId="20577"/>
       <pc:docMkLst>
         <pc:docMk/>
       </pc:docMkLst>
       <pc:sldChg chg="modSp">
-        <pc:chgData name="Thomas Buchegger" userId="e9d10f62-fa07-4fc1-9248-edcb138c70e1" providerId="ADAL" clId="{3120C776-606B-4AD1-8FEF-BC15473D7B81}" dt="2020-12-12T14:25:46.253" v="263" actId="20577"/>
+        <pc:chgData name="Thomas Buchegger" userId="e9d10f62-fa07-4fc1-9248-edcb138c70e1" providerId="ADAL" clId="{3120C776-606B-4AD1-8FEF-BC15473D7B81}" dt="2020-12-12T17:33:00.103" v="483" actId="20577"/>
+        <pc:sldMkLst>
+          <pc:docMk/>
+          <pc:sldMk cId="4040610606" sldId="300"/>
+        </pc:sldMkLst>
+        <pc:spChg chg="mod">
+          <ac:chgData name="Thomas Buchegger" userId="e9d10f62-fa07-4fc1-9248-edcb138c70e1" providerId="ADAL" clId="{3120C776-606B-4AD1-8FEF-BC15473D7B81}" dt="2020-12-12T17:33:00.103" v="483" actId="20577"/>
+          <ac:spMkLst>
+            <pc:docMk/>
+            <pc:sldMk cId="4040610606" sldId="300"/>
+            <ac:spMk id="10" creationId="{9D1F3275-E823-4A81-A525-BE4A46BC9ACA}"/>
+          </ac:spMkLst>
+        </pc:spChg>
+      </pc:sldChg>
+      <pc:sldChg chg="modSp del">
+        <pc:chgData name="Thomas Buchegger" userId="e9d10f62-fa07-4fc1-9248-edcb138c70e1" providerId="ADAL" clId="{3120C776-606B-4AD1-8FEF-BC15473D7B81}" dt="2020-12-12T17:32:51.406" v="471" actId="2696"/>
         <pc:sldMkLst>
           <pc:docMk/>
           <pc:sldMk cId="69429724" sldId="307"/>
@@ -182,7 +196,7 @@
         </pc:spChg>
       </pc:sldChg>
       <pc:sldChg chg="addSp delSp modSp add">
-        <pc:chgData name="Thomas Buchegger" userId="e9d10f62-fa07-4fc1-9248-edcb138c70e1" providerId="ADAL" clId="{3120C776-606B-4AD1-8FEF-BC15473D7B81}" dt="2020-12-12T14:21:00.840" v="105" actId="1076"/>
+        <pc:chgData name="Thomas Buchegger" userId="e9d10f62-fa07-4fc1-9248-edcb138c70e1" providerId="ADAL" clId="{3120C776-606B-4AD1-8FEF-BC15473D7B81}" dt="2020-12-12T17:29:17.670" v="367"/>
         <pc:sldMkLst>
           <pc:docMk/>
           <pc:sldMk cId="1690283129" sldId="320"/>
@@ -211,20 +225,68 @@
             <ac:spMk id="4" creationId="{6FE86AC5-1D02-4640-82C8-5799DA9319B8}"/>
           </ac:spMkLst>
         </pc:spChg>
-        <pc:picChg chg="add mod">
-          <ac:chgData name="Thomas Buchegger" userId="e9d10f62-fa07-4fc1-9248-edcb138c70e1" providerId="ADAL" clId="{3120C776-606B-4AD1-8FEF-BC15473D7B81}" dt="2020-12-12T14:20:34.235" v="99" actId="962"/>
+        <pc:spChg chg="add del mod">
+          <ac:chgData name="Thomas Buchegger" userId="e9d10f62-fa07-4fc1-9248-edcb138c70e1" providerId="ADAL" clId="{3120C776-606B-4AD1-8FEF-BC15473D7B81}" dt="2020-12-12T17:27:33.860" v="346" actId="478"/>
+          <ac:spMkLst>
+            <pc:docMk/>
+            <pc:sldMk cId="1690283129" sldId="320"/>
+            <ac:spMk id="5" creationId="{2AA2489B-772A-4920-B596-CB1886FA07BC}"/>
+          </ac:spMkLst>
+        </pc:spChg>
+        <pc:spChg chg="add del mod">
+          <ac:chgData name="Thomas Buchegger" userId="e9d10f62-fa07-4fc1-9248-edcb138c70e1" providerId="ADAL" clId="{3120C776-606B-4AD1-8FEF-BC15473D7B81}" dt="2020-12-12T17:28:20.731" v="355" actId="478"/>
+          <ac:spMkLst>
+            <pc:docMk/>
+            <pc:sldMk cId="1690283129" sldId="320"/>
+            <ac:spMk id="11" creationId="{4C57E7A2-3267-4CA5-901D-B824D7B48D04}"/>
+          </ac:spMkLst>
+        </pc:spChg>
+        <pc:spChg chg="add del">
+          <ac:chgData name="Thomas Buchegger" userId="e9d10f62-fa07-4fc1-9248-edcb138c70e1" providerId="ADAL" clId="{3120C776-606B-4AD1-8FEF-BC15473D7B81}" dt="2020-12-12T17:29:17.670" v="367"/>
+          <ac:spMkLst>
+            <pc:docMk/>
+            <pc:sldMk cId="1690283129" sldId="320"/>
+            <ac:spMk id="16" creationId="{AC07FDAA-529D-43A3-8826-E59F980D6BC2}"/>
+          </ac:spMkLst>
+        </pc:spChg>
+        <pc:picChg chg="add del mod">
+          <ac:chgData name="Thomas Buchegger" userId="e9d10f62-fa07-4fc1-9248-edcb138c70e1" providerId="ADAL" clId="{3120C776-606B-4AD1-8FEF-BC15473D7B81}" dt="2020-12-12T17:28:06.536" v="353" actId="478"/>
           <ac:picMkLst>
             <pc:docMk/>
             <pc:sldMk cId="1690283129" sldId="320"/>
             <ac:picMk id="6" creationId="{67F5AF55-498C-4D1E-9007-54D85CF02C3E}"/>
           </ac:picMkLst>
         </pc:picChg>
-        <pc:picChg chg="add mod">
-          <ac:chgData name="Thomas Buchegger" userId="e9d10f62-fa07-4fc1-9248-edcb138c70e1" providerId="ADAL" clId="{3120C776-606B-4AD1-8FEF-BC15473D7B81}" dt="2020-12-12T14:21:00.840" v="105" actId="1076"/>
+        <pc:picChg chg="add del mod">
+          <ac:chgData name="Thomas Buchegger" userId="e9d10f62-fa07-4fc1-9248-edcb138c70e1" providerId="ADAL" clId="{3120C776-606B-4AD1-8FEF-BC15473D7B81}" dt="2020-12-12T17:28:21.747" v="356" actId="478"/>
           <ac:picMkLst>
             <pc:docMk/>
             <pc:sldMk cId="1690283129" sldId="320"/>
             <ac:picMk id="8" creationId="{C43DB024-B304-4223-9193-5DEF2EE59902}"/>
+          </ac:picMkLst>
+        </pc:picChg>
+        <pc:picChg chg="add mod modCrop">
+          <ac:chgData name="Thomas Buchegger" userId="e9d10f62-fa07-4fc1-9248-edcb138c70e1" providerId="ADAL" clId="{3120C776-606B-4AD1-8FEF-BC15473D7B81}" dt="2020-12-12T17:28:50.882" v="361" actId="732"/>
+          <ac:picMkLst>
+            <pc:docMk/>
+            <pc:sldMk cId="1690283129" sldId="320"/>
+            <ac:picMk id="9" creationId="{4449003B-DB37-4B1F-8510-623B2311E3A4}"/>
+          </ac:picMkLst>
+        </pc:picChg>
+        <pc:picChg chg="add del mod">
+          <ac:chgData name="Thomas Buchegger" userId="e9d10f62-fa07-4fc1-9248-edcb138c70e1" providerId="ADAL" clId="{3120C776-606B-4AD1-8FEF-BC15473D7B81}" dt="2020-12-12T17:28:41.987" v="359" actId="478"/>
+          <ac:picMkLst>
+            <pc:docMk/>
+            <pc:sldMk cId="1690283129" sldId="320"/>
+            <ac:picMk id="13" creationId="{F35D98DD-44DA-4EE3-8FAC-9FD7BA4B4386}"/>
+          </ac:picMkLst>
+        </pc:picChg>
+        <pc:picChg chg="add mod">
+          <ac:chgData name="Thomas Buchegger" userId="e9d10f62-fa07-4fc1-9248-edcb138c70e1" providerId="ADAL" clId="{3120C776-606B-4AD1-8FEF-BC15473D7B81}" dt="2020-12-12T17:29:12.569" v="365" actId="1076"/>
+          <ac:picMkLst>
+            <pc:docMk/>
+            <pc:sldMk cId="1690283129" sldId="320"/>
+            <ac:picMk id="15" creationId="{8FD59BA3-8F5B-48C7-8933-22B7B4D654B7}"/>
           </ac:picMkLst>
         </pc:picChg>
       </pc:sldChg>
@@ -267,8 +329,8 @@
           </ac:picMkLst>
         </pc:picChg>
       </pc:sldChg>
-      <pc:sldChg chg="addSp delSp modSp add">
-        <pc:chgData name="Thomas Buchegger" userId="e9d10f62-fa07-4fc1-9248-edcb138c70e1" providerId="ADAL" clId="{3120C776-606B-4AD1-8FEF-BC15473D7B81}" dt="2020-12-12T14:22:07.018" v="122" actId="1076"/>
+      <pc:sldChg chg="addSp delSp modSp add del">
+        <pc:chgData name="Thomas Buchegger" userId="e9d10f62-fa07-4fc1-9248-edcb138c70e1" providerId="ADAL" clId="{3120C776-606B-4AD1-8FEF-BC15473D7B81}" dt="2020-12-12T17:27:24.131" v="340" actId="2696"/>
         <pc:sldMkLst>
           <pc:docMk/>
           <pc:sldMk cId="982483946" sldId="321"/>
@@ -305,8 +367,8 @@
           <pc:sldMk cId="3296292100" sldId="321"/>
         </pc:sldMkLst>
       </pc:sldChg>
-      <pc:sldChg chg="addSp delSp modSp add">
-        <pc:chgData name="Thomas Buchegger" userId="e9d10f62-fa07-4fc1-9248-edcb138c70e1" providerId="ADAL" clId="{3120C776-606B-4AD1-8FEF-BC15473D7B81}" dt="2020-12-12T14:22:53.330" v="136" actId="1076"/>
+      <pc:sldChg chg="addSp delSp modSp add del">
+        <pc:chgData name="Thomas Buchegger" userId="e9d10f62-fa07-4fc1-9248-edcb138c70e1" providerId="ADAL" clId="{3120C776-606B-4AD1-8FEF-BC15473D7B81}" dt="2020-12-12T17:27:25.103" v="341" actId="2696"/>
         <pc:sldMkLst>
           <pc:docMk/>
           <pc:sldMk cId="173124273" sldId="322"/>
@@ -336,8 +398,8 @@
           </ac:picMkLst>
         </pc:picChg>
       </pc:sldChg>
-      <pc:sldChg chg="addSp delSp modSp add">
-        <pc:chgData name="Thomas Buchegger" userId="e9d10f62-fa07-4fc1-9248-edcb138c70e1" providerId="ADAL" clId="{3120C776-606B-4AD1-8FEF-BC15473D7B81}" dt="2020-12-12T14:29:20.611" v="339" actId="1076"/>
+      <pc:sldChg chg="addSp delSp modSp add del">
+        <pc:chgData name="Thomas Buchegger" userId="e9d10f62-fa07-4fc1-9248-edcb138c70e1" providerId="ADAL" clId="{3120C776-606B-4AD1-8FEF-BC15473D7B81}" dt="2020-12-12T17:27:25.520" v="342" actId="2696"/>
         <pc:sldMkLst>
           <pc:docMk/>
           <pc:sldMk cId="4002181805" sldId="323"/>
@@ -375,8 +437,8 @@
           </ac:picMkLst>
         </pc:picChg>
       </pc:sldChg>
-      <pc:sldChg chg="addSp delSp modSp add">
-        <pc:chgData name="Thomas Buchegger" userId="e9d10f62-fa07-4fc1-9248-edcb138c70e1" providerId="ADAL" clId="{3120C776-606B-4AD1-8FEF-BC15473D7B81}" dt="2020-12-12T14:24:16.194" v="179" actId="1076"/>
+      <pc:sldChg chg="addSp delSp modSp add del">
+        <pc:chgData name="Thomas Buchegger" userId="e9d10f62-fa07-4fc1-9248-edcb138c70e1" providerId="ADAL" clId="{3120C776-606B-4AD1-8FEF-BC15473D7B81}" dt="2020-12-12T17:27:25.741" v="343" actId="2696"/>
         <pc:sldMkLst>
           <pc:docMk/>
           <pc:sldMk cId="3740360723" sldId="324"/>
@@ -406,8 +468,8 @@
           </ac:picMkLst>
         </pc:picChg>
       </pc:sldChg>
-      <pc:sldChg chg="addSp delSp modSp add">
-        <pc:chgData name="Thomas Buchegger" userId="e9d10f62-fa07-4fc1-9248-edcb138c70e1" providerId="ADAL" clId="{3120C776-606B-4AD1-8FEF-BC15473D7B81}" dt="2020-12-12T14:24:47.127" v="193" actId="1076"/>
+      <pc:sldChg chg="addSp delSp modSp add del">
+        <pc:chgData name="Thomas Buchegger" userId="e9d10f62-fa07-4fc1-9248-edcb138c70e1" providerId="ADAL" clId="{3120C776-606B-4AD1-8FEF-BC15473D7B81}" dt="2020-12-12T17:27:25.889" v="344" actId="2696"/>
         <pc:sldMkLst>
           <pc:docMk/>
           <pc:sldMk cId="1269174725" sldId="325"/>
@@ -438,13 +500,13 @@
         </pc:picChg>
       </pc:sldChg>
       <pc:sldChg chg="modSp add">
-        <pc:chgData name="Thomas Buchegger" userId="e9d10f62-fa07-4fc1-9248-edcb138c70e1" providerId="ADAL" clId="{3120C776-606B-4AD1-8FEF-BC15473D7B81}" dt="2020-12-12T14:26:34.287" v="332" actId="5793"/>
+        <pc:chgData name="Thomas Buchegger" userId="e9d10f62-fa07-4fc1-9248-edcb138c70e1" providerId="ADAL" clId="{3120C776-606B-4AD1-8FEF-BC15473D7B81}" dt="2020-12-12T17:33:14.574" v="487" actId="20577"/>
         <pc:sldMkLst>
           <pc:docMk/>
           <pc:sldMk cId="1499650226" sldId="326"/>
         </pc:sldMkLst>
         <pc:spChg chg="mod">
-          <ac:chgData name="Thomas Buchegger" userId="e9d10f62-fa07-4fc1-9248-edcb138c70e1" providerId="ADAL" clId="{3120C776-606B-4AD1-8FEF-BC15473D7B81}" dt="2020-12-12T14:26:08.312" v="292" actId="20577"/>
+          <ac:chgData name="Thomas Buchegger" userId="e9d10f62-fa07-4fc1-9248-edcb138c70e1" providerId="ADAL" clId="{3120C776-606B-4AD1-8FEF-BC15473D7B81}" dt="2020-12-12T17:33:14.574" v="487" actId="20577"/>
           <ac:spMkLst>
             <pc:docMk/>
             <pc:sldMk cId="1499650226" sldId="326"/>
@@ -452,7 +514,7 @@
           </ac:spMkLst>
         </pc:spChg>
         <pc:spChg chg="mod">
-          <ac:chgData name="Thomas Buchegger" userId="e9d10f62-fa07-4fc1-9248-edcb138c70e1" providerId="ADAL" clId="{3120C776-606B-4AD1-8FEF-BC15473D7B81}" dt="2020-12-12T14:26:00.188" v="271" actId="20577"/>
+          <ac:chgData name="Thomas Buchegger" userId="e9d10f62-fa07-4fc1-9248-edcb138c70e1" providerId="ADAL" clId="{3120C776-606B-4AD1-8FEF-BC15473D7B81}" dt="2020-12-12T17:32:48.158" v="470" actId="20577"/>
           <ac:spMkLst>
             <pc:docMk/>
             <pc:sldMk cId="1499650226" sldId="326"/>
@@ -460,7 +522,7 @@
           </ac:spMkLst>
         </pc:spChg>
         <pc:spChg chg="mod">
-          <ac:chgData name="Thomas Buchegger" userId="e9d10f62-fa07-4fc1-9248-edcb138c70e1" providerId="ADAL" clId="{3120C776-606B-4AD1-8FEF-BC15473D7B81}" dt="2020-12-12T14:26:34.287" v="332" actId="5793"/>
+          <ac:chgData name="Thomas Buchegger" userId="e9d10f62-fa07-4fc1-9248-edcb138c70e1" providerId="ADAL" clId="{3120C776-606B-4AD1-8FEF-BC15473D7B81}" dt="2020-12-12T17:33:05.992" v="484" actId="20577"/>
           <ac:spMkLst>
             <pc:docMk/>
             <pc:sldMk cId="1499650226" sldId="326"/>
@@ -468,6 +530,176 @@
           </ac:spMkLst>
         </pc:spChg>
       </pc:sldChg>
+      <pc:sldChg chg="addSp delSp modSp add">
+        <pc:chgData name="Thomas Buchegger" userId="e9d10f62-fa07-4fc1-9248-edcb138c70e1" providerId="ADAL" clId="{3120C776-606B-4AD1-8FEF-BC15473D7B81}" dt="2020-12-12T17:29:53.618" v="380" actId="20577"/>
+        <pc:sldMkLst>
+          <pc:docMk/>
+          <pc:sldMk cId="45481676" sldId="327"/>
+        </pc:sldMkLst>
+        <pc:spChg chg="mod">
+          <ac:chgData name="Thomas Buchegger" userId="e9d10f62-fa07-4fc1-9248-edcb138c70e1" providerId="ADAL" clId="{3120C776-606B-4AD1-8FEF-BC15473D7B81}" dt="2020-12-12T17:29:53.618" v="380" actId="20577"/>
+          <ac:spMkLst>
+            <pc:docMk/>
+            <pc:sldMk cId="45481676" sldId="327"/>
+            <ac:spMk id="2" creationId="{A197240E-0A12-4915-BFBD-9C4B18DA53B4}"/>
+          </ac:spMkLst>
+        </pc:spChg>
+        <pc:picChg chg="add mod">
+          <ac:chgData name="Thomas Buchegger" userId="e9d10f62-fa07-4fc1-9248-edcb138c70e1" providerId="ADAL" clId="{3120C776-606B-4AD1-8FEF-BC15473D7B81}" dt="2020-12-12T17:29:42.641" v="377" actId="1076"/>
+          <ac:picMkLst>
+            <pc:docMk/>
+            <pc:sldMk cId="45481676" sldId="327"/>
+            <ac:picMk id="5" creationId="{298F3FBF-74C3-404D-B8B2-2CBFA922A9EF}"/>
+          </ac:picMkLst>
+        </pc:picChg>
+        <pc:picChg chg="del">
+          <ac:chgData name="Thomas Buchegger" userId="e9d10f62-fa07-4fc1-9248-edcb138c70e1" providerId="ADAL" clId="{3120C776-606B-4AD1-8FEF-BC15473D7B81}" dt="2020-12-12T17:29:27.394" v="373" actId="478"/>
+          <ac:picMkLst>
+            <pc:docMk/>
+            <pc:sldMk cId="45481676" sldId="327"/>
+            <ac:picMk id="15" creationId="{8FD59BA3-8F5B-48C7-8933-22B7B4D654B7}"/>
+          </ac:picMkLst>
+        </pc:picChg>
+      </pc:sldChg>
+      <pc:sldChg chg="addSp delSp modSp add">
+        <pc:chgData name="Thomas Buchegger" userId="e9d10f62-fa07-4fc1-9248-edcb138c70e1" providerId="ADAL" clId="{3120C776-606B-4AD1-8FEF-BC15473D7B81}" dt="2020-12-12T17:30:26.585" v="407" actId="20577"/>
+        <pc:sldMkLst>
+          <pc:docMk/>
+          <pc:sldMk cId="1662431265" sldId="328"/>
+        </pc:sldMkLst>
+        <pc:spChg chg="mod">
+          <ac:chgData name="Thomas Buchegger" userId="e9d10f62-fa07-4fc1-9248-edcb138c70e1" providerId="ADAL" clId="{3120C776-606B-4AD1-8FEF-BC15473D7B81}" dt="2020-12-12T17:30:26.585" v="407" actId="20577"/>
+          <ac:spMkLst>
+            <pc:docMk/>
+            <pc:sldMk cId="1662431265" sldId="328"/>
+            <ac:spMk id="2" creationId="{A197240E-0A12-4915-BFBD-9C4B18DA53B4}"/>
+          </ac:spMkLst>
+        </pc:spChg>
+        <pc:picChg chg="add mod">
+          <ac:chgData name="Thomas Buchegger" userId="e9d10f62-fa07-4fc1-9248-edcb138c70e1" providerId="ADAL" clId="{3120C776-606B-4AD1-8FEF-BC15473D7B81}" dt="2020-12-12T17:30:20.151" v="385" actId="1076"/>
+          <ac:picMkLst>
+            <pc:docMk/>
+            <pc:sldMk cId="1662431265" sldId="328"/>
+            <ac:picMk id="5" creationId="{FDBF7E6D-32AE-4C28-A244-F0DE981FD8A8}"/>
+          </ac:picMkLst>
+        </pc:picChg>
+        <pc:picChg chg="del">
+          <ac:chgData name="Thomas Buchegger" userId="e9d10f62-fa07-4fc1-9248-edcb138c70e1" providerId="ADAL" clId="{3120C776-606B-4AD1-8FEF-BC15473D7B81}" dt="2020-12-12T17:29:59.025" v="381" actId="478"/>
+          <ac:picMkLst>
+            <pc:docMk/>
+            <pc:sldMk cId="1662431265" sldId="328"/>
+            <ac:picMk id="15" creationId="{8FD59BA3-8F5B-48C7-8933-22B7B4D654B7}"/>
+          </ac:picMkLst>
+        </pc:picChg>
+      </pc:sldChg>
+      <pc:sldChg chg="addSp delSp modSp add">
+        <pc:chgData name="Thomas Buchegger" userId="e9d10f62-fa07-4fc1-9248-edcb138c70e1" providerId="ADAL" clId="{3120C776-606B-4AD1-8FEF-BC15473D7B81}" dt="2020-12-12T17:30:55.546" v="420" actId="20577"/>
+        <pc:sldMkLst>
+          <pc:docMk/>
+          <pc:sldMk cId="4224651672" sldId="329"/>
+        </pc:sldMkLst>
+        <pc:spChg chg="mod">
+          <ac:chgData name="Thomas Buchegger" userId="e9d10f62-fa07-4fc1-9248-edcb138c70e1" providerId="ADAL" clId="{3120C776-606B-4AD1-8FEF-BC15473D7B81}" dt="2020-12-12T17:30:55.546" v="420" actId="20577"/>
+          <ac:spMkLst>
+            <pc:docMk/>
+            <pc:sldMk cId="4224651672" sldId="329"/>
+            <ac:spMk id="2" creationId="{A197240E-0A12-4915-BFBD-9C4B18DA53B4}"/>
+          </ac:spMkLst>
+        </pc:spChg>
+        <pc:picChg chg="add mod">
+          <ac:chgData name="Thomas Buchegger" userId="e9d10f62-fa07-4fc1-9248-edcb138c70e1" providerId="ADAL" clId="{3120C776-606B-4AD1-8FEF-BC15473D7B81}" dt="2020-12-12T17:30:47.213" v="412" actId="1076"/>
+          <ac:picMkLst>
+            <pc:docMk/>
+            <pc:sldMk cId="4224651672" sldId="329"/>
+            <ac:picMk id="5" creationId="{683AD4BC-DA5A-4952-8B7E-88F844FF33A2}"/>
+          </ac:picMkLst>
+        </pc:picChg>
+        <pc:picChg chg="del">
+          <ac:chgData name="Thomas Buchegger" userId="e9d10f62-fa07-4fc1-9248-edcb138c70e1" providerId="ADAL" clId="{3120C776-606B-4AD1-8FEF-BC15473D7B81}" dt="2020-12-12T17:30:31.217" v="408" actId="478"/>
+          <ac:picMkLst>
+            <pc:docMk/>
+            <pc:sldMk cId="4224651672" sldId="329"/>
+            <ac:picMk id="15" creationId="{8FD59BA3-8F5B-48C7-8933-22B7B4D654B7}"/>
+          </ac:picMkLst>
+        </pc:picChg>
+      </pc:sldChg>
+      <pc:sldChg chg="addSp delSp modSp add">
+        <pc:chgData name="Thomas Buchegger" userId="e9d10f62-fa07-4fc1-9248-edcb138c70e1" providerId="ADAL" clId="{3120C776-606B-4AD1-8FEF-BC15473D7B81}" dt="2020-12-12T17:31:35.732" v="449" actId="20577"/>
+        <pc:sldMkLst>
+          <pc:docMk/>
+          <pc:sldMk cId="83481377" sldId="330"/>
+        </pc:sldMkLst>
+        <pc:spChg chg="mod">
+          <ac:chgData name="Thomas Buchegger" userId="e9d10f62-fa07-4fc1-9248-edcb138c70e1" providerId="ADAL" clId="{3120C776-606B-4AD1-8FEF-BC15473D7B81}" dt="2020-12-12T17:31:35.732" v="449" actId="20577"/>
+          <ac:spMkLst>
+            <pc:docMk/>
+            <pc:sldMk cId="83481377" sldId="330"/>
+            <ac:spMk id="2" creationId="{A197240E-0A12-4915-BFBD-9C4B18DA53B4}"/>
+          </ac:spMkLst>
+        </pc:spChg>
+        <pc:picChg chg="add mod">
+          <ac:chgData name="Thomas Buchegger" userId="e9d10f62-fa07-4fc1-9248-edcb138c70e1" providerId="ADAL" clId="{3120C776-606B-4AD1-8FEF-BC15473D7B81}" dt="2020-12-12T17:31:25.924" v="425" actId="1076"/>
+          <ac:picMkLst>
+            <pc:docMk/>
+            <pc:sldMk cId="83481377" sldId="330"/>
+            <ac:picMk id="5" creationId="{9CA855F3-5356-4476-B8B2-D7CE90B22A21}"/>
+          </ac:picMkLst>
+        </pc:picChg>
+        <pc:picChg chg="del">
+          <ac:chgData name="Thomas Buchegger" userId="e9d10f62-fa07-4fc1-9248-edcb138c70e1" providerId="ADAL" clId="{3120C776-606B-4AD1-8FEF-BC15473D7B81}" dt="2020-12-12T17:31:00.472" v="421" actId="478"/>
+          <ac:picMkLst>
+            <pc:docMk/>
+            <pc:sldMk cId="83481377" sldId="330"/>
+            <ac:picMk id="15" creationId="{8FD59BA3-8F5B-48C7-8933-22B7B4D654B7}"/>
+          </ac:picMkLst>
+        </pc:picChg>
+      </pc:sldChg>
+      <pc:sldChg chg="addSp delSp modSp add">
+        <pc:chgData name="Thomas Buchegger" userId="e9d10f62-fa07-4fc1-9248-edcb138c70e1" providerId="ADAL" clId="{3120C776-606B-4AD1-8FEF-BC15473D7B81}" dt="2020-12-12T17:32:18.147" v="460" actId="1076"/>
+        <pc:sldMkLst>
+          <pc:docMk/>
+          <pc:sldMk cId="1049472527" sldId="331"/>
+        </pc:sldMkLst>
+        <pc:spChg chg="mod">
+          <ac:chgData name="Thomas Buchegger" userId="e9d10f62-fa07-4fc1-9248-edcb138c70e1" providerId="ADAL" clId="{3120C776-606B-4AD1-8FEF-BC15473D7B81}" dt="2020-12-12T17:31:41.432" v="455" actId="20577"/>
+          <ac:spMkLst>
+            <pc:docMk/>
+            <pc:sldMk cId="1049472527" sldId="331"/>
+            <ac:spMk id="2" creationId="{A197240E-0A12-4915-BFBD-9C4B18DA53B4}"/>
+          </ac:spMkLst>
+        </pc:spChg>
+        <pc:picChg chg="add mod">
+          <ac:chgData name="Thomas Buchegger" userId="e9d10f62-fa07-4fc1-9248-edcb138c70e1" providerId="ADAL" clId="{3120C776-606B-4AD1-8FEF-BC15473D7B81}" dt="2020-12-12T17:32:18.147" v="460" actId="1076"/>
+          <ac:picMkLst>
+            <pc:docMk/>
+            <pc:sldMk cId="1049472527" sldId="331"/>
+            <ac:picMk id="5" creationId="{B7D24D52-CF9B-493E-918B-23DD8F1FCFB6}"/>
+          </ac:picMkLst>
+        </pc:picChg>
+        <pc:picChg chg="del">
+          <ac:chgData name="Thomas Buchegger" userId="e9d10f62-fa07-4fc1-9248-edcb138c70e1" providerId="ADAL" clId="{3120C776-606B-4AD1-8FEF-BC15473D7B81}" dt="2020-12-12T17:31:48.063" v="456" actId="478"/>
+          <ac:picMkLst>
+            <pc:docMk/>
+            <pc:sldMk cId="1049472527" sldId="331"/>
+            <ac:picMk id="15" creationId="{8FD59BA3-8F5B-48C7-8933-22B7B4D654B7}"/>
+          </ac:picMkLst>
+        </pc:picChg>
+      </pc:sldChg>
+      <pc:sldMasterChg chg="delSldLayout">
+        <pc:chgData name="Thomas Buchegger" userId="e9d10f62-fa07-4fc1-9248-edcb138c70e1" providerId="ADAL" clId="{3120C776-606B-4AD1-8FEF-BC15473D7B81}" dt="2020-12-12T17:32:51.408" v="472" actId="2696"/>
+        <pc:sldMasterMkLst>
+          <pc:docMk/>
+          <pc:sldMasterMk cId="742856631" sldId="2147483748"/>
+        </pc:sldMasterMkLst>
+        <pc:sldLayoutChg chg="del">
+          <pc:chgData name="Thomas Buchegger" userId="e9d10f62-fa07-4fc1-9248-edcb138c70e1" providerId="ADAL" clId="{3120C776-606B-4AD1-8FEF-BC15473D7B81}" dt="2020-12-12T17:32:51.408" v="472" actId="2696"/>
+          <pc:sldLayoutMkLst>
+            <pc:docMk/>
+            <pc:sldMasterMk cId="742856631" sldId="2147483748"/>
+            <pc:sldLayoutMk cId="3455000372" sldId="2147483777"/>
+          </pc:sldLayoutMkLst>
+        </pc:sldLayoutChg>
+      </pc:sldMasterChg>
     </pc:docChg>
   </pc:docChgLst>
   <pc:docChgLst>
@@ -7966,352 +8198,6 @@
 
 <file path=ppt/slideLayouts/slideLayout10.xml><?xml version="1.0" encoding="utf-8"?>
 <p:sldLayout xmlns:a="http://schemas.openxmlformats.org/drawingml/2006/main" xmlns:r="http://schemas.openxmlformats.org/officeDocument/2006/relationships" xmlns:p="http://schemas.openxmlformats.org/presentationml/2006/main" preserve="1" userDrawn="1">
-  <p:cSld name="7a: Folie für Grafik/Bild">
-    <p:spTree>
-      <p:nvGrpSpPr>
-        <p:cNvPr id="1" name=""/>
-        <p:cNvGrpSpPr/>
-        <p:nvPr/>
-      </p:nvGrpSpPr>
-      <p:grpSpPr>
-        <a:xfrm>
-          <a:off x="0" y="0"/>
-          <a:ext cx="0" cy="0"/>
-          <a:chOff x="0" y="0"/>
-          <a:chExt cx="0" cy="0"/>
-        </a:xfrm>
-      </p:grpSpPr>
-      <p:sp>
-        <p:nvSpPr>
-          <p:cNvPr id="6" name="Inhaltsplatzhalter 2">
-            <a:extLst>
-              <a:ext uri="{FF2B5EF4-FFF2-40B4-BE49-F238E27FC236}">
-                <a16:creationId xmlns:a16="http://schemas.microsoft.com/office/drawing/2014/main" id="{90318CE9-39BE-CB41-9E7E-545A530383E2}"/>
-              </a:ext>
-            </a:extLst>
-          </p:cNvPr>
-          <p:cNvSpPr>
-            <a:spLocks noGrp="1"/>
-          </p:cNvSpPr>
-          <p:nvPr>
-            <p:ph sz="half" idx="1" hasCustomPrompt="1"/>
-          </p:nvPr>
-        </p:nvSpPr>
-        <p:spPr>
-          <a:xfrm>
-            <a:off x="0" y="1926000"/>
-            <a:ext cx="9144000" cy="3060000"/>
-          </a:xfrm>
-          <a:prstGeom prst="rect">
-            <a:avLst/>
-          </a:prstGeom>
-          <a:solidFill>
-            <a:schemeClr val="bg1">
-              <a:lumMod val="85000"/>
-            </a:schemeClr>
-          </a:solidFill>
-        </p:spPr>
-        <p:txBody>
-          <a:bodyPr lIns="0" tIns="0" rIns="0" bIns="0"/>
-          <a:lstStyle>
-            <a:lvl1pPr marL="0" indent="0">
-              <a:buNone/>
-              <a:defRPr sz="2000">
-                <a:latin typeface="Arial" panose="020B0604020202020204" pitchFamily="34" charset="0"/>
-                <a:cs typeface="Arial" panose="020B0604020202020204" pitchFamily="34" charset="0"/>
-              </a:defRPr>
-            </a:lvl1pPr>
-          </a:lstStyle>
-          <a:p>
-            <a:pPr lvl="0"/>
-            <a:r>
-              <a:rPr lang="de-DE" dirty="0"/>
-              <a:t>        Media Platzhalter: 25.4 (b) x 8.5 (h) cm </a:t>
-            </a:r>
-          </a:p>
-        </p:txBody>
-      </p:sp>
-      <p:sp>
-        <p:nvSpPr>
-          <p:cNvPr id="5" name="Textplatzhalter 2">
-            <a:extLst>
-              <a:ext uri="{FF2B5EF4-FFF2-40B4-BE49-F238E27FC236}">
-                <a16:creationId xmlns:a16="http://schemas.microsoft.com/office/drawing/2014/main" id="{4A7E35E8-11B1-964A-B3B7-ABCDE11750B9}"/>
-              </a:ext>
-            </a:extLst>
-          </p:cNvPr>
-          <p:cNvSpPr>
-            <a:spLocks noGrp="1"/>
-          </p:cNvSpPr>
-          <p:nvPr>
-            <p:ph type="body" idx="11" hasCustomPrompt="1"/>
-          </p:nvPr>
-        </p:nvSpPr>
-        <p:spPr>
-          <a:xfrm>
-            <a:off x="540000" y="1170000"/>
-            <a:ext cx="7020000" cy="410369"/>
-          </a:xfrm>
-          <a:prstGeom prst="rect">
-            <a:avLst/>
-          </a:prstGeom>
-        </p:spPr>
-        <p:txBody>
-          <a:bodyPr lIns="0" tIns="0" rIns="0" bIns="0" anchor="t">
-            <a:spAutoFit/>
-          </a:bodyPr>
-          <a:lstStyle>
-            <a:lvl1pPr marL="0" marR="0" indent="0" algn="l" defTabSz="914377" rtl="0" eaLnBrk="1" fontAlgn="auto" latinLnBrk="0" hangingPunct="1">
-              <a:lnSpc>
-                <a:spcPts val="3200"/>
-              </a:lnSpc>
-              <a:spcBef>
-                <a:spcPts val="0"/>
-              </a:spcBef>
-              <a:spcAft>
-                <a:spcPts val="0"/>
-              </a:spcAft>
-              <a:buClrTx/>
-              <a:buSzTx/>
-              <a:buFont typeface="Arial" panose="020B0604020202020204" pitchFamily="34" charset="0"/>
-              <a:buNone/>
-              <a:tabLst/>
-              <a:defRPr sz="2800">
-                <a:solidFill>
-                  <a:schemeClr val="tx1"/>
-                </a:solidFill>
-                <a:latin typeface="Arial" panose="020B0604020202020204" pitchFamily="34" charset="0"/>
-                <a:cs typeface="Arial" panose="020B0604020202020204" pitchFamily="34" charset="0"/>
-              </a:defRPr>
-            </a:lvl1pPr>
-            <a:lvl2pPr marL="457189" indent="0">
-              <a:buNone/>
-              <a:defRPr sz="2000">
-                <a:solidFill>
-                  <a:schemeClr val="tx1">
-                    <a:tint val="75000"/>
-                  </a:schemeClr>
-                </a:solidFill>
-              </a:defRPr>
-            </a:lvl2pPr>
-            <a:lvl3pPr marL="914377" indent="0">
-              <a:buNone/>
-              <a:defRPr sz="1800">
-                <a:solidFill>
-                  <a:schemeClr val="tx1">
-                    <a:tint val="75000"/>
-                  </a:schemeClr>
-                </a:solidFill>
-              </a:defRPr>
-            </a:lvl3pPr>
-            <a:lvl4pPr marL="1371566" indent="0">
-              <a:buNone/>
-              <a:defRPr sz="1600">
-                <a:solidFill>
-                  <a:schemeClr val="tx1">
-                    <a:tint val="75000"/>
-                  </a:schemeClr>
-                </a:solidFill>
-              </a:defRPr>
-            </a:lvl4pPr>
-            <a:lvl5pPr marL="1828754" indent="0">
-              <a:buNone/>
-              <a:defRPr sz="1600">
-                <a:solidFill>
-                  <a:schemeClr val="tx1">
-                    <a:tint val="75000"/>
-                  </a:schemeClr>
-                </a:solidFill>
-              </a:defRPr>
-            </a:lvl5pPr>
-            <a:lvl6pPr marL="2285943" indent="0">
-              <a:buNone/>
-              <a:defRPr sz="1600">
-                <a:solidFill>
-                  <a:schemeClr val="tx1">
-                    <a:tint val="75000"/>
-                  </a:schemeClr>
-                </a:solidFill>
-              </a:defRPr>
-            </a:lvl6pPr>
-            <a:lvl7pPr marL="2743131" indent="0">
-              <a:buNone/>
-              <a:defRPr sz="1600">
-                <a:solidFill>
-                  <a:schemeClr val="tx1">
-                    <a:tint val="75000"/>
-                  </a:schemeClr>
-                </a:solidFill>
-              </a:defRPr>
-            </a:lvl7pPr>
-            <a:lvl8pPr marL="3200320" indent="0">
-              <a:buNone/>
-              <a:defRPr sz="1600">
-                <a:solidFill>
-                  <a:schemeClr val="tx1">
-                    <a:tint val="75000"/>
-                  </a:schemeClr>
-                </a:solidFill>
-              </a:defRPr>
-            </a:lvl8pPr>
-            <a:lvl9pPr marL="3657509" indent="0">
-              <a:buNone/>
-              <a:defRPr sz="1600">
-                <a:solidFill>
-                  <a:schemeClr val="tx1">
-                    <a:tint val="75000"/>
-                  </a:schemeClr>
-                </a:solidFill>
-              </a:defRPr>
-            </a:lvl9pPr>
-          </a:lstStyle>
-          <a:p>
-            <a:pPr lvl="0"/>
-            <a:r>
-              <a:rPr lang="de-DE" dirty="0"/>
-              <a:t>Titel B (Arial 28pt., schwarz, max. 1 Zeile) </a:t>
-            </a:r>
-          </a:p>
-        </p:txBody>
-      </p:sp>
-      <p:sp>
-        <p:nvSpPr>
-          <p:cNvPr id="8" name="Textplatzhalter 21">
-            <a:extLst>
-              <a:ext uri="{FF2B5EF4-FFF2-40B4-BE49-F238E27FC236}">
-                <a16:creationId xmlns:a16="http://schemas.microsoft.com/office/drawing/2014/main" id="{601A40B5-7701-6547-8618-E74203A19E99}"/>
-              </a:ext>
-            </a:extLst>
-          </p:cNvPr>
-          <p:cNvSpPr>
-            <a:spLocks noGrp="1"/>
-          </p:cNvSpPr>
-          <p:nvPr>
-            <p:ph type="body" sz="quarter" idx="20" hasCustomPrompt="1"/>
-          </p:nvPr>
-        </p:nvSpPr>
-        <p:spPr>
-          <a:xfrm>
-            <a:off x="540000" y="280800"/>
-            <a:ext cx="7020000" cy="166199"/>
-          </a:xfrm>
-          <a:prstGeom prst="rect">
-            <a:avLst/>
-          </a:prstGeom>
-        </p:spPr>
-        <p:txBody>
-          <a:bodyPr lIns="0" tIns="0" rIns="0" bIns="0">
-            <a:spAutoFit/>
-          </a:bodyPr>
-          <a:lstStyle>
-            <a:lvl1pPr marL="0" marR="0" indent="0" algn="l" defTabSz="914377" rtl="0" eaLnBrk="1" fontAlgn="auto" latinLnBrk="0" hangingPunct="1">
-              <a:lnSpc>
-                <a:spcPct val="90000"/>
-              </a:lnSpc>
-              <a:spcBef>
-                <a:spcPts val="0"/>
-              </a:spcBef>
-              <a:spcAft>
-                <a:spcPts val="0"/>
-              </a:spcAft>
-              <a:buClrTx/>
-              <a:buSzTx/>
-              <a:buFont typeface="Arial" panose="020B0604020202020204" pitchFamily="34" charset="0"/>
-              <a:buNone/>
-              <a:tabLst/>
-              <a:defRPr sz="1200">
-                <a:latin typeface="Arial" panose="020B0604020202020204" pitchFamily="34" charset="0"/>
-                <a:cs typeface="Arial" panose="020B0604020202020204" pitchFamily="34" charset="0"/>
-              </a:defRPr>
-            </a:lvl1pPr>
-          </a:lstStyle>
-          <a:p>
-            <a:pPr marL="0" marR="0" lvl="0" indent="0" algn="l" defTabSz="914377" rtl="0" eaLnBrk="1" fontAlgn="auto" latinLnBrk="0" hangingPunct="1">
-              <a:lnSpc>
-                <a:spcPct val="90000"/>
-              </a:lnSpc>
-              <a:spcBef>
-                <a:spcPts val="0"/>
-              </a:spcBef>
-              <a:spcAft>
-                <a:spcPts val="0"/>
-              </a:spcAft>
-              <a:buClrTx/>
-              <a:buSzTx/>
-              <a:buFont typeface="Arial" panose="020B0604020202020204" pitchFamily="34" charset="0"/>
-              <a:buNone/>
-              <a:tabLst/>
-              <a:defRPr/>
-            </a:pPr>
-            <a:r>
-              <a:rPr lang="de-DE" dirty="0"/>
-              <a:t>Inhalt aus Inhaltverzeichnis (Arial 12pt., schwarz, max. 1 Zeile)</a:t>
-            </a:r>
-          </a:p>
-        </p:txBody>
-      </p:sp>
-      <p:sp>
-        <p:nvSpPr>
-          <p:cNvPr id="7" name="Titelplatzhalter 14">
-            <a:extLst>
-              <a:ext uri="{FF2B5EF4-FFF2-40B4-BE49-F238E27FC236}">
-                <a16:creationId xmlns:a16="http://schemas.microsoft.com/office/drawing/2014/main" id="{CF6356AF-957D-A241-82E4-5276EE95A84E}"/>
-              </a:ext>
-            </a:extLst>
-          </p:cNvPr>
-          <p:cNvSpPr>
-            <a:spLocks noGrp="1"/>
-          </p:cNvSpPr>
-          <p:nvPr>
-            <p:ph type="title" hasCustomPrompt="1"/>
-          </p:nvPr>
-        </p:nvSpPr>
-        <p:spPr>
-          <a:xfrm>
-            <a:off x="540000" y="680400"/>
-            <a:ext cx="7020000" cy="410369"/>
-          </a:xfrm>
-          <a:prstGeom prst="rect">
-            <a:avLst/>
-          </a:prstGeom>
-        </p:spPr>
-        <p:txBody>
-          <a:bodyPr vert="horz" lIns="0" tIns="0" rIns="0" bIns="0" rtlCol="0" anchor="t">
-            <a:spAutoFit/>
-          </a:bodyPr>
-          <a:lstStyle>
-            <a:lvl1pPr>
-              <a:defRPr/>
-            </a:lvl1pPr>
-          </a:lstStyle>
-          <a:p>
-            <a:r>
-              <a:rPr lang="de-DE" dirty="0"/>
-              <a:t>Titel A (Arial 28pt., rot, max. 1 Zeile) </a:t>
-            </a:r>
-          </a:p>
-        </p:txBody>
-      </p:sp>
-    </p:spTree>
-    <p:extLst>
-      <p:ext uri="{BB962C8B-B14F-4D97-AF65-F5344CB8AC3E}">
-        <p14:creationId xmlns:p14="http://schemas.microsoft.com/office/powerpoint/2010/main" val="2157838461"/>
-      </p:ext>
-    </p:extLst>
-  </p:cSld>
-  <p:clrMapOvr>
-    <a:masterClrMapping/>
-  </p:clrMapOvr>
-  <p:extLst>
-    <p:ext uri="{DCECCB84-F9BA-43D5-87BE-67443E8EF086}">
-      <p15:sldGuideLst xmlns:p15="http://schemas.microsoft.com/office/powerpoint/2012/main"/>
-    </p:ext>
-  </p:extLst>
-</p:sldLayout>
-</file>
-
-<file path=ppt/slideLayouts/slideLayout11.xml><?xml version="1.0" encoding="utf-8"?>
-<p:sldLayout xmlns:a="http://schemas.openxmlformats.org/drawingml/2006/main" xmlns:r="http://schemas.openxmlformats.org/officeDocument/2006/relationships" xmlns:p="http://schemas.openxmlformats.org/presentationml/2006/main" preserve="1" userDrawn="1">
   <p:cSld name="7b: Folie für Grafik/Bild">
     <p:spTree>
       <p:nvGrpSpPr>
@@ -8580,7 +8466,7 @@
 </p:sldLayout>
 </file>
 
-<file path=ppt/slideLayouts/slideLayout12.xml><?xml version="1.0" encoding="utf-8"?>
+<file path=ppt/slideLayouts/slideLayout11.xml><?xml version="1.0" encoding="utf-8"?>
 <p:sldLayout xmlns:a="http://schemas.openxmlformats.org/drawingml/2006/main" xmlns:r="http://schemas.openxmlformats.org/officeDocument/2006/relationships" xmlns:p="http://schemas.openxmlformats.org/presentationml/2006/main" preserve="1" userDrawn="1">
   <p:cSld name="1_7b: Folie für Grafik/Bild">
     <p:spTree>
@@ -8911,7 +8797,7 @@
 </p:sldLayout>
 </file>
 
-<file path=ppt/slideLayouts/slideLayout13.xml><?xml version="1.0" encoding="utf-8"?>
+<file path=ppt/slideLayouts/slideLayout12.xml><?xml version="1.0" encoding="utf-8"?>
 <p:sldLayout xmlns:a="http://schemas.openxmlformats.org/drawingml/2006/main" xmlns:r="http://schemas.openxmlformats.org/officeDocument/2006/relationships" xmlns:p="http://schemas.openxmlformats.org/presentationml/2006/main" preserve="1" userDrawn="1">
   <p:cSld name="Guildlines: Titel">
     <p:spTree>
@@ -9209,7 +9095,7 @@
 </p:sldLayout>
 </file>
 
-<file path=ppt/slideLayouts/slideLayout14.xml><?xml version="1.0" encoding="utf-8"?>
+<file path=ppt/slideLayouts/slideLayout13.xml><?xml version="1.0" encoding="utf-8"?>
 <p:sldLayout xmlns:a="http://schemas.openxmlformats.org/drawingml/2006/main" xmlns:r="http://schemas.openxmlformats.org/officeDocument/2006/relationships" xmlns:p="http://schemas.openxmlformats.org/presentationml/2006/main" preserve="1" userDrawn="1">
   <p:cSld name="Guildlines: Ressourcen">
     <p:spTree>
@@ -9474,7 +9360,7 @@
 </p:sldLayout>
 </file>
 
-<file path=ppt/slideLayouts/slideLayout15.xml><?xml version="1.0" encoding="utf-8"?>
+<file path=ppt/slideLayouts/slideLayout14.xml><?xml version="1.0" encoding="utf-8"?>
 <p:sldLayout xmlns:a="http://schemas.openxmlformats.org/drawingml/2006/main" xmlns:r="http://schemas.openxmlformats.org/officeDocument/2006/relationships" xmlns:p="http://schemas.openxmlformats.org/presentationml/2006/main" preserve="1" userDrawn="1">
   <p:cSld name="Guidlines: Design">
     <p:spTree>
@@ -10901,6 +10787,513 @@
 </file>
 
 <file path=ppt/slideLayouts/slideLayout3.xml><?xml version="1.0" encoding="utf-8"?>
+<p:sldLayout xmlns:a="http://schemas.openxmlformats.org/drawingml/2006/main" xmlns:r="http://schemas.openxmlformats.org/officeDocument/2006/relationships" xmlns:p="http://schemas.openxmlformats.org/presentationml/2006/main" preserve="1" userDrawn="1">
+  <p:cSld name="3: Titel-Folie ohne Bild">
+    <p:spTree>
+      <p:nvGrpSpPr>
+        <p:cNvPr id="1" name=""/>
+        <p:cNvGrpSpPr/>
+        <p:nvPr/>
+      </p:nvGrpSpPr>
+      <p:grpSpPr>
+        <a:xfrm>
+          <a:off x="0" y="0"/>
+          <a:ext cx="0" cy="0"/>
+          <a:chOff x="0" y="0"/>
+          <a:chExt cx="0" cy="0"/>
+        </a:xfrm>
+      </p:grpSpPr>
+      <p:sp>
+        <p:nvSpPr>
+          <p:cNvPr id="3" name="Textplatzhalter 2">
+            <a:extLst>
+              <a:ext uri="{FF2B5EF4-FFF2-40B4-BE49-F238E27FC236}">
+                <a16:creationId xmlns:a16="http://schemas.microsoft.com/office/drawing/2014/main" id="{1659C5DC-671B-6A4E-BD0B-CCB6129F84B8}"/>
+              </a:ext>
+            </a:extLst>
+          </p:cNvPr>
+          <p:cNvSpPr>
+            <a:spLocks noGrp="1"/>
+          </p:cNvSpPr>
+          <p:nvPr>
+            <p:ph type="body" idx="10" hasCustomPrompt="1"/>
+          </p:nvPr>
+        </p:nvSpPr>
+        <p:spPr>
+          <a:xfrm>
+            <a:off x="540000" y="3562350"/>
+            <a:ext cx="7020000" cy="166199"/>
+          </a:xfrm>
+          <a:prstGeom prst="rect">
+            <a:avLst/>
+          </a:prstGeom>
+        </p:spPr>
+        <p:txBody>
+          <a:bodyPr lIns="0" tIns="0" rIns="0" bIns="0" anchor="t">
+            <a:noAutofit/>
+          </a:bodyPr>
+          <a:lstStyle>
+            <a:lvl1pPr marL="0" indent="0">
+              <a:buNone/>
+              <a:defRPr sz="1400" b="1" i="0">
+                <a:solidFill>
+                  <a:schemeClr val="tx1"/>
+                </a:solidFill>
+                <a:latin typeface="Arial" panose="020B0604020202020204" pitchFamily="34" charset="0"/>
+                <a:cs typeface="Arial" panose="020B0604020202020204" pitchFamily="34" charset="0"/>
+              </a:defRPr>
+            </a:lvl1pPr>
+            <a:lvl2pPr marL="457189" indent="0">
+              <a:buNone/>
+              <a:defRPr sz="2000">
+                <a:solidFill>
+                  <a:schemeClr val="tx1">
+                    <a:tint val="75000"/>
+                  </a:schemeClr>
+                </a:solidFill>
+              </a:defRPr>
+            </a:lvl2pPr>
+            <a:lvl3pPr marL="914377" indent="0">
+              <a:buNone/>
+              <a:defRPr sz="1800">
+                <a:solidFill>
+                  <a:schemeClr val="tx1">
+                    <a:tint val="75000"/>
+                  </a:schemeClr>
+                </a:solidFill>
+              </a:defRPr>
+            </a:lvl3pPr>
+            <a:lvl4pPr marL="1371566" indent="0">
+              <a:buNone/>
+              <a:defRPr sz="1600">
+                <a:solidFill>
+                  <a:schemeClr val="tx1">
+                    <a:tint val="75000"/>
+                  </a:schemeClr>
+                </a:solidFill>
+              </a:defRPr>
+            </a:lvl4pPr>
+            <a:lvl5pPr marL="1828754" indent="0">
+              <a:buNone/>
+              <a:defRPr sz="1600">
+                <a:solidFill>
+                  <a:schemeClr val="tx1">
+                    <a:tint val="75000"/>
+                  </a:schemeClr>
+                </a:solidFill>
+              </a:defRPr>
+            </a:lvl5pPr>
+            <a:lvl6pPr marL="2285943" indent="0">
+              <a:buNone/>
+              <a:defRPr sz="1600">
+                <a:solidFill>
+                  <a:schemeClr val="tx1">
+                    <a:tint val="75000"/>
+                  </a:schemeClr>
+                </a:solidFill>
+              </a:defRPr>
+            </a:lvl6pPr>
+            <a:lvl7pPr marL="2743131" indent="0">
+              <a:buNone/>
+              <a:defRPr sz="1600">
+                <a:solidFill>
+                  <a:schemeClr val="tx1">
+                    <a:tint val="75000"/>
+                  </a:schemeClr>
+                </a:solidFill>
+              </a:defRPr>
+            </a:lvl7pPr>
+            <a:lvl8pPr marL="3200320" indent="0">
+              <a:buNone/>
+              <a:defRPr sz="1600">
+                <a:solidFill>
+                  <a:schemeClr val="tx1">
+                    <a:tint val="75000"/>
+                  </a:schemeClr>
+                </a:solidFill>
+              </a:defRPr>
+            </a:lvl8pPr>
+            <a:lvl9pPr marL="3657509" indent="0">
+              <a:buNone/>
+              <a:defRPr sz="1600">
+                <a:solidFill>
+                  <a:schemeClr val="tx1">
+                    <a:tint val="75000"/>
+                  </a:schemeClr>
+                </a:solidFill>
+              </a:defRPr>
+            </a:lvl9pPr>
+          </a:lstStyle>
+          <a:p>
+            <a:pPr lvl="0"/>
+            <a:r>
+              <a:rPr lang="de-DE" dirty="0"/>
+              <a:t>Moderator und Organisationseinheit (Arial Fett 14pt., max. 1 Zeile)</a:t>
+            </a:r>
+          </a:p>
+        </p:txBody>
+      </p:sp>
+      <p:sp>
+        <p:nvSpPr>
+          <p:cNvPr id="4" name="Textplatzhalter 2">
+            <a:extLst>
+              <a:ext uri="{FF2B5EF4-FFF2-40B4-BE49-F238E27FC236}">
+                <a16:creationId xmlns:a16="http://schemas.microsoft.com/office/drawing/2014/main" id="{99D0CF73-16BC-EE47-A2F6-63380649FC8F}"/>
+              </a:ext>
+            </a:extLst>
+          </p:cNvPr>
+          <p:cNvSpPr>
+            <a:spLocks noGrp="1"/>
+          </p:cNvSpPr>
+          <p:nvPr>
+            <p:ph type="body" idx="12" hasCustomPrompt="1"/>
+          </p:nvPr>
+        </p:nvSpPr>
+        <p:spPr>
+          <a:xfrm>
+            <a:off x="540000" y="3834000"/>
+            <a:ext cx="7020000" cy="166199"/>
+          </a:xfrm>
+          <a:prstGeom prst="rect">
+            <a:avLst/>
+          </a:prstGeom>
+        </p:spPr>
+        <p:txBody>
+          <a:bodyPr lIns="0" tIns="0" rIns="0" bIns="0" anchor="t">
+            <a:spAutoFit/>
+          </a:bodyPr>
+          <a:lstStyle>
+            <a:lvl1pPr marL="0" marR="0" indent="0" algn="l" defTabSz="914400" rtl="0" eaLnBrk="1" fontAlgn="auto" latinLnBrk="0" hangingPunct="1">
+              <a:lnSpc>
+                <a:spcPct val="90000"/>
+              </a:lnSpc>
+              <a:spcBef>
+                <a:spcPts val="1000"/>
+              </a:spcBef>
+              <a:spcAft>
+                <a:spcPts val="0"/>
+              </a:spcAft>
+              <a:buClrTx/>
+              <a:buSzTx/>
+              <a:buFont typeface="Arial" panose="020B0604020202020204" pitchFamily="34" charset="0"/>
+              <a:buNone/>
+              <a:tabLst/>
+              <a:defRPr sz="1200" b="0" i="0">
+                <a:solidFill>
+                  <a:schemeClr val="tx1"/>
+                </a:solidFill>
+                <a:latin typeface="Arial" panose="020B0604020202020204" pitchFamily="34" charset="0"/>
+                <a:cs typeface="Arial" panose="020B0604020202020204" pitchFamily="34" charset="0"/>
+              </a:defRPr>
+            </a:lvl1pPr>
+            <a:lvl2pPr marL="457189" indent="0">
+              <a:buNone/>
+              <a:defRPr sz="2000">
+                <a:solidFill>
+                  <a:schemeClr val="tx1">
+                    <a:tint val="75000"/>
+                  </a:schemeClr>
+                </a:solidFill>
+              </a:defRPr>
+            </a:lvl2pPr>
+            <a:lvl3pPr marL="914377" indent="0">
+              <a:buNone/>
+              <a:defRPr sz="1800">
+                <a:solidFill>
+                  <a:schemeClr val="tx1">
+                    <a:tint val="75000"/>
+                  </a:schemeClr>
+                </a:solidFill>
+              </a:defRPr>
+            </a:lvl3pPr>
+            <a:lvl4pPr marL="1371566" indent="0">
+              <a:buNone/>
+              <a:defRPr sz="1600">
+                <a:solidFill>
+                  <a:schemeClr val="tx1">
+                    <a:tint val="75000"/>
+                  </a:schemeClr>
+                </a:solidFill>
+              </a:defRPr>
+            </a:lvl4pPr>
+            <a:lvl5pPr marL="1828754" indent="0">
+              <a:buNone/>
+              <a:defRPr sz="1600">
+                <a:solidFill>
+                  <a:schemeClr val="tx1">
+                    <a:tint val="75000"/>
+                  </a:schemeClr>
+                </a:solidFill>
+              </a:defRPr>
+            </a:lvl5pPr>
+            <a:lvl6pPr marL="2285943" indent="0">
+              <a:buNone/>
+              <a:defRPr sz="1600">
+                <a:solidFill>
+                  <a:schemeClr val="tx1">
+                    <a:tint val="75000"/>
+                  </a:schemeClr>
+                </a:solidFill>
+              </a:defRPr>
+            </a:lvl6pPr>
+            <a:lvl7pPr marL="2743131" indent="0">
+              <a:buNone/>
+              <a:defRPr sz="1600">
+                <a:solidFill>
+                  <a:schemeClr val="tx1">
+                    <a:tint val="75000"/>
+                  </a:schemeClr>
+                </a:solidFill>
+              </a:defRPr>
+            </a:lvl7pPr>
+            <a:lvl8pPr marL="3200320" indent="0">
+              <a:buNone/>
+              <a:defRPr sz="1600">
+                <a:solidFill>
+                  <a:schemeClr val="tx1">
+                    <a:tint val="75000"/>
+                  </a:schemeClr>
+                </a:solidFill>
+              </a:defRPr>
+            </a:lvl8pPr>
+            <a:lvl9pPr marL="3657509" indent="0">
+              <a:buNone/>
+              <a:defRPr sz="1600">
+                <a:solidFill>
+                  <a:schemeClr val="tx1">
+                    <a:tint val="75000"/>
+                  </a:schemeClr>
+                </a:solidFill>
+              </a:defRPr>
+            </a:lvl9pPr>
+          </a:lstStyle>
+          <a:p>
+            <a:pPr lvl="0"/>
+            <a:r>
+              <a:rPr lang="de-DE" dirty="0"/>
+              <a:t>Datum und Präsentationsort (Arial 12pt., max. 1 Zeile)</a:t>
+            </a:r>
+          </a:p>
+        </p:txBody>
+      </p:sp>
+      <p:sp>
+        <p:nvSpPr>
+          <p:cNvPr id="5" name="Textplatzhalter 2">
+            <a:extLst>
+              <a:ext uri="{FF2B5EF4-FFF2-40B4-BE49-F238E27FC236}">
+                <a16:creationId xmlns:a16="http://schemas.microsoft.com/office/drawing/2014/main" id="{4A7E35E8-11B1-964A-B3B7-ABCDE11750B9}"/>
+              </a:ext>
+            </a:extLst>
+          </p:cNvPr>
+          <p:cNvSpPr>
+            <a:spLocks noGrp="1"/>
+          </p:cNvSpPr>
+          <p:nvPr>
+            <p:ph type="body" idx="11" hasCustomPrompt="1"/>
+          </p:nvPr>
+        </p:nvSpPr>
+        <p:spPr>
+          <a:xfrm>
+            <a:off x="540000" y="2203200"/>
+            <a:ext cx="7020000" cy="900000"/>
+          </a:xfrm>
+          <a:prstGeom prst="rect">
+            <a:avLst/>
+          </a:prstGeom>
+        </p:spPr>
+        <p:txBody>
+          <a:bodyPr lIns="0" tIns="0" rIns="0" bIns="0" anchor="t">
+            <a:noAutofit/>
+          </a:bodyPr>
+          <a:lstStyle>
+            <a:lvl1pPr marL="0" marR="0" indent="0" algn="l" defTabSz="914400" rtl="0" eaLnBrk="1" fontAlgn="auto" latinLnBrk="0" hangingPunct="1">
+              <a:lnSpc>
+                <a:spcPts val="3200"/>
+              </a:lnSpc>
+              <a:spcBef>
+                <a:spcPts val="0"/>
+              </a:spcBef>
+              <a:spcAft>
+                <a:spcPts val="0"/>
+              </a:spcAft>
+              <a:buClrTx/>
+              <a:buSzTx/>
+              <a:buFont typeface="Arial" panose="020B0604020202020204" pitchFamily="34" charset="0"/>
+              <a:buNone/>
+              <a:tabLst/>
+              <a:defRPr sz="2800">
+                <a:solidFill>
+                  <a:schemeClr val="tx1"/>
+                </a:solidFill>
+                <a:latin typeface="Arial" panose="020B0604020202020204" pitchFamily="34" charset="0"/>
+                <a:cs typeface="Arial" panose="020B0604020202020204" pitchFamily="34" charset="0"/>
+              </a:defRPr>
+            </a:lvl1pPr>
+            <a:lvl2pPr marL="457189" indent="0">
+              <a:buNone/>
+              <a:defRPr sz="2000">
+                <a:solidFill>
+                  <a:schemeClr val="tx1">
+                    <a:tint val="75000"/>
+                  </a:schemeClr>
+                </a:solidFill>
+              </a:defRPr>
+            </a:lvl2pPr>
+            <a:lvl3pPr marL="914377" indent="0">
+              <a:buNone/>
+              <a:defRPr sz="1800">
+                <a:solidFill>
+                  <a:schemeClr val="tx1">
+                    <a:tint val="75000"/>
+                  </a:schemeClr>
+                </a:solidFill>
+              </a:defRPr>
+            </a:lvl3pPr>
+            <a:lvl4pPr marL="1371566" indent="0">
+              <a:buNone/>
+              <a:defRPr sz="1600">
+                <a:solidFill>
+                  <a:schemeClr val="tx1">
+                    <a:tint val="75000"/>
+                  </a:schemeClr>
+                </a:solidFill>
+              </a:defRPr>
+            </a:lvl4pPr>
+            <a:lvl5pPr marL="1828754" indent="0">
+              <a:buNone/>
+              <a:defRPr sz="1600">
+                <a:solidFill>
+                  <a:schemeClr val="tx1">
+                    <a:tint val="75000"/>
+                  </a:schemeClr>
+                </a:solidFill>
+              </a:defRPr>
+            </a:lvl5pPr>
+            <a:lvl6pPr marL="2285943" indent="0">
+              <a:buNone/>
+              <a:defRPr sz="1600">
+                <a:solidFill>
+                  <a:schemeClr val="tx1">
+                    <a:tint val="75000"/>
+                  </a:schemeClr>
+                </a:solidFill>
+              </a:defRPr>
+            </a:lvl6pPr>
+            <a:lvl7pPr marL="2743131" indent="0">
+              <a:buNone/>
+              <a:defRPr sz="1600">
+                <a:solidFill>
+                  <a:schemeClr val="tx1">
+                    <a:tint val="75000"/>
+                  </a:schemeClr>
+                </a:solidFill>
+              </a:defRPr>
+            </a:lvl7pPr>
+            <a:lvl8pPr marL="3200320" indent="0">
+              <a:buNone/>
+              <a:defRPr sz="1600">
+                <a:solidFill>
+                  <a:schemeClr val="tx1">
+                    <a:tint val="75000"/>
+                  </a:schemeClr>
+                </a:solidFill>
+              </a:defRPr>
+            </a:lvl8pPr>
+            <a:lvl9pPr marL="3657509" indent="0">
+              <a:buNone/>
+              <a:defRPr sz="1600">
+                <a:solidFill>
+                  <a:schemeClr val="tx1">
+                    <a:tint val="75000"/>
+                  </a:schemeClr>
+                </a:solidFill>
+              </a:defRPr>
+            </a:lvl9pPr>
+          </a:lstStyle>
+          <a:p>
+            <a:pPr lvl="0"/>
+            <a:r>
+              <a:rPr lang="de-DE" dirty="0"/>
+              <a:t>Titel B (Arial 28/32pt., </a:t>
+            </a:r>
+            <a:br>
+              <a:rPr lang="de-DE" dirty="0"/>
+            </a:br>
+            <a:r>
+              <a:rPr lang="de-DE" dirty="0"/>
+              <a:t>schwarz, max. 2 Zeilen) </a:t>
+            </a:r>
+          </a:p>
+        </p:txBody>
+      </p:sp>
+      <p:sp>
+        <p:nvSpPr>
+          <p:cNvPr id="13" name="Titelplatzhalter 14">
+            <a:extLst>
+              <a:ext uri="{FF2B5EF4-FFF2-40B4-BE49-F238E27FC236}">
+                <a16:creationId xmlns:a16="http://schemas.microsoft.com/office/drawing/2014/main" id="{A4657668-A8BC-5644-AAC4-0A0F9B6AD949}"/>
+              </a:ext>
+            </a:extLst>
+          </p:cNvPr>
+          <p:cNvSpPr>
+            <a:spLocks noGrp="1"/>
+          </p:cNvSpPr>
+          <p:nvPr>
+            <p:ph type="title" hasCustomPrompt="1"/>
+          </p:nvPr>
+        </p:nvSpPr>
+        <p:spPr>
+          <a:xfrm>
+            <a:off x="540000" y="1220400"/>
+            <a:ext cx="7020000" cy="900000"/>
+          </a:xfrm>
+          <a:prstGeom prst="rect">
+            <a:avLst/>
+          </a:prstGeom>
+        </p:spPr>
+        <p:txBody>
+          <a:bodyPr vert="horz" wrap="square" lIns="0" tIns="0" rIns="0" bIns="0" rtlCol="0" anchor="b" anchorCtr="0">
+            <a:noAutofit/>
+          </a:bodyPr>
+          <a:lstStyle>
+            <a:lvl1pPr>
+              <a:defRPr/>
+            </a:lvl1pPr>
+          </a:lstStyle>
+          <a:p>
+            <a:r>
+              <a:rPr lang="de-DE" dirty="0"/>
+              <a:t>Titel A (Arial 28/32pt., </a:t>
+            </a:r>
+            <a:br>
+              <a:rPr lang="de-DE" dirty="0"/>
+            </a:br>
+            <a:r>
+              <a:rPr lang="de-DE" dirty="0"/>
+              <a:t>rot, max. 2 Zeilen)</a:t>
+            </a:r>
+          </a:p>
+        </p:txBody>
+      </p:sp>
+    </p:spTree>
+    <p:extLst>
+      <p:ext uri="{BB962C8B-B14F-4D97-AF65-F5344CB8AC3E}">
+        <p14:creationId xmlns:p14="http://schemas.microsoft.com/office/powerpoint/2010/main" val="4118817871"/>
+      </p:ext>
+    </p:extLst>
+  </p:cSld>
+  <p:clrMapOvr>
+    <a:masterClrMapping/>
+  </p:clrMapOvr>
+  <p:extLst>
+    <p:ext uri="{DCECCB84-F9BA-43D5-87BE-67443E8EF086}">
+      <p15:sldGuideLst xmlns:p15="http://schemas.microsoft.com/office/powerpoint/2012/main"/>
+    </p:ext>
+  </p:extLst>
+</p:sldLayout>
+</file>
+
+<file path=ppt/slideLayouts/slideLayout4.xml><?xml version="1.0" encoding="utf-8"?>
 <p:sldLayout xmlns:a="http://schemas.openxmlformats.org/drawingml/2006/main" xmlns:r="http://schemas.openxmlformats.org/officeDocument/2006/relationships" xmlns:p="http://schemas.openxmlformats.org/presentationml/2006/main" userDrawn="1">
   <p:cSld name="1_7b: Folie für Grafik/Bild">
     <p:spTree>
@@ -11216,514 +11609,7 @@
     </p:spTree>
     <p:extLst>
       <p:ext uri="{BB962C8B-B14F-4D97-AF65-F5344CB8AC3E}">
-        <p14:creationId xmlns:p14="http://schemas.microsoft.com/office/powerpoint/2010/main" val="3455000372"/>
-      </p:ext>
-    </p:extLst>
-  </p:cSld>
-  <p:clrMapOvr>
-    <a:masterClrMapping/>
-  </p:clrMapOvr>
-  <p:extLst>
-    <p:ext uri="{DCECCB84-F9BA-43D5-87BE-67443E8EF086}">
-      <p15:sldGuideLst xmlns:p15="http://schemas.microsoft.com/office/powerpoint/2012/main"/>
-    </p:ext>
-  </p:extLst>
-</p:sldLayout>
-</file>
-
-<file path=ppt/slideLayouts/slideLayout4.xml><?xml version="1.0" encoding="utf-8"?>
-<p:sldLayout xmlns:a="http://schemas.openxmlformats.org/drawingml/2006/main" xmlns:r="http://schemas.openxmlformats.org/officeDocument/2006/relationships" xmlns:p="http://schemas.openxmlformats.org/presentationml/2006/main" preserve="1" userDrawn="1">
-  <p:cSld name="3: Titel-Folie ohne Bild">
-    <p:spTree>
-      <p:nvGrpSpPr>
-        <p:cNvPr id="1" name=""/>
-        <p:cNvGrpSpPr/>
-        <p:nvPr/>
-      </p:nvGrpSpPr>
-      <p:grpSpPr>
-        <a:xfrm>
-          <a:off x="0" y="0"/>
-          <a:ext cx="0" cy="0"/>
-          <a:chOff x="0" y="0"/>
-          <a:chExt cx="0" cy="0"/>
-        </a:xfrm>
-      </p:grpSpPr>
-      <p:sp>
-        <p:nvSpPr>
-          <p:cNvPr id="3" name="Textplatzhalter 2">
-            <a:extLst>
-              <a:ext uri="{FF2B5EF4-FFF2-40B4-BE49-F238E27FC236}">
-                <a16:creationId xmlns:a16="http://schemas.microsoft.com/office/drawing/2014/main" id="{1659C5DC-671B-6A4E-BD0B-CCB6129F84B8}"/>
-              </a:ext>
-            </a:extLst>
-          </p:cNvPr>
-          <p:cNvSpPr>
-            <a:spLocks noGrp="1"/>
-          </p:cNvSpPr>
-          <p:nvPr>
-            <p:ph type="body" idx="10" hasCustomPrompt="1"/>
-          </p:nvPr>
-        </p:nvSpPr>
-        <p:spPr>
-          <a:xfrm>
-            <a:off x="540000" y="3562350"/>
-            <a:ext cx="7020000" cy="166199"/>
-          </a:xfrm>
-          <a:prstGeom prst="rect">
-            <a:avLst/>
-          </a:prstGeom>
-        </p:spPr>
-        <p:txBody>
-          <a:bodyPr lIns="0" tIns="0" rIns="0" bIns="0" anchor="t">
-            <a:noAutofit/>
-          </a:bodyPr>
-          <a:lstStyle>
-            <a:lvl1pPr marL="0" indent="0">
-              <a:buNone/>
-              <a:defRPr sz="1400" b="1" i="0">
-                <a:solidFill>
-                  <a:schemeClr val="tx1"/>
-                </a:solidFill>
-                <a:latin typeface="Arial" panose="020B0604020202020204" pitchFamily="34" charset="0"/>
-                <a:cs typeface="Arial" panose="020B0604020202020204" pitchFamily="34" charset="0"/>
-              </a:defRPr>
-            </a:lvl1pPr>
-            <a:lvl2pPr marL="457189" indent="0">
-              <a:buNone/>
-              <a:defRPr sz="2000">
-                <a:solidFill>
-                  <a:schemeClr val="tx1">
-                    <a:tint val="75000"/>
-                  </a:schemeClr>
-                </a:solidFill>
-              </a:defRPr>
-            </a:lvl2pPr>
-            <a:lvl3pPr marL="914377" indent="0">
-              <a:buNone/>
-              <a:defRPr sz="1800">
-                <a:solidFill>
-                  <a:schemeClr val="tx1">
-                    <a:tint val="75000"/>
-                  </a:schemeClr>
-                </a:solidFill>
-              </a:defRPr>
-            </a:lvl3pPr>
-            <a:lvl4pPr marL="1371566" indent="0">
-              <a:buNone/>
-              <a:defRPr sz="1600">
-                <a:solidFill>
-                  <a:schemeClr val="tx1">
-                    <a:tint val="75000"/>
-                  </a:schemeClr>
-                </a:solidFill>
-              </a:defRPr>
-            </a:lvl4pPr>
-            <a:lvl5pPr marL="1828754" indent="0">
-              <a:buNone/>
-              <a:defRPr sz="1600">
-                <a:solidFill>
-                  <a:schemeClr val="tx1">
-                    <a:tint val="75000"/>
-                  </a:schemeClr>
-                </a:solidFill>
-              </a:defRPr>
-            </a:lvl5pPr>
-            <a:lvl6pPr marL="2285943" indent="0">
-              <a:buNone/>
-              <a:defRPr sz="1600">
-                <a:solidFill>
-                  <a:schemeClr val="tx1">
-                    <a:tint val="75000"/>
-                  </a:schemeClr>
-                </a:solidFill>
-              </a:defRPr>
-            </a:lvl6pPr>
-            <a:lvl7pPr marL="2743131" indent="0">
-              <a:buNone/>
-              <a:defRPr sz="1600">
-                <a:solidFill>
-                  <a:schemeClr val="tx1">
-                    <a:tint val="75000"/>
-                  </a:schemeClr>
-                </a:solidFill>
-              </a:defRPr>
-            </a:lvl7pPr>
-            <a:lvl8pPr marL="3200320" indent="0">
-              <a:buNone/>
-              <a:defRPr sz="1600">
-                <a:solidFill>
-                  <a:schemeClr val="tx1">
-                    <a:tint val="75000"/>
-                  </a:schemeClr>
-                </a:solidFill>
-              </a:defRPr>
-            </a:lvl8pPr>
-            <a:lvl9pPr marL="3657509" indent="0">
-              <a:buNone/>
-              <a:defRPr sz="1600">
-                <a:solidFill>
-                  <a:schemeClr val="tx1">
-                    <a:tint val="75000"/>
-                  </a:schemeClr>
-                </a:solidFill>
-              </a:defRPr>
-            </a:lvl9pPr>
-          </a:lstStyle>
-          <a:p>
-            <a:pPr lvl="0"/>
-            <a:r>
-              <a:rPr lang="de-DE" dirty="0"/>
-              <a:t>Moderator und Organisationseinheit (Arial Fett 14pt., max. 1 Zeile)</a:t>
-            </a:r>
-          </a:p>
-        </p:txBody>
-      </p:sp>
-      <p:sp>
-        <p:nvSpPr>
-          <p:cNvPr id="4" name="Textplatzhalter 2">
-            <a:extLst>
-              <a:ext uri="{FF2B5EF4-FFF2-40B4-BE49-F238E27FC236}">
-                <a16:creationId xmlns:a16="http://schemas.microsoft.com/office/drawing/2014/main" id="{99D0CF73-16BC-EE47-A2F6-63380649FC8F}"/>
-              </a:ext>
-            </a:extLst>
-          </p:cNvPr>
-          <p:cNvSpPr>
-            <a:spLocks noGrp="1"/>
-          </p:cNvSpPr>
-          <p:nvPr>
-            <p:ph type="body" idx="12" hasCustomPrompt="1"/>
-          </p:nvPr>
-        </p:nvSpPr>
-        <p:spPr>
-          <a:xfrm>
-            <a:off x="540000" y="3834000"/>
-            <a:ext cx="7020000" cy="166199"/>
-          </a:xfrm>
-          <a:prstGeom prst="rect">
-            <a:avLst/>
-          </a:prstGeom>
-        </p:spPr>
-        <p:txBody>
-          <a:bodyPr lIns="0" tIns="0" rIns="0" bIns="0" anchor="t">
-            <a:spAutoFit/>
-          </a:bodyPr>
-          <a:lstStyle>
-            <a:lvl1pPr marL="0" marR="0" indent="0" algn="l" defTabSz="914400" rtl="0" eaLnBrk="1" fontAlgn="auto" latinLnBrk="0" hangingPunct="1">
-              <a:lnSpc>
-                <a:spcPct val="90000"/>
-              </a:lnSpc>
-              <a:spcBef>
-                <a:spcPts val="1000"/>
-              </a:spcBef>
-              <a:spcAft>
-                <a:spcPts val="0"/>
-              </a:spcAft>
-              <a:buClrTx/>
-              <a:buSzTx/>
-              <a:buFont typeface="Arial" panose="020B0604020202020204" pitchFamily="34" charset="0"/>
-              <a:buNone/>
-              <a:tabLst/>
-              <a:defRPr sz="1200" b="0" i="0">
-                <a:solidFill>
-                  <a:schemeClr val="tx1"/>
-                </a:solidFill>
-                <a:latin typeface="Arial" panose="020B0604020202020204" pitchFamily="34" charset="0"/>
-                <a:cs typeface="Arial" panose="020B0604020202020204" pitchFamily="34" charset="0"/>
-              </a:defRPr>
-            </a:lvl1pPr>
-            <a:lvl2pPr marL="457189" indent="0">
-              <a:buNone/>
-              <a:defRPr sz="2000">
-                <a:solidFill>
-                  <a:schemeClr val="tx1">
-                    <a:tint val="75000"/>
-                  </a:schemeClr>
-                </a:solidFill>
-              </a:defRPr>
-            </a:lvl2pPr>
-            <a:lvl3pPr marL="914377" indent="0">
-              <a:buNone/>
-              <a:defRPr sz="1800">
-                <a:solidFill>
-                  <a:schemeClr val="tx1">
-                    <a:tint val="75000"/>
-                  </a:schemeClr>
-                </a:solidFill>
-              </a:defRPr>
-            </a:lvl3pPr>
-            <a:lvl4pPr marL="1371566" indent="0">
-              <a:buNone/>
-              <a:defRPr sz="1600">
-                <a:solidFill>
-                  <a:schemeClr val="tx1">
-                    <a:tint val="75000"/>
-                  </a:schemeClr>
-                </a:solidFill>
-              </a:defRPr>
-            </a:lvl4pPr>
-            <a:lvl5pPr marL="1828754" indent="0">
-              <a:buNone/>
-              <a:defRPr sz="1600">
-                <a:solidFill>
-                  <a:schemeClr val="tx1">
-                    <a:tint val="75000"/>
-                  </a:schemeClr>
-                </a:solidFill>
-              </a:defRPr>
-            </a:lvl5pPr>
-            <a:lvl6pPr marL="2285943" indent="0">
-              <a:buNone/>
-              <a:defRPr sz="1600">
-                <a:solidFill>
-                  <a:schemeClr val="tx1">
-                    <a:tint val="75000"/>
-                  </a:schemeClr>
-                </a:solidFill>
-              </a:defRPr>
-            </a:lvl6pPr>
-            <a:lvl7pPr marL="2743131" indent="0">
-              <a:buNone/>
-              <a:defRPr sz="1600">
-                <a:solidFill>
-                  <a:schemeClr val="tx1">
-                    <a:tint val="75000"/>
-                  </a:schemeClr>
-                </a:solidFill>
-              </a:defRPr>
-            </a:lvl7pPr>
-            <a:lvl8pPr marL="3200320" indent="0">
-              <a:buNone/>
-              <a:defRPr sz="1600">
-                <a:solidFill>
-                  <a:schemeClr val="tx1">
-                    <a:tint val="75000"/>
-                  </a:schemeClr>
-                </a:solidFill>
-              </a:defRPr>
-            </a:lvl8pPr>
-            <a:lvl9pPr marL="3657509" indent="0">
-              <a:buNone/>
-              <a:defRPr sz="1600">
-                <a:solidFill>
-                  <a:schemeClr val="tx1">
-                    <a:tint val="75000"/>
-                  </a:schemeClr>
-                </a:solidFill>
-              </a:defRPr>
-            </a:lvl9pPr>
-          </a:lstStyle>
-          <a:p>
-            <a:pPr lvl="0"/>
-            <a:r>
-              <a:rPr lang="de-DE" dirty="0"/>
-              <a:t>Datum und Präsentationsort (Arial 12pt., max. 1 Zeile)</a:t>
-            </a:r>
-          </a:p>
-        </p:txBody>
-      </p:sp>
-      <p:sp>
-        <p:nvSpPr>
-          <p:cNvPr id="5" name="Textplatzhalter 2">
-            <a:extLst>
-              <a:ext uri="{FF2B5EF4-FFF2-40B4-BE49-F238E27FC236}">
-                <a16:creationId xmlns:a16="http://schemas.microsoft.com/office/drawing/2014/main" id="{4A7E35E8-11B1-964A-B3B7-ABCDE11750B9}"/>
-              </a:ext>
-            </a:extLst>
-          </p:cNvPr>
-          <p:cNvSpPr>
-            <a:spLocks noGrp="1"/>
-          </p:cNvSpPr>
-          <p:nvPr>
-            <p:ph type="body" idx="11" hasCustomPrompt="1"/>
-          </p:nvPr>
-        </p:nvSpPr>
-        <p:spPr>
-          <a:xfrm>
-            <a:off x="540000" y="2203200"/>
-            <a:ext cx="7020000" cy="900000"/>
-          </a:xfrm>
-          <a:prstGeom prst="rect">
-            <a:avLst/>
-          </a:prstGeom>
-        </p:spPr>
-        <p:txBody>
-          <a:bodyPr lIns="0" tIns="0" rIns="0" bIns="0" anchor="t">
-            <a:noAutofit/>
-          </a:bodyPr>
-          <a:lstStyle>
-            <a:lvl1pPr marL="0" marR="0" indent="0" algn="l" defTabSz="914400" rtl="0" eaLnBrk="1" fontAlgn="auto" latinLnBrk="0" hangingPunct="1">
-              <a:lnSpc>
-                <a:spcPts val="3200"/>
-              </a:lnSpc>
-              <a:spcBef>
-                <a:spcPts val="0"/>
-              </a:spcBef>
-              <a:spcAft>
-                <a:spcPts val="0"/>
-              </a:spcAft>
-              <a:buClrTx/>
-              <a:buSzTx/>
-              <a:buFont typeface="Arial" panose="020B0604020202020204" pitchFamily="34" charset="0"/>
-              <a:buNone/>
-              <a:tabLst/>
-              <a:defRPr sz="2800">
-                <a:solidFill>
-                  <a:schemeClr val="tx1"/>
-                </a:solidFill>
-                <a:latin typeface="Arial" panose="020B0604020202020204" pitchFamily="34" charset="0"/>
-                <a:cs typeface="Arial" panose="020B0604020202020204" pitchFamily="34" charset="0"/>
-              </a:defRPr>
-            </a:lvl1pPr>
-            <a:lvl2pPr marL="457189" indent="0">
-              <a:buNone/>
-              <a:defRPr sz="2000">
-                <a:solidFill>
-                  <a:schemeClr val="tx1">
-                    <a:tint val="75000"/>
-                  </a:schemeClr>
-                </a:solidFill>
-              </a:defRPr>
-            </a:lvl2pPr>
-            <a:lvl3pPr marL="914377" indent="0">
-              <a:buNone/>
-              <a:defRPr sz="1800">
-                <a:solidFill>
-                  <a:schemeClr val="tx1">
-                    <a:tint val="75000"/>
-                  </a:schemeClr>
-                </a:solidFill>
-              </a:defRPr>
-            </a:lvl3pPr>
-            <a:lvl4pPr marL="1371566" indent="0">
-              <a:buNone/>
-              <a:defRPr sz="1600">
-                <a:solidFill>
-                  <a:schemeClr val="tx1">
-                    <a:tint val="75000"/>
-                  </a:schemeClr>
-                </a:solidFill>
-              </a:defRPr>
-            </a:lvl4pPr>
-            <a:lvl5pPr marL="1828754" indent="0">
-              <a:buNone/>
-              <a:defRPr sz="1600">
-                <a:solidFill>
-                  <a:schemeClr val="tx1">
-                    <a:tint val="75000"/>
-                  </a:schemeClr>
-                </a:solidFill>
-              </a:defRPr>
-            </a:lvl5pPr>
-            <a:lvl6pPr marL="2285943" indent="0">
-              <a:buNone/>
-              <a:defRPr sz="1600">
-                <a:solidFill>
-                  <a:schemeClr val="tx1">
-                    <a:tint val="75000"/>
-                  </a:schemeClr>
-                </a:solidFill>
-              </a:defRPr>
-            </a:lvl6pPr>
-            <a:lvl7pPr marL="2743131" indent="0">
-              <a:buNone/>
-              <a:defRPr sz="1600">
-                <a:solidFill>
-                  <a:schemeClr val="tx1">
-                    <a:tint val="75000"/>
-                  </a:schemeClr>
-                </a:solidFill>
-              </a:defRPr>
-            </a:lvl7pPr>
-            <a:lvl8pPr marL="3200320" indent="0">
-              <a:buNone/>
-              <a:defRPr sz="1600">
-                <a:solidFill>
-                  <a:schemeClr val="tx1">
-                    <a:tint val="75000"/>
-                  </a:schemeClr>
-                </a:solidFill>
-              </a:defRPr>
-            </a:lvl8pPr>
-            <a:lvl9pPr marL="3657509" indent="0">
-              <a:buNone/>
-              <a:defRPr sz="1600">
-                <a:solidFill>
-                  <a:schemeClr val="tx1">
-                    <a:tint val="75000"/>
-                  </a:schemeClr>
-                </a:solidFill>
-              </a:defRPr>
-            </a:lvl9pPr>
-          </a:lstStyle>
-          <a:p>
-            <a:pPr lvl="0"/>
-            <a:r>
-              <a:rPr lang="de-DE" dirty="0"/>
-              <a:t>Titel B (Arial 28/32pt., </a:t>
-            </a:r>
-            <a:br>
-              <a:rPr lang="de-DE" dirty="0"/>
-            </a:br>
-            <a:r>
-              <a:rPr lang="de-DE" dirty="0"/>
-              <a:t>schwarz, max. 2 Zeilen) </a:t>
-            </a:r>
-          </a:p>
-        </p:txBody>
-      </p:sp>
-      <p:sp>
-        <p:nvSpPr>
-          <p:cNvPr id="13" name="Titelplatzhalter 14">
-            <a:extLst>
-              <a:ext uri="{FF2B5EF4-FFF2-40B4-BE49-F238E27FC236}">
-                <a16:creationId xmlns:a16="http://schemas.microsoft.com/office/drawing/2014/main" id="{A4657668-A8BC-5644-AAC4-0A0F9B6AD949}"/>
-              </a:ext>
-            </a:extLst>
-          </p:cNvPr>
-          <p:cNvSpPr>
-            <a:spLocks noGrp="1"/>
-          </p:cNvSpPr>
-          <p:nvPr>
-            <p:ph type="title" hasCustomPrompt="1"/>
-          </p:nvPr>
-        </p:nvSpPr>
-        <p:spPr>
-          <a:xfrm>
-            <a:off x="540000" y="1220400"/>
-            <a:ext cx="7020000" cy="900000"/>
-          </a:xfrm>
-          <a:prstGeom prst="rect">
-            <a:avLst/>
-          </a:prstGeom>
-        </p:spPr>
-        <p:txBody>
-          <a:bodyPr vert="horz" wrap="square" lIns="0" tIns="0" rIns="0" bIns="0" rtlCol="0" anchor="b" anchorCtr="0">
-            <a:noAutofit/>
-          </a:bodyPr>
-          <a:lstStyle>
-            <a:lvl1pPr>
-              <a:defRPr/>
-            </a:lvl1pPr>
-          </a:lstStyle>
-          <a:p>
-            <a:r>
-              <a:rPr lang="de-DE" dirty="0"/>
-              <a:t>Titel A (Arial 28/32pt., </a:t>
-            </a:r>
-            <a:br>
-              <a:rPr lang="de-DE" dirty="0"/>
-            </a:br>
-            <a:r>
-              <a:rPr lang="de-DE" dirty="0"/>
-              <a:t>rot, max. 2 Zeilen)</a:t>
-            </a:r>
-          </a:p>
-        </p:txBody>
-      </p:sp>
-    </p:spTree>
-    <p:extLst>
-      <p:ext uri="{BB962C8B-B14F-4D97-AF65-F5344CB8AC3E}">
-        <p14:creationId xmlns:p14="http://schemas.microsoft.com/office/powerpoint/2010/main" val="4118817871"/>
+        <p14:creationId xmlns:p14="http://schemas.microsoft.com/office/powerpoint/2010/main" val="4186585862"/>
       </p:ext>
     </p:extLst>
   </p:cSld>
@@ -11739,337 +11625,6 @@
 </file>
 
 <file path=ppt/slideLayouts/slideLayout5.xml><?xml version="1.0" encoding="utf-8"?>
-<p:sldLayout xmlns:a="http://schemas.openxmlformats.org/drawingml/2006/main" xmlns:r="http://schemas.openxmlformats.org/officeDocument/2006/relationships" xmlns:p="http://schemas.openxmlformats.org/presentationml/2006/main" userDrawn="1">
-  <p:cSld name="1_7b: Folie für Grafik/Bild">
-    <p:spTree>
-      <p:nvGrpSpPr>
-        <p:cNvPr id="1" name=""/>
-        <p:cNvGrpSpPr/>
-        <p:nvPr/>
-      </p:nvGrpSpPr>
-      <p:grpSpPr>
-        <a:xfrm>
-          <a:off x="0" y="0"/>
-          <a:ext cx="0" cy="0"/>
-          <a:chOff x="0" y="0"/>
-          <a:chExt cx="0" cy="0"/>
-        </a:xfrm>
-      </p:grpSpPr>
-      <p:sp>
-        <p:nvSpPr>
-          <p:cNvPr id="5" name="Textplatzhalter 2">
-            <a:extLst>
-              <a:ext uri="{FF2B5EF4-FFF2-40B4-BE49-F238E27FC236}">
-                <a16:creationId xmlns:a16="http://schemas.microsoft.com/office/drawing/2014/main" id="{4A7E35E8-11B1-964A-B3B7-ABCDE11750B9}"/>
-              </a:ext>
-            </a:extLst>
-          </p:cNvPr>
-          <p:cNvSpPr>
-            <a:spLocks noGrp="1"/>
-          </p:cNvSpPr>
-          <p:nvPr>
-            <p:ph type="body" idx="11" hasCustomPrompt="1"/>
-          </p:nvPr>
-        </p:nvSpPr>
-        <p:spPr>
-          <a:xfrm>
-            <a:off x="540000" y="680400"/>
-            <a:ext cx="7020000" cy="410369"/>
-          </a:xfrm>
-          <a:prstGeom prst="rect">
-            <a:avLst/>
-          </a:prstGeom>
-        </p:spPr>
-        <p:txBody>
-          <a:bodyPr lIns="0" tIns="0" rIns="0" bIns="0" anchor="t">
-            <a:spAutoFit/>
-          </a:bodyPr>
-          <a:lstStyle>
-            <a:lvl1pPr marL="0" marR="0" indent="0" algn="l" defTabSz="914377" rtl="0" eaLnBrk="1" fontAlgn="auto" latinLnBrk="0" hangingPunct="1">
-              <a:lnSpc>
-                <a:spcPts val="3200"/>
-              </a:lnSpc>
-              <a:spcBef>
-                <a:spcPts val="0"/>
-              </a:spcBef>
-              <a:spcAft>
-                <a:spcPts val="0"/>
-              </a:spcAft>
-              <a:buClrTx/>
-              <a:buSzTx/>
-              <a:buFont typeface="Arial" panose="020B0604020202020204" pitchFamily="34" charset="0"/>
-              <a:buNone/>
-              <a:tabLst/>
-              <a:defRPr sz="2800">
-                <a:solidFill>
-                  <a:schemeClr val="tx1"/>
-                </a:solidFill>
-                <a:latin typeface="Arial" panose="020B0604020202020204" pitchFamily="34" charset="0"/>
-                <a:cs typeface="Arial" panose="020B0604020202020204" pitchFamily="34" charset="0"/>
-              </a:defRPr>
-            </a:lvl1pPr>
-            <a:lvl2pPr marL="457189" indent="0">
-              <a:buNone/>
-              <a:defRPr sz="2000">
-                <a:solidFill>
-                  <a:schemeClr val="tx1">
-                    <a:tint val="75000"/>
-                  </a:schemeClr>
-                </a:solidFill>
-              </a:defRPr>
-            </a:lvl2pPr>
-            <a:lvl3pPr marL="914377" indent="0">
-              <a:buNone/>
-              <a:defRPr sz="1800">
-                <a:solidFill>
-                  <a:schemeClr val="tx1">
-                    <a:tint val="75000"/>
-                  </a:schemeClr>
-                </a:solidFill>
-              </a:defRPr>
-            </a:lvl3pPr>
-            <a:lvl4pPr marL="1371566" indent="0">
-              <a:buNone/>
-              <a:defRPr sz="1600">
-                <a:solidFill>
-                  <a:schemeClr val="tx1">
-                    <a:tint val="75000"/>
-                  </a:schemeClr>
-                </a:solidFill>
-              </a:defRPr>
-            </a:lvl4pPr>
-            <a:lvl5pPr marL="1828754" indent="0">
-              <a:buNone/>
-              <a:defRPr sz="1600">
-                <a:solidFill>
-                  <a:schemeClr val="tx1">
-                    <a:tint val="75000"/>
-                  </a:schemeClr>
-                </a:solidFill>
-              </a:defRPr>
-            </a:lvl5pPr>
-            <a:lvl6pPr marL="2285943" indent="0">
-              <a:buNone/>
-              <a:defRPr sz="1600">
-                <a:solidFill>
-                  <a:schemeClr val="tx1">
-                    <a:tint val="75000"/>
-                  </a:schemeClr>
-                </a:solidFill>
-              </a:defRPr>
-            </a:lvl6pPr>
-            <a:lvl7pPr marL="2743131" indent="0">
-              <a:buNone/>
-              <a:defRPr sz="1600">
-                <a:solidFill>
-                  <a:schemeClr val="tx1">
-                    <a:tint val="75000"/>
-                  </a:schemeClr>
-                </a:solidFill>
-              </a:defRPr>
-            </a:lvl7pPr>
-            <a:lvl8pPr marL="3200320" indent="0">
-              <a:buNone/>
-              <a:defRPr sz="1600">
-                <a:solidFill>
-                  <a:schemeClr val="tx1">
-                    <a:tint val="75000"/>
-                  </a:schemeClr>
-                </a:solidFill>
-              </a:defRPr>
-            </a:lvl8pPr>
-            <a:lvl9pPr marL="3657509" indent="0">
-              <a:buNone/>
-              <a:defRPr sz="1600">
-                <a:solidFill>
-                  <a:schemeClr val="tx1">
-                    <a:tint val="75000"/>
-                  </a:schemeClr>
-                </a:solidFill>
-              </a:defRPr>
-            </a:lvl9pPr>
-          </a:lstStyle>
-          <a:p>
-            <a:pPr lvl="0"/>
-            <a:r>
-              <a:rPr lang="de-DE" dirty="0"/>
-              <a:t>Titel B (Arial 28pt., schwarz, max. 1 Zeile) </a:t>
-            </a:r>
-          </a:p>
-        </p:txBody>
-      </p:sp>
-      <p:sp>
-        <p:nvSpPr>
-          <p:cNvPr id="7" name="Titelplatzhalter 14">
-            <a:extLst>
-              <a:ext uri="{FF2B5EF4-FFF2-40B4-BE49-F238E27FC236}">
-                <a16:creationId xmlns:a16="http://schemas.microsoft.com/office/drawing/2014/main" id="{CF6356AF-957D-A241-82E4-5276EE95A84E}"/>
-              </a:ext>
-            </a:extLst>
-          </p:cNvPr>
-          <p:cNvSpPr>
-            <a:spLocks noGrp="1"/>
-          </p:cNvSpPr>
-          <p:nvPr>
-            <p:ph type="title" hasCustomPrompt="1"/>
-          </p:nvPr>
-        </p:nvSpPr>
-        <p:spPr>
-          <a:xfrm>
-            <a:off x="540000" y="187200"/>
-            <a:ext cx="7020000" cy="410369"/>
-          </a:xfrm>
-          <a:prstGeom prst="rect">
-            <a:avLst/>
-          </a:prstGeom>
-        </p:spPr>
-        <p:txBody>
-          <a:bodyPr vert="horz" lIns="0" tIns="0" rIns="0" bIns="0" rtlCol="0" anchor="t">
-            <a:spAutoFit/>
-          </a:bodyPr>
-          <a:lstStyle>
-            <a:lvl1pPr>
-              <a:defRPr/>
-            </a:lvl1pPr>
-          </a:lstStyle>
-          <a:p>
-            <a:r>
-              <a:rPr lang="de-DE" dirty="0"/>
-              <a:t>Titel A (Arial 28pt., rot, max. 1 Zeile) </a:t>
-            </a:r>
-          </a:p>
-        </p:txBody>
-      </p:sp>
-      <p:sp>
-        <p:nvSpPr>
-          <p:cNvPr id="8" name="Content Placeholder 2">
-            <a:extLst>
-              <a:ext uri="{FF2B5EF4-FFF2-40B4-BE49-F238E27FC236}">
-                <a16:creationId xmlns:a16="http://schemas.microsoft.com/office/drawing/2014/main" id="{AEED1F4E-4168-41EA-9BAB-5ADA53D6788E}"/>
-              </a:ext>
-            </a:extLst>
-          </p:cNvPr>
-          <p:cNvSpPr>
-            <a:spLocks noGrp="1"/>
-          </p:cNvSpPr>
-          <p:nvPr>
-            <p:ph idx="1"/>
-          </p:nvPr>
-        </p:nvSpPr>
-        <p:spPr>
-          <a:xfrm>
-            <a:off x="540000" y="1275606"/>
-            <a:ext cx="8460000" cy="3528392"/>
-          </a:xfrm>
-          <a:prstGeom prst="rect">
-            <a:avLst/>
-          </a:prstGeom>
-        </p:spPr>
-        <p:txBody>
-          <a:bodyPr lIns="0" tIns="0" rIns="0" bIns="0"/>
-          <a:lstStyle>
-            <a:lvl1pPr algn="just">
-              <a:lnSpc>
-                <a:spcPct val="100000"/>
-              </a:lnSpc>
-              <a:defRPr sz="1600">
-                <a:latin typeface="Arial" panose="020B0604020202020204" pitchFamily="34" charset="0"/>
-                <a:cs typeface="Arial" panose="020B0604020202020204" pitchFamily="34" charset="0"/>
-              </a:defRPr>
-            </a:lvl1pPr>
-            <a:lvl2pPr algn="just">
-              <a:lnSpc>
-                <a:spcPct val="100000"/>
-              </a:lnSpc>
-              <a:defRPr sz="1400">
-                <a:latin typeface="Arial" panose="020B0604020202020204" pitchFamily="34" charset="0"/>
-                <a:cs typeface="Arial" panose="020B0604020202020204" pitchFamily="34" charset="0"/>
-              </a:defRPr>
-            </a:lvl2pPr>
-            <a:lvl3pPr algn="just">
-              <a:lnSpc>
-                <a:spcPct val="100000"/>
-              </a:lnSpc>
-              <a:defRPr sz="1200">
-                <a:latin typeface="Arial" panose="020B0604020202020204" pitchFamily="34" charset="0"/>
-                <a:cs typeface="Arial" panose="020B0604020202020204" pitchFamily="34" charset="0"/>
-              </a:defRPr>
-            </a:lvl3pPr>
-            <a:lvl4pPr algn="just">
-              <a:lnSpc>
-                <a:spcPct val="100000"/>
-              </a:lnSpc>
-              <a:defRPr sz="1100">
-                <a:latin typeface="Arial" panose="020B0604020202020204" pitchFamily="34" charset="0"/>
-                <a:cs typeface="Arial" panose="020B0604020202020204" pitchFamily="34" charset="0"/>
-              </a:defRPr>
-            </a:lvl4pPr>
-            <a:lvl5pPr algn="just">
-              <a:lnSpc>
-                <a:spcPct val="100000"/>
-              </a:lnSpc>
-              <a:defRPr sz="1100">
-                <a:latin typeface="Arial" panose="020B0604020202020204" pitchFamily="34" charset="0"/>
-                <a:cs typeface="Arial" panose="020B0604020202020204" pitchFamily="34" charset="0"/>
-              </a:defRPr>
-            </a:lvl5pPr>
-          </a:lstStyle>
-          <a:p>
-            <a:pPr lvl="0"/>
-            <a:r>
-              <a:rPr lang="en-US" dirty="0"/>
-              <a:t>Click to edit Master text styles</a:t>
-            </a:r>
-          </a:p>
-          <a:p>
-            <a:pPr lvl="1"/>
-            <a:r>
-              <a:rPr lang="en-US" dirty="0"/>
-              <a:t>Second level</a:t>
-            </a:r>
-          </a:p>
-          <a:p>
-            <a:pPr lvl="2"/>
-            <a:r>
-              <a:rPr lang="en-US" dirty="0"/>
-              <a:t>Third level</a:t>
-            </a:r>
-          </a:p>
-          <a:p>
-            <a:pPr lvl="3"/>
-            <a:r>
-              <a:rPr lang="en-US" dirty="0"/>
-              <a:t>Fourth level</a:t>
-            </a:r>
-          </a:p>
-          <a:p>
-            <a:pPr lvl="4"/>
-            <a:r>
-              <a:rPr lang="en-US" dirty="0"/>
-              <a:t>Fifth level</a:t>
-            </a:r>
-          </a:p>
-        </p:txBody>
-      </p:sp>
-    </p:spTree>
-    <p:extLst>
-      <p:ext uri="{BB962C8B-B14F-4D97-AF65-F5344CB8AC3E}">
-        <p14:creationId xmlns:p14="http://schemas.microsoft.com/office/powerpoint/2010/main" val="4186585862"/>
-      </p:ext>
-    </p:extLst>
-  </p:cSld>
-  <p:clrMapOvr>
-    <a:masterClrMapping/>
-  </p:clrMapOvr>
-  <p:extLst>
-    <p:ext uri="{DCECCB84-F9BA-43D5-87BE-67443E8EF086}">
-      <p15:sldGuideLst xmlns:p15="http://schemas.microsoft.com/office/powerpoint/2012/main"/>
-    </p:ext>
-  </p:extLst>
-</p:sldLayout>
-</file>
-
-<file path=ppt/slideLayouts/slideLayout6.xml><?xml version="1.0" encoding="utf-8"?>
 <p:sldLayout xmlns:a="http://schemas.openxmlformats.org/drawingml/2006/main" xmlns:r="http://schemas.openxmlformats.org/officeDocument/2006/relationships" xmlns:p="http://schemas.openxmlformats.org/presentationml/2006/main" preserve="1" userDrawn="1">
   <p:cSld name="4: Inhaltverzeichnis">
     <p:spTree>
@@ -12609,7 +12164,7 @@
 </p:sldLayout>
 </file>
 
-<file path=ppt/slideLayouts/slideLayout7.xml><?xml version="1.0" encoding="utf-8"?>
+<file path=ppt/slideLayouts/slideLayout6.xml><?xml version="1.0" encoding="utf-8"?>
 <p:sldLayout xmlns:a="http://schemas.openxmlformats.org/drawingml/2006/main" xmlns:r="http://schemas.openxmlformats.org/officeDocument/2006/relationships" xmlns:p="http://schemas.openxmlformats.org/presentationml/2006/main" preserve="1" userDrawn="1">
   <p:cSld name="5a: Text-Folie 2 Spalten">
     <p:spTree>
@@ -13086,7 +12641,7 @@
 </p:sldLayout>
 </file>
 
-<file path=ppt/slideLayouts/slideLayout8.xml><?xml version="1.0" encoding="utf-8"?>
+<file path=ppt/slideLayouts/slideLayout7.xml><?xml version="1.0" encoding="utf-8"?>
 <p:sldLayout xmlns:a="http://schemas.openxmlformats.org/drawingml/2006/main" xmlns:r="http://schemas.openxmlformats.org/officeDocument/2006/relationships" xmlns:p="http://schemas.openxmlformats.org/presentationml/2006/main" preserve="1" userDrawn="1">
   <p:cSld name="5b: Text-Folie 2 Spalten">
     <p:spTree>
@@ -13615,7 +13170,7 @@
 </p:sldLayout>
 </file>
 
-<file path=ppt/slideLayouts/slideLayout9.xml><?xml version="1.0" encoding="utf-8"?>
+<file path=ppt/slideLayouts/slideLayout8.xml><?xml version="1.0" encoding="utf-8"?>
 <p:sldLayout xmlns:a="http://schemas.openxmlformats.org/drawingml/2006/main" xmlns:r="http://schemas.openxmlformats.org/officeDocument/2006/relationships" xmlns:p="http://schemas.openxmlformats.org/presentationml/2006/main" preserve="1" userDrawn="1">
   <p:cSld name="6: Text-Folie mit Bild">
     <p:spTree>
@@ -14044,6 +13599,352 @@
     <p:extLst>
       <p:ext uri="{BB962C8B-B14F-4D97-AF65-F5344CB8AC3E}">
         <p14:creationId xmlns:p14="http://schemas.microsoft.com/office/powerpoint/2010/main" val="4233781139"/>
+      </p:ext>
+    </p:extLst>
+  </p:cSld>
+  <p:clrMapOvr>
+    <a:masterClrMapping/>
+  </p:clrMapOvr>
+  <p:extLst>
+    <p:ext uri="{DCECCB84-F9BA-43D5-87BE-67443E8EF086}">
+      <p15:sldGuideLst xmlns:p15="http://schemas.microsoft.com/office/powerpoint/2012/main"/>
+    </p:ext>
+  </p:extLst>
+</p:sldLayout>
+</file>
+
+<file path=ppt/slideLayouts/slideLayout9.xml><?xml version="1.0" encoding="utf-8"?>
+<p:sldLayout xmlns:a="http://schemas.openxmlformats.org/drawingml/2006/main" xmlns:r="http://schemas.openxmlformats.org/officeDocument/2006/relationships" xmlns:p="http://schemas.openxmlformats.org/presentationml/2006/main" preserve="1" userDrawn="1">
+  <p:cSld name="7a: Folie für Grafik/Bild">
+    <p:spTree>
+      <p:nvGrpSpPr>
+        <p:cNvPr id="1" name=""/>
+        <p:cNvGrpSpPr/>
+        <p:nvPr/>
+      </p:nvGrpSpPr>
+      <p:grpSpPr>
+        <a:xfrm>
+          <a:off x="0" y="0"/>
+          <a:ext cx="0" cy="0"/>
+          <a:chOff x="0" y="0"/>
+          <a:chExt cx="0" cy="0"/>
+        </a:xfrm>
+      </p:grpSpPr>
+      <p:sp>
+        <p:nvSpPr>
+          <p:cNvPr id="6" name="Inhaltsplatzhalter 2">
+            <a:extLst>
+              <a:ext uri="{FF2B5EF4-FFF2-40B4-BE49-F238E27FC236}">
+                <a16:creationId xmlns:a16="http://schemas.microsoft.com/office/drawing/2014/main" id="{90318CE9-39BE-CB41-9E7E-545A530383E2}"/>
+              </a:ext>
+            </a:extLst>
+          </p:cNvPr>
+          <p:cNvSpPr>
+            <a:spLocks noGrp="1"/>
+          </p:cNvSpPr>
+          <p:nvPr>
+            <p:ph sz="half" idx="1" hasCustomPrompt="1"/>
+          </p:nvPr>
+        </p:nvSpPr>
+        <p:spPr>
+          <a:xfrm>
+            <a:off x="0" y="1926000"/>
+            <a:ext cx="9144000" cy="3060000"/>
+          </a:xfrm>
+          <a:prstGeom prst="rect">
+            <a:avLst/>
+          </a:prstGeom>
+          <a:solidFill>
+            <a:schemeClr val="bg1">
+              <a:lumMod val="85000"/>
+            </a:schemeClr>
+          </a:solidFill>
+        </p:spPr>
+        <p:txBody>
+          <a:bodyPr lIns="0" tIns="0" rIns="0" bIns="0"/>
+          <a:lstStyle>
+            <a:lvl1pPr marL="0" indent="0">
+              <a:buNone/>
+              <a:defRPr sz="2000">
+                <a:latin typeface="Arial" panose="020B0604020202020204" pitchFamily="34" charset="0"/>
+                <a:cs typeface="Arial" panose="020B0604020202020204" pitchFamily="34" charset="0"/>
+              </a:defRPr>
+            </a:lvl1pPr>
+          </a:lstStyle>
+          <a:p>
+            <a:pPr lvl="0"/>
+            <a:r>
+              <a:rPr lang="de-DE" dirty="0"/>
+              <a:t>        Media Platzhalter: 25.4 (b) x 8.5 (h) cm </a:t>
+            </a:r>
+          </a:p>
+        </p:txBody>
+      </p:sp>
+      <p:sp>
+        <p:nvSpPr>
+          <p:cNvPr id="5" name="Textplatzhalter 2">
+            <a:extLst>
+              <a:ext uri="{FF2B5EF4-FFF2-40B4-BE49-F238E27FC236}">
+                <a16:creationId xmlns:a16="http://schemas.microsoft.com/office/drawing/2014/main" id="{4A7E35E8-11B1-964A-B3B7-ABCDE11750B9}"/>
+              </a:ext>
+            </a:extLst>
+          </p:cNvPr>
+          <p:cNvSpPr>
+            <a:spLocks noGrp="1"/>
+          </p:cNvSpPr>
+          <p:nvPr>
+            <p:ph type="body" idx="11" hasCustomPrompt="1"/>
+          </p:nvPr>
+        </p:nvSpPr>
+        <p:spPr>
+          <a:xfrm>
+            <a:off x="540000" y="1170000"/>
+            <a:ext cx="7020000" cy="410369"/>
+          </a:xfrm>
+          <a:prstGeom prst="rect">
+            <a:avLst/>
+          </a:prstGeom>
+        </p:spPr>
+        <p:txBody>
+          <a:bodyPr lIns="0" tIns="0" rIns="0" bIns="0" anchor="t">
+            <a:spAutoFit/>
+          </a:bodyPr>
+          <a:lstStyle>
+            <a:lvl1pPr marL="0" marR="0" indent="0" algn="l" defTabSz="914377" rtl="0" eaLnBrk="1" fontAlgn="auto" latinLnBrk="0" hangingPunct="1">
+              <a:lnSpc>
+                <a:spcPts val="3200"/>
+              </a:lnSpc>
+              <a:spcBef>
+                <a:spcPts val="0"/>
+              </a:spcBef>
+              <a:spcAft>
+                <a:spcPts val="0"/>
+              </a:spcAft>
+              <a:buClrTx/>
+              <a:buSzTx/>
+              <a:buFont typeface="Arial" panose="020B0604020202020204" pitchFamily="34" charset="0"/>
+              <a:buNone/>
+              <a:tabLst/>
+              <a:defRPr sz="2800">
+                <a:solidFill>
+                  <a:schemeClr val="tx1"/>
+                </a:solidFill>
+                <a:latin typeface="Arial" panose="020B0604020202020204" pitchFamily="34" charset="0"/>
+                <a:cs typeface="Arial" panose="020B0604020202020204" pitchFamily="34" charset="0"/>
+              </a:defRPr>
+            </a:lvl1pPr>
+            <a:lvl2pPr marL="457189" indent="0">
+              <a:buNone/>
+              <a:defRPr sz="2000">
+                <a:solidFill>
+                  <a:schemeClr val="tx1">
+                    <a:tint val="75000"/>
+                  </a:schemeClr>
+                </a:solidFill>
+              </a:defRPr>
+            </a:lvl2pPr>
+            <a:lvl3pPr marL="914377" indent="0">
+              <a:buNone/>
+              <a:defRPr sz="1800">
+                <a:solidFill>
+                  <a:schemeClr val="tx1">
+                    <a:tint val="75000"/>
+                  </a:schemeClr>
+                </a:solidFill>
+              </a:defRPr>
+            </a:lvl3pPr>
+            <a:lvl4pPr marL="1371566" indent="0">
+              <a:buNone/>
+              <a:defRPr sz="1600">
+                <a:solidFill>
+                  <a:schemeClr val="tx1">
+                    <a:tint val="75000"/>
+                  </a:schemeClr>
+                </a:solidFill>
+              </a:defRPr>
+            </a:lvl4pPr>
+            <a:lvl5pPr marL="1828754" indent="0">
+              <a:buNone/>
+              <a:defRPr sz="1600">
+                <a:solidFill>
+                  <a:schemeClr val="tx1">
+                    <a:tint val="75000"/>
+                  </a:schemeClr>
+                </a:solidFill>
+              </a:defRPr>
+            </a:lvl5pPr>
+            <a:lvl6pPr marL="2285943" indent="0">
+              <a:buNone/>
+              <a:defRPr sz="1600">
+                <a:solidFill>
+                  <a:schemeClr val="tx1">
+                    <a:tint val="75000"/>
+                  </a:schemeClr>
+                </a:solidFill>
+              </a:defRPr>
+            </a:lvl6pPr>
+            <a:lvl7pPr marL="2743131" indent="0">
+              <a:buNone/>
+              <a:defRPr sz="1600">
+                <a:solidFill>
+                  <a:schemeClr val="tx1">
+                    <a:tint val="75000"/>
+                  </a:schemeClr>
+                </a:solidFill>
+              </a:defRPr>
+            </a:lvl7pPr>
+            <a:lvl8pPr marL="3200320" indent="0">
+              <a:buNone/>
+              <a:defRPr sz="1600">
+                <a:solidFill>
+                  <a:schemeClr val="tx1">
+                    <a:tint val="75000"/>
+                  </a:schemeClr>
+                </a:solidFill>
+              </a:defRPr>
+            </a:lvl8pPr>
+            <a:lvl9pPr marL="3657509" indent="0">
+              <a:buNone/>
+              <a:defRPr sz="1600">
+                <a:solidFill>
+                  <a:schemeClr val="tx1">
+                    <a:tint val="75000"/>
+                  </a:schemeClr>
+                </a:solidFill>
+              </a:defRPr>
+            </a:lvl9pPr>
+          </a:lstStyle>
+          <a:p>
+            <a:pPr lvl="0"/>
+            <a:r>
+              <a:rPr lang="de-DE" dirty="0"/>
+              <a:t>Titel B (Arial 28pt., schwarz, max. 1 Zeile) </a:t>
+            </a:r>
+          </a:p>
+        </p:txBody>
+      </p:sp>
+      <p:sp>
+        <p:nvSpPr>
+          <p:cNvPr id="8" name="Textplatzhalter 21">
+            <a:extLst>
+              <a:ext uri="{FF2B5EF4-FFF2-40B4-BE49-F238E27FC236}">
+                <a16:creationId xmlns:a16="http://schemas.microsoft.com/office/drawing/2014/main" id="{601A40B5-7701-6547-8618-E74203A19E99}"/>
+              </a:ext>
+            </a:extLst>
+          </p:cNvPr>
+          <p:cNvSpPr>
+            <a:spLocks noGrp="1"/>
+          </p:cNvSpPr>
+          <p:nvPr>
+            <p:ph type="body" sz="quarter" idx="20" hasCustomPrompt="1"/>
+          </p:nvPr>
+        </p:nvSpPr>
+        <p:spPr>
+          <a:xfrm>
+            <a:off x="540000" y="280800"/>
+            <a:ext cx="7020000" cy="166199"/>
+          </a:xfrm>
+          <a:prstGeom prst="rect">
+            <a:avLst/>
+          </a:prstGeom>
+        </p:spPr>
+        <p:txBody>
+          <a:bodyPr lIns="0" tIns="0" rIns="0" bIns="0">
+            <a:spAutoFit/>
+          </a:bodyPr>
+          <a:lstStyle>
+            <a:lvl1pPr marL="0" marR="0" indent="0" algn="l" defTabSz="914377" rtl="0" eaLnBrk="1" fontAlgn="auto" latinLnBrk="0" hangingPunct="1">
+              <a:lnSpc>
+                <a:spcPct val="90000"/>
+              </a:lnSpc>
+              <a:spcBef>
+                <a:spcPts val="0"/>
+              </a:spcBef>
+              <a:spcAft>
+                <a:spcPts val="0"/>
+              </a:spcAft>
+              <a:buClrTx/>
+              <a:buSzTx/>
+              <a:buFont typeface="Arial" panose="020B0604020202020204" pitchFamily="34" charset="0"/>
+              <a:buNone/>
+              <a:tabLst/>
+              <a:defRPr sz="1200">
+                <a:latin typeface="Arial" panose="020B0604020202020204" pitchFamily="34" charset="0"/>
+                <a:cs typeface="Arial" panose="020B0604020202020204" pitchFamily="34" charset="0"/>
+              </a:defRPr>
+            </a:lvl1pPr>
+          </a:lstStyle>
+          <a:p>
+            <a:pPr marL="0" marR="0" lvl="0" indent="0" algn="l" defTabSz="914377" rtl="0" eaLnBrk="1" fontAlgn="auto" latinLnBrk="0" hangingPunct="1">
+              <a:lnSpc>
+                <a:spcPct val="90000"/>
+              </a:lnSpc>
+              <a:spcBef>
+                <a:spcPts val="0"/>
+              </a:spcBef>
+              <a:spcAft>
+                <a:spcPts val="0"/>
+              </a:spcAft>
+              <a:buClrTx/>
+              <a:buSzTx/>
+              <a:buFont typeface="Arial" panose="020B0604020202020204" pitchFamily="34" charset="0"/>
+              <a:buNone/>
+              <a:tabLst/>
+              <a:defRPr/>
+            </a:pPr>
+            <a:r>
+              <a:rPr lang="de-DE" dirty="0"/>
+              <a:t>Inhalt aus Inhaltverzeichnis (Arial 12pt., schwarz, max. 1 Zeile)</a:t>
+            </a:r>
+          </a:p>
+        </p:txBody>
+      </p:sp>
+      <p:sp>
+        <p:nvSpPr>
+          <p:cNvPr id="7" name="Titelplatzhalter 14">
+            <a:extLst>
+              <a:ext uri="{FF2B5EF4-FFF2-40B4-BE49-F238E27FC236}">
+                <a16:creationId xmlns:a16="http://schemas.microsoft.com/office/drawing/2014/main" id="{CF6356AF-957D-A241-82E4-5276EE95A84E}"/>
+              </a:ext>
+            </a:extLst>
+          </p:cNvPr>
+          <p:cNvSpPr>
+            <a:spLocks noGrp="1"/>
+          </p:cNvSpPr>
+          <p:nvPr>
+            <p:ph type="title" hasCustomPrompt="1"/>
+          </p:nvPr>
+        </p:nvSpPr>
+        <p:spPr>
+          <a:xfrm>
+            <a:off x="540000" y="680400"/>
+            <a:ext cx="7020000" cy="410369"/>
+          </a:xfrm>
+          <a:prstGeom prst="rect">
+            <a:avLst/>
+          </a:prstGeom>
+        </p:spPr>
+        <p:txBody>
+          <a:bodyPr vert="horz" lIns="0" tIns="0" rIns="0" bIns="0" rtlCol="0" anchor="t">
+            <a:spAutoFit/>
+          </a:bodyPr>
+          <a:lstStyle>
+            <a:lvl1pPr>
+              <a:defRPr/>
+            </a:lvl1pPr>
+          </a:lstStyle>
+          <a:p>
+            <a:r>
+              <a:rPr lang="de-DE" dirty="0"/>
+              <a:t>Titel A (Arial 28pt., rot, max. 1 Zeile) </a:t>
+            </a:r>
+          </a:p>
+        </p:txBody>
+      </p:sp>
+    </p:spTree>
+    <p:extLst>
+      <p:ext uri="{BB962C8B-B14F-4D97-AF65-F5344CB8AC3E}">
+        <p14:creationId xmlns:p14="http://schemas.microsoft.com/office/powerpoint/2010/main" val="2157838461"/>
       </p:ext>
     </p:extLst>
   </p:cSld>
@@ -14465,7 +14366,7 @@
           <p:nvPr>
             <p:ph type="title"/>
             <p:custDataLst>
-              <p:tags r:id="rId5"/>
+              <p:tags r:id="rId4"/>
             </p:custDataLst>
           </p:nvPr>
         </p:nvSpPr>
@@ -14505,12 +14406,12 @@
           </p:cNvPicPr>
           <p:nvPr userDrawn="1">
             <p:custDataLst>
-              <p:tags r:id="rId6"/>
+              <p:tags r:id="rId5"/>
             </p:custDataLst>
           </p:nvPr>
         </p:nvPicPr>
         <p:blipFill>
-          <a:blip r:embed="rId7" cstate="print">
+          <a:blip r:embed="rId6" cstate="print">
             <a:extLst>
               <a:ext uri="{28A0092B-C50C-407E-A947-70E740481C1C}">
                 <a14:useLocalDpi xmlns:a14="http://schemas.microsoft.com/office/drawing/2010/main" val="0"/>
@@ -14542,7 +14443,6 @@
   <p:sldLayoutIdLst>
     <p:sldLayoutId id="2147483750" r:id="rId1"/>
     <p:sldLayoutId id="2147483765" r:id="rId2"/>
-    <p:sldLayoutId id="2147483777" r:id="rId3"/>
   </p:sldLayoutIdLst>
   <p:hf hdr="0" dt="0"/>
   <p:txStyles>
@@ -17974,19 +17874,17 @@
       </p:sp>
       <p:pic>
         <p:nvPicPr>
-          <p:cNvPr id="6" name="Inhaltsplatzhalter 5" descr="Ein Bild, das Blume enthält.&#10;&#10;Automatisch generierte Beschreibung">
+          <p:cNvPr id="9" name="Grafik 8" descr="Ein Bild, das Blume enthält.&#10;&#10;Automatisch generierte Beschreibung">
             <a:extLst>
               <a:ext uri="{FF2B5EF4-FFF2-40B4-BE49-F238E27FC236}">
-                <a16:creationId xmlns:a16="http://schemas.microsoft.com/office/drawing/2014/main" id="{67F5AF55-498C-4D1E-9007-54D85CF02C3E}"/>
+                <a16:creationId xmlns:a16="http://schemas.microsoft.com/office/drawing/2014/main" id="{4449003B-DB37-4B1F-8510-623B2311E3A4}"/>
               </a:ext>
             </a:extLst>
           </p:cNvPr>
           <p:cNvPicPr>
-            <a:picLocks noGrp="1" noChangeAspect="1"/>
+            <a:picLocks noChangeAspect="1"/>
           </p:cNvPicPr>
-          <p:nvPr>
-            <p:ph idx="1"/>
-          </p:nvPr>
+          <p:nvPr/>
         </p:nvPicPr>
         <p:blipFill>
           <a:blip r:embed="rId2">
@@ -18002,17 +17900,20 @@
         </p:blipFill>
         <p:spPr>
           <a:xfrm>
-            <a:off x="540000" y="1191709"/>
+            <a:off x="539552" y="1191709"/>
             <a:ext cx="3538114" cy="3527425"/>
           </a:xfrm>
+          <a:prstGeom prst="rect">
+            <a:avLst/>
+          </a:prstGeom>
         </p:spPr>
       </p:pic>
       <p:pic>
         <p:nvPicPr>
-          <p:cNvPr id="8" name="Grafik 7" descr="Ein Bild, das Blume enthält.&#10;&#10;Automatisch generierte Beschreibung">
+          <p:cNvPr id="15" name="Grafik 14">
             <a:extLst>
               <a:ext uri="{FF2B5EF4-FFF2-40B4-BE49-F238E27FC236}">
-                <a16:creationId xmlns:a16="http://schemas.microsoft.com/office/drawing/2014/main" id="{C43DB024-B304-4223-9193-5DEF2EE59902}"/>
+                <a16:creationId xmlns:a16="http://schemas.microsoft.com/office/drawing/2014/main" id="{8FD59BA3-8F5B-48C7-8933-22B7B4D654B7}"/>
               </a:ext>
             </a:extLst>
           </p:cNvPr>
@@ -18035,7 +17936,7 @@
         </p:blipFill>
         <p:spPr>
           <a:xfrm>
-            <a:off x="5065888" y="1191709"/>
+            <a:off x="5066336" y="1191709"/>
             <a:ext cx="3538114" cy="3527425"/>
           </a:xfrm>
           <a:prstGeom prst="rect">
@@ -18145,19 +18046,17 @@
       </p:sp>
       <p:pic>
         <p:nvPicPr>
-          <p:cNvPr id="6" name="Inhaltsplatzhalter 5" descr="Ein Bild, das Blume enthält.&#10;&#10;Automatisch generierte Beschreibung">
+          <p:cNvPr id="9" name="Grafik 8" descr="Ein Bild, das Blume enthält.&#10;&#10;Automatisch generierte Beschreibung">
             <a:extLst>
               <a:ext uri="{FF2B5EF4-FFF2-40B4-BE49-F238E27FC236}">
-                <a16:creationId xmlns:a16="http://schemas.microsoft.com/office/drawing/2014/main" id="{67F5AF55-498C-4D1E-9007-54D85CF02C3E}"/>
+                <a16:creationId xmlns:a16="http://schemas.microsoft.com/office/drawing/2014/main" id="{4449003B-DB37-4B1F-8510-623B2311E3A4}"/>
               </a:ext>
             </a:extLst>
           </p:cNvPr>
           <p:cNvPicPr>
-            <a:picLocks noGrp="1" noChangeAspect="1"/>
+            <a:picLocks noChangeAspect="1"/>
           </p:cNvPicPr>
-          <p:nvPr>
-            <p:ph idx="1"/>
-          </p:nvPr>
+          <p:nvPr/>
         </p:nvPicPr>
         <p:blipFill>
           <a:blip r:embed="rId2">
@@ -18173,17 +18072,20 @@
         </p:blipFill>
         <p:spPr>
           <a:xfrm>
-            <a:off x="540000" y="1191709"/>
+            <a:off x="539552" y="1191709"/>
             <a:ext cx="3538114" cy="3527425"/>
           </a:xfrm>
+          <a:prstGeom prst="rect">
+            <a:avLst/>
+          </a:prstGeom>
         </p:spPr>
       </p:pic>
       <p:pic>
         <p:nvPicPr>
-          <p:cNvPr id="5" name="Grafik 4" descr="Ein Bild, das Blume enthält.&#10;&#10;Automatisch generierte Beschreibung">
+          <p:cNvPr id="5" name="Grafik 4">
             <a:extLst>
               <a:ext uri="{FF2B5EF4-FFF2-40B4-BE49-F238E27FC236}">
-                <a16:creationId xmlns:a16="http://schemas.microsoft.com/office/drawing/2014/main" id="{29D561D7-1944-42FF-8C4E-2EA5111E8FE5}"/>
+                <a16:creationId xmlns:a16="http://schemas.microsoft.com/office/drawing/2014/main" id="{298F3FBF-74C3-404D-B8B2-2CBFA922A9EF}"/>
               </a:ext>
             </a:extLst>
           </p:cNvPr>
@@ -18206,7 +18108,7 @@
         </p:blipFill>
         <p:spPr>
           <a:xfrm>
-            <a:off x="5065886" y="1191709"/>
+            <a:off x="5066336" y="1191708"/>
             <a:ext cx="3538114" cy="3527425"/>
           </a:xfrm>
           <a:prstGeom prst="rect">
@@ -18217,7 +18119,7 @@
     </p:spTree>
     <p:extLst>
       <p:ext uri="{BB962C8B-B14F-4D97-AF65-F5344CB8AC3E}">
-        <p14:creationId xmlns:p14="http://schemas.microsoft.com/office/powerpoint/2010/main" val="982483946"/>
+        <p14:creationId xmlns:p14="http://schemas.microsoft.com/office/powerpoint/2010/main" val="45481676"/>
       </p:ext>
     </p:extLst>
   </p:cSld>
@@ -18283,7 +18185,15 @@
             </a:r>
             <a:r>
               <a:rPr lang="de-CH" dirty="0" err="1"/>
-              <a:t>MinMax</a:t>
+              <a:t>Histogram</a:t>
+            </a:r>
+            <a:r>
+              <a:rPr lang="de-CH" dirty="0"/>
+              <a:t> </a:t>
+            </a:r>
+            <a:r>
+              <a:rPr lang="de-CH" dirty="0" err="1"/>
+              <a:t>Matching</a:t>
             </a:r>
             <a:endParaRPr lang="en-GB" dirty="0"/>
           </a:p>
@@ -18320,19 +18230,17 @@
       </p:sp>
       <p:pic>
         <p:nvPicPr>
-          <p:cNvPr id="6" name="Inhaltsplatzhalter 5" descr="Ein Bild, das Blume enthält.&#10;&#10;Automatisch generierte Beschreibung">
+          <p:cNvPr id="9" name="Grafik 8" descr="Ein Bild, das Blume enthält.&#10;&#10;Automatisch generierte Beschreibung">
             <a:extLst>
               <a:ext uri="{FF2B5EF4-FFF2-40B4-BE49-F238E27FC236}">
-                <a16:creationId xmlns:a16="http://schemas.microsoft.com/office/drawing/2014/main" id="{67F5AF55-498C-4D1E-9007-54D85CF02C3E}"/>
+                <a16:creationId xmlns:a16="http://schemas.microsoft.com/office/drawing/2014/main" id="{4449003B-DB37-4B1F-8510-623B2311E3A4}"/>
               </a:ext>
             </a:extLst>
           </p:cNvPr>
           <p:cNvPicPr>
-            <a:picLocks noGrp="1" noChangeAspect="1"/>
+            <a:picLocks noChangeAspect="1"/>
           </p:cNvPicPr>
-          <p:nvPr>
-            <p:ph idx="1"/>
-          </p:nvPr>
+          <p:nvPr/>
         </p:nvPicPr>
         <p:blipFill>
           <a:blip r:embed="rId2">
@@ -18348,17 +18256,20 @@
         </p:blipFill>
         <p:spPr>
           <a:xfrm>
-            <a:off x="540000" y="1191709"/>
+            <a:off x="539552" y="1191709"/>
             <a:ext cx="3538114" cy="3527425"/>
           </a:xfrm>
+          <a:prstGeom prst="rect">
+            <a:avLst/>
+          </a:prstGeom>
         </p:spPr>
       </p:pic>
       <p:pic>
         <p:nvPicPr>
-          <p:cNvPr id="5" name="Grafik 4" descr="Ein Bild, das Blume, Essen enthält.&#10;&#10;Automatisch generierte Beschreibung">
+          <p:cNvPr id="5" name="Grafik 4">
             <a:extLst>
               <a:ext uri="{FF2B5EF4-FFF2-40B4-BE49-F238E27FC236}">
-                <a16:creationId xmlns:a16="http://schemas.microsoft.com/office/drawing/2014/main" id="{8D251A62-8BD1-4863-9249-5712608D8D8C}"/>
+                <a16:creationId xmlns:a16="http://schemas.microsoft.com/office/drawing/2014/main" id="{FDBF7E6D-32AE-4C28-A244-F0DE981FD8A8}"/>
               </a:ext>
             </a:extLst>
           </p:cNvPr>
@@ -18381,7 +18292,7 @@
         </p:blipFill>
         <p:spPr>
           <a:xfrm>
-            <a:off x="5065888" y="1191709"/>
+            <a:off x="5066334" y="1191709"/>
             <a:ext cx="3538114" cy="3527425"/>
           </a:xfrm>
           <a:prstGeom prst="rect">
@@ -18392,7 +18303,7 @@
     </p:spTree>
     <p:extLst>
       <p:ext uri="{BB962C8B-B14F-4D97-AF65-F5344CB8AC3E}">
-        <p14:creationId xmlns:p14="http://schemas.microsoft.com/office/powerpoint/2010/main" val="173124273"/>
+        <p14:creationId xmlns:p14="http://schemas.microsoft.com/office/powerpoint/2010/main" val="1662431265"/>
       </p:ext>
     </p:extLst>
   </p:cSld>
@@ -18458,15 +18369,7 @@
             </a:r>
             <a:r>
               <a:rPr lang="de-CH" dirty="0" err="1"/>
-              <a:t>Histogram</a:t>
-            </a:r>
-            <a:r>
-              <a:rPr lang="de-CH" dirty="0"/>
-              <a:t> </a:t>
-            </a:r>
-            <a:r>
-              <a:rPr lang="de-CH" dirty="0" err="1"/>
-              <a:t>Matching</a:t>
+              <a:t>MinMax</a:t>
             </a:r>
             <a:endParaRPr lang="en-GB" dirty="0"/>
           </a:p>
@@ -18503,19 +18406,17 @@
       </p:sp>
       <p:pic>
         <p:nvPicPr>
-          <p:cNvPr id="6" name="Inhaltsplatzhalter 5" descr="Ein Bild, das Blume enthält.&#10;&#10;Automatisch generierte Beschreibung">
+          <p:cNvPr id="9" name="Grafik 8" descr="Ein Bild, das Blume enthält.&#10;&#10;Automatisch generierte Beschreibung">
             <a:extLst>
               <a:ext uri="{FF2B5EF4-FFF2-40B4-BE49-F238E27FC236}">
-                <a16:creationId xmlns:a16="http://schemas.microsoft.com/office/drawing/2014/main" id="{67F5AF55-498C-4D1E-9007-54D85CF02C3E}"/>
+                <a16:creationId xmlns:a16="http://schemas.microsoft.com/office/drawing/2014/main" id="{4449003B-DB37-4B1F-8510-623B2311E3A4}"/>
               </a:ext>
             </a:extLst>
           </p:cNvPr>
           <p:cNvPicPr>
-            <a:picLocks noGrp="1" noChangeAspect="1"/>
+            <a:picLocks noChangeAspect="1"/>
           </p:cNvPicPr>
-          <p:nvPr>
-            <p:ph idx="1"/>
-          </p:nvPr>
+          <p:nvPr/>
         </p:nvPicPr>
         <p:blipFill>
           <a:blip r:embed="rId2">
@@ -18531,17 +18432,20 @@
         </p:blipFill>
         <p:spPr>
           <a:xfrm>
-            <a:off x="540000" y="1191709"/>
+            <a:off x="539552" y="1191709"/>
             <a:ext cx="3538114" cy="3527425"/>
           </a:xfrm>
+          <a:prstGeom prst="rect">
+            <a:avLst/>
+          </a:prstGeom>
         </p:spPr>
       </p:pic>
       <p:pic>
         <p:nvPicPr>
-          <p:cNvPr id="7" name="Grafik 6" descr="Ein Bild, das Blume enthält.&#10;&#10;Automatisch generierte Beschreibung">
+          <p:cNvPr id="5" name="Grafik 4">
             <a:extLst>
               <a:ext uri="{FF2B5EF4-FFF2-40B4-BE49-F238E27FC236}">
-                <a16:creationId xmlns:a16="http://schemas.microsoft.com/office/drawing/2014/main" id="{B35DA1B4-148A-4604-BEF3-0BA84C3D78FE}"/>
+                <a16:creationId xmlns:a16="http://schemas.microsoft.com/office/drawing/2014/main" id="{683AD4BC-DA5A-4952-8B7E-88F844FF33A2}"/>
               </a:ext>
             </a:extLst>
           </p:cNvPr>
@@ -18564,7 +18468,7 @@
         </p:blipFill>
         <p:spPr>
           <a:xfrm>
-            <a:off x="5065888" y="1191709"/>
+            <a:off x="5066334" y="1191709"/>
             <a:ext cx="3538114" cy="3527425"/>
           </a:xfrm>
           <a:prstGeom prst="rect">
@@ -18575,7 +18479,7 @@
     </p:spTree>
     <p:extLst>
       <p:ext uri="{BB962C8B-B14F-4D97-AF65-F5344CB8AC3E}">
-        <p14:creationId xmlns:p14="http://schemas.microsoft.com/office/powerpoint/2010/main" val="4002181805"/>
+        <p14:creationId xmlns:p14="http://schemas.microsoft.com/office/powerpoint/2010/main" val="4224651672"/>
       </p:ext>
     </p:extLst>
   </p:cSld>
@@ -18678,19 +18582,17 @@
       </p:sp>
       <p:pic>
         <p:nvPicPr>
-          <p:cNvPr id="6" name="Inhaltsplatzhalter 5" descr="Ein Bild, das Blume enthält.&#10;&#10;Automatisch generierte Beschreibung">
+          <p:cNvPr id="9" name="Grafik 8" descr="Ein Bild, das Blume enthält.&#10;&#10;Automatisch generierte Beschreibung">
             <a:extLst>
               <a:ext uri="{FF2B5EF4-FFF2-40B4-BE49-F238E27FC236}">
-                <a16:creationId xmlns:a16="http://schemas.microsoft.com/office/drawing/2014/main" id="{67F5AF55-498C-4D1E-9007-54D85CF02C3E}"/>
+                <a16:creationId xmlns:a16="http://schemas.microsoft.com/office/drawing/2014/main" id="{4449003B-DB37-4B1F-8510-623B2311E3A4}"/>
               </a:ext>
             </a:extLst>
           </p:cNvPr>
           <p:cNvPicPr>
-            <a:picLocks noGrp="1" noChangeAspect="1"/>
+            <a:picLocks noChangeAspect="1"/>
           </p:cNvPicPr>
-          <p:nvPr>
-            <p:ph idx="1"/>
-          </p:nvPr>
+          <p:nvPr/>
         </p:nvPicPr>
         <p:blipFill>
           <a:blip r:embed="rId2">
@@ -18706,17 +18608,20 @@
         </p:blipFill>
         <p:spPr>
           <a:xfrm>
-            <a:off x="540000" y="1191709"/>
+            <a:off x="539552" y="1191709"/>
             <a:ext cx="3538114" cy="3527425"/>
           </a:xfrm>
+          <a:prstGeom prst="rect">
+            <a:avLst/>
+          </a:prstGeom>
         </p:spPr>
       </p:pic>
       <p:pic>
         <p:nvPicPr>
-          <p:cNvPr id="5" name="Grafik 4" descr="Ein Bild, das Blume enthält.&#10;&#10;Automatisch generierte Beschreibung">
+          <p:cNvPr id="5" name="Grafik 4">
             <a:extLst>
               <a:ext uri="{FF2B5EF4-FFF2-40B4-BE49-F238E27FC236}">
-                <a16:creationId xmlns:a16="http://schemas.microsoft.com/office/drawing/2014/main" id="{D0E8F932-E933-4E92-B5C0-26A6AC333A95}"/>
+                <a16:creationId xmlns:a16="http://schemas.microsoft.com/office/drawing/2014/main" id="{9CA855F3-5356-4476-B8B2-D7CE90B22A21}"/>
               </a:ext>
             </a:extLst>
           </p:cNvPr>
@@ -18739,7 +18644,7 @@
         </p:blipFill>
         <p:spPr>
           <a:xfrm>
-            <a:off x="5065886" y="1191709"/>
+            <a:off x="5066336" y="1191709"/>
             <a:ext cx="3538114" cy="3527425"/>
           </a:xfrm>
           <a:prstGeom prst="rect">
@@ -18750,7 +18655,7 @@
     </p:spTree>
     <p:extLst>
       <p:ext uri="{BB962C8B-B14F-4D97-AF65-F5344CB8AC3E}">
-        <p14:creationId xmlns:p14="http://schemas.microsoft.com/office/powerpoint/2010/main" val="3740360723"/>
+        <p14:creationId xmlns:p14="http://schemas.microsoft.com/office/powerpoint/2010/main" val="83481377"/>
       </p:ext>
     </p:extLst>
   </p:cSld>
@@ -18853,19 +18758,17 @@
       </p:sp>
       <p:pic>
         <p:nvPicPr>
-          <p:cNvPr id="6" name="Inhaltsplatzhalter 5" descr="Ein Bild, das Blume enthält.&#10;&#10;Automatisch generierte Beschreibung">
+          <p:cNvPr id="9" name="Grafik 8" descr="Ein Bild, das Blume enthält.&#10;&#10;Automatisch generierte Beschreibung">
             <a:extLst>
               <a:ext uri="{FF2B5EF4-FFF2-40B4-BE49-F238E27FC236}">
-                <a16:creationId xmlns:a16="http://schemas.microsoft.com/office/drawing/2014/main" id="{67F5AF55-498C-4D1E-9007-54D85CF02C3E}"/>
+                <a16:creationId xmlns:a16="http://schemas.microsoft.com/office/drawing/2014/main" id="{4449003B-DB37-4B1F-8510-623B2311E3A4}"/>
               </a:ext>
             </a:extLst>
           </p:cNvPr>
           <p:cNvPicPr>
-            <a:picLocks noGrp="1" noChangeAspect="1"/>
+            <a:picLocks noChangeAspect="1"/>
           </p:cNvPicPr>
-          <p:nvPr>
-            <p:ph idx="1"/>
-          </p:nvPr>
+          <p:nvPr/>
         </p:nvPicPr>
         <p:blipFill>
           <a:blip r:embed="rId2">
@@ -18881,17 +18784,20 @@
         </p:blipFill>
         <p:spPr>
           <a:xfrm>
-            <a:off x="540000" y="1191709"/>
+            <a:off x="539552" y="1191709"/>
             <a:ext cx="3538114" cy="3527425"/>
           </a:xfrm>
+          <a:prstGeom prst="rect">
+            <a:avLst/>
+          </a:prstGeom>
         </p:spPr>
       </p:pic>
       <p:pic>
         <p:nvPicPr>
-          <p:cNvPr id="7" name="Grafik 6" descr="Ein Bild, das Blume enthält.&#10;&#10;Automatisch generierte Beschreibung">
+          <p:cNvPr id="5" name="Grafik 4">
             <a:extLst>
               <a:ext uri="{FF2B5EF4-FFF2-40B4-BE49-F238E27FC236}">
-                <a16:creationId xmlns:a16="http://schemas.microsoft.com/office/drawing/2014/main" id="{5E2341CA-4E6A-4180-98D5-EE47B818C72E}"/>
+                <a16:creationId xmlns:a16="http://schemas.microsoft.com/office/drawing/2014/main" id="{B7D24D52-CF9B-493E-918B-23DD8F1FCFB6}"/>
               </a:ext>
             </a:extLst>
           </p:cNvPr>
@@ -18914,7 +18820,7 @@
         </p:blipFill>
         <p:spPr>
           <a:xfrm>
-            <a:off x="5065888" y="1191709"/>
+            <a:off x="5066334" y="1191709"/>
             <a:ext cx="3538114" cy="3527425"/>
           </a:xfrm>
           <a:prstGeom prst="rect">
@@ -18925,7 +18831,7 @@
     </p:spTree>
     <p:extLst>
       <p:ext uri="{BB962C8B-B14F-4D97-AF65-F5344CB8AC3E}">
-        <p14:creationId xmlns:p14="http://schemas.microsoft.com/office/powerpoint/2010/main" val="1269174725"/>
+        <p14:creationId xmlns:p14="http://schemas.microsoft.com/office/powerpoint/2010/main" val="1049472527"/>
       </p:ext>
     </p:extLst>
   </p:cSld>
@@ -18974,36 +18880,8 @@
           <a:lstStyle/>
           <a:p>
             <a:r>
-              <a:rPr lang="de-CH" dirty="0" err="1"/>
-              <a:t>What</a:t>
-            </a:r>
-            <a:r>
-              <a:rPr lang="de-CH" dirty="0"/>
-              <a:t> </a:t>
-            </a:r>
-            <a:r>
-              <a:rPr lang="de-CH" dirty="0" err="1"/>
-              <a:t>have</a:t>
-            </a:r>
-            <a:r>
-              <a:rPr lang="de-CH" dirty="0"/>
-              <a:t> </a:t>
-            </a:r>
-            <a:r>
-              <a:rPr lang="de-CH" dirty="0" err="1"/>
-              <a:t>we</a:t>
-            </a:r>
-            <a:r>
-              <a:rPr lang="de-CH" dirty="0"/>
-              <a:t> </a:t>
-            </a:r>
-            <a:r>
-              <a:rPr lang="de-CH" dirty="0" err="1"/>
-              <a:t>learned</a:t>
-            </a:r>
-            <a:r>
-              <a:rPr lang="de-CH" dirty="0"/>
-              <a:t>?</a:t>
+              <a:rPr lang="de-CH"/>
+              <a:t>xxx</a:t>
             </a:r>
             <a:endParaRPr lang="en-GB" dirty="0"/>
           </a:p>
@@ -19032,7 +18910,7 @@
           <a:p>
             <a:r>
               <a:rPr lang="de-CH" dirty="0" err="1"/>
-              <a:t>Recap</a:t>
+              <a:t>Discussion</a:t>
             </a:r>
             <a:endParaRPr lang="en-GB" dirty="0"/>
           </a:p>
@@ -19060,20 +18938,6 @@
           <a:lstStyle/>
           <a:p>
             <a:r>
-              <a:rPr lang="de-CH" dirty="0"/>
-              <a:t>Teamwork </a:t>
-            </a:r>
-            <a:r>
-              <a:rPr lang="de-CH" dirty="0" err="1"/>
-              <a:t>with</a:t>
-            </a:r>
-            <a:r>
-              <a:rPr lang="de-CH" dirty="0"/>
-              <a:t> GitHub</a:t>
-            </a:r>
-          </a:p>
-          <a:p>
-            <a:r>
               <a:rPr lang="de-CH" dirty="0" err="1"/>
               <a:t>Bla</a:t>
             </a:r>
@@ -19091,10 +18955,10 @@
               <a:rPr lang="de-CH" dirty="0" err="1"/>
               <a:t>Bla</a:t>
             </a:r>
-            <a:endParaRPr lang="de-CH"/>
-          </a:p>
-          <a:p>
-            <a:endParaRPr lang="en-GB"/>
+            <a:endParaRPr lang="de-CH" dirty="0"/>
+          </a:p>
+          <a:p>
+            <a:endParaRPr lang="en-GB" dirty="0"/>
           </a:p>
         </p:txBody>
       </p:sp>
@@ -19112,154 +18976,6 @@
 </file>
 
 <file path=ppt/slides/slide18.xml><?xml version="1.0" encoding="utf-8"?>
-<p:sld xmlns:a="http://schemas.openxmlformats.org/drawingml/2006/main" xmlns:r="http://schemas.openxmlformats.org/officeDocument/2006/relationships" xmlns:p="http://schemas.openxmlformats.org/presentationml/2006/main">
-  <p:cSld>
-    <p:spTree>
-      <p:nvGrpSpPr>
-        <p:cNvPr id="1" name=""/>
-        <p:cNvGrpSpPr/>
-        <p:nvPr/>
-      </p:nvGrpSpPr>
-      <p:grpSpPr>
-        <a:xfrm>
-          <a:off x="0" y="0"/>
-          <a:ext cx="0" cy="0"/>
-          <a:chOff x="0" y="0"/>
-          <a:chExt cx="0" cy="0"/>
-        </a:xfrm>
-      </p:grpSpPr>
-      <p:sp>
-        <p:nvSpPr>
-          <p:cNvPr id="25" name="Text Placeholder 24">
-            <a:extLst>
-              <a:ext uri="{FF2B5EF4-FFF2-40B4-BE49-F238E27FC236}">
-                <a16:creationId xmlns:a16="http://schemas.microsoft.com/office/drawing/2014/main" id="{1D96C830-14AA-41C9-95A1-E2DE662385B5}"/>
-              </a:ext>
-            </a:extLst>
-          </p:cNvPr>
-          <p:cNvSpPr>
-            <a:spLocks noGrp="1"/>
-          </p:cNvSpPr>
-          <p:nvPr>
-            <p:ph type="body" idx="11"/>
-          </p:nvPr>
-        </p:nvSpPr>
-        <p:spPr>
-          <a:xfrm>
-            <a:off x="540000" y="680400"/>
-            <a:ext cx="7020000" cy="410369"/>
-          </a:xfrm>
-        </p:spPr>
-        <p:txBody>
-          <a:bodyPr/>
-          <a:lstStyle/>
-          <a:p>
-            <a:r>
-              <a:rPr lang="en-GB" dirty="0"/>
-              <a:t>What else could be done?</a:t>
-            </a:r>
-          </a:p>
-        </p:txBody>
-      </p:sp>
-      <p:sp>
-        <p:nvSpPr>
-          <p:cNvPr id="24" name="Title 23">
-            <a:extLst>
-              <a:ext uri="{FF2B5EF4-FFF2-40B4-BE49-F238E27FC236}">
-                <a16:creationId xmlns:a16="http://schemas.microsoft.com/office/drawing/2014/main" id="{E919C78D-2366-43B6-90AA-19FC1507C038}"/>
-              </a:ext>
-            </a:extLst>
-          </p:cNvPr>
-          <p:cNvSpPr>
-            <a:spLocks noGrp="1"/>
-          </p:cNvSpPr>
-          <p:nvPr>
-            <p:ph type="title"/>
-          </p:nvPr>
-        </p:nvSpPr>
-        <p:spPr/>
-        <p:txBody>
-          <a:bodyPr/>
-          <a:lstStyle/>
-          <a:p>
-            <a:r>
-              <a:rPr lang="en-US" dirty="0"/>
-              <a:t>Outlook</a:t>
-            </a:r>
-          </a:p>
-        </p:txBody>
-      </p:sp>
-      <p:sp>
-        <p:nvSpPr>
-          <p:cNvPr id="23" name="Content Placeholder 22">
-            <a:extLst>
-              <a:ext uri="{FF2B5EF4-FFF2-40B4-BE49-F238E27FC236}">
-                <a16:creationId xmlns:a16="http://schemas.microsoft.com/office/drawing/2014/main" id="{22E2B98F-DA7C-448F-ACBF-3E4BCA2FF259}"/>
-              </a:ext>
-            </a:extLst>
-          </p:cNvPr>
-          <p:cNvSpPr>
-            <a:spLocks noGrp="1"/>
-          </p:cNvSpPr>
-          <p:nvPr>
-            <p:ph idx="1"/>
-          </p:nvPr>
-        </p:nvSpPr>
-        <p:spPr>
-          <a:xfrm>
-            <a:off x="540000" y="1275606"/>
-            <a:ext cx="8496496" cy="3528392"/>
-          </a:xfrm>
-        </p:spPr>
-        <p:txBody>
-          <a:bodyPr/>
-          <a:lstStyle/>
-          <a:p>
-            <a:pPr marL="342900" indent="-342900" algn="just">
-              <a:buFont typeface="+mj-lt"/>
-              <a:buAutoNum type="arabicPeriod"/>
-            </a:pPr>
-            <a:r>
-              <a:rPr lang="en-US" dirty="0"/>
-              <a:t>Try other preprocessing methods</a:t>
-            </a:r>
-          </a:p>
-          <a:p>
-            <a:pPr marL="342900" indent="-342900" algn="just">
-              <a:buFont typeface="+mj-lt"/>
-              <a:buAutoNum type="arabicPeriod"/>
-            </a:pPr>
-            <a:r>
-              <a:rPr lang="en-US" dirty="0"/>
-              <a:t>Xxx</a:t>
-            </a:r>
-          </a:p>
-          <a:p>
-            <a:pPr marL="342900" indent="-342900" algn="just">
-              <a:buFont typeface="+mj-lt"/>
-              <a:buAutoNum type="arabicPeriod"/>
-            </a:pPr>
-            <a:r>
-              <a:rPr lang="en-US" dirty="0"/>
-              <a:t>xxx</a:t>
-            </a:r>
-          </a:p>
-        </p:txBody>
-      </p:sp>
-    </p:spTree>
-    <p:extLst>
-      <p:ext uri="{BB962C8B-B14F-4D97-AF65-F5344CB8AC3E}">
-        <p14:creationId xmlns:p14="http://schemas.microsoft.com/office/powerpoint/2010/main" val="69429724"/>
-      </p:ext>
-    </p:extLst>
-  </p:cSld>
-  <p:clrMapOvr>
-    <a:masterClrMapping/>
-  </p:clrMapOvr>
-</p:sld>
-</file>
-
-<file path=ppt/slides/slide19.xml><?xml version="1.0" encoding="utf-8"?>
 <p:sld xmlns:a="http://schemas.openxmlformats.org/drawingml/2006/main" xmlns:r="http://schemas.openxmlformats.org/officeDocument/2006/relationships" xmlns:p="http://schemas.openxmlformats.org/presentationml/2006/main">
   <p:cSld>
     <p:spTree>
@@ -19471,7 +19187,7 @@
           <a:p>
             <a:r>
               <a:rPr lang="de-CH" dirty="0"/>
-              <a:t>16. November 2020</a:t>
+              <a:t>14. Dezember 2020</a:t>
             </a:r>
             <a:endParaRPr lang="en-GB" dirty="0"/>
           </a:p>

</xml_diff>